<commit_message>
Andy added graph, weighting
</commit_message>
<xml_diff>
--- a/Project 1 Powerpoint Jasmine Edit.pptx
+++ b/Project 1 Powerpoint Jasmine Edit.pptx
@@ -5,7 +5,7 @@
     <p:sldMasterId id="2147483672" r:id="rId1"/>
   </p:sldMasterIdLst>
   <p:notesMasterIdLst>
-    <p:notesMasterId r:id="rId15"/>
+    <p:notesMasterId r:id="rId16"/>
   </p:notesMasterIdLst>
   <p:sldIdLst>
     <p:sldId id="256" r:id="rId2"/>
@@ -15,12 +15,13 @@
     <p:sldId id="266" r:id="rId6"/>
     <p:sldId id="267" r:id="rId7"/>
     <p:sldId id="268" r:id="rId8"/>
-    <p:sldId id="262" r:id="rId9"/>
-    <p:sldId id="261" r:id="rId10"/>
-    <p:sldId id="263" r:id="rId11"/>
-    <p:sldId id="264" r:id="rId12"/>
-    <p:sldId id="265" r:id="rId13"/>
-    <p:sldId id="269" r:id="rId14"/>
+    <p:sldId id="270" r:id="rId9"/>
+    <p:sldId id="262" r:id="rId10"/>
+    <p:sldId id="261" r:id="rId11"/>
+    <p:sldId id="263" r:id="rId12"/>
+    <p:sldId id="264" r:id="rId13"/>
+    <p:sldId id="265" r:id="rId14"/>
+    <p:sldId id="269" r:id="rId15"/>
   </p:sldIdLst>
   <p:sldSz cx="9144000" cy="6858000" type="screen4x3"/>
   <p:notesSz cx="6858000" cy="9144000"/>
@@ -119,6 +120,22 @@
       </a:defRPr>
     </a:lvl9pPr>
   </p:defaultTextStyle>
+  <p:extLst>
+    <p:ext uri="{EFAFB233-063F-42B5-8137-9DF3F51BA10A}">
+      <p15:sldGuideLst xmlns:p15="http://schemas.microsoft.com/office/powerpoint/2012/main">
+        <p15:guide id="1" orient="horz" pos="2160">
+          <p15:clr>
+            <a:srgbClr val="A4A3A4"/>
+          </p15:clr>
+        </p15:guide>
+        <p15:guide id="2" pos="2880">
+          <p15:clr>
+            <a:srgbClr val="A4A3A4"/>
+          </p15:clr>
+        </p15:guide>
+      </p15:sldGuideLst>
+    </p:ext>
+  </p:extLst>
 </p:presentation>
 </file>
 
@@ -676,7 +693,7 @@
           <a:p>
             <a:fld id="{BCFE6538-8E2A-4155-88EC-2879DA714723}" type="slidenum">
               <a:rPr lang="en-US" smtClean="0"/>
-              <a:t>8</a:t>
+              <a:t>9</a:t>
             </a:fld>
             <a:endParaRPr lang="en-US"/>
           </a:p>
@@ -4265,7 +4282,7 @@
             <a:pPr algn="ctr"/>
             <a:r>
               <a:rPr lang="en-US" u="sng" dirty="0" smtClean="0"/>
-              <a:t>Obstacles and Solutions</a:t>
+              <a:t>Findings</a:t>
             </a:r>
             <a:endParaRPr lang="en-US" u="sng" dirty="0"/>
           </a:p>
@@ -4288,119 +4305,67 @@
           </a:bodyPr>
           <a:lstStyle/>
           <a:p>
-            <a:pPr lvl="0"/>
-            <a:r>
-              <a:rPr lang="en-US" dirty="0" err="1"/>
-              <a:t>Git</a:t>
-            </a:r>
             <a:r>
               <a:rPr lang="en-US" dirty="0"/>
-              <a:t> setup:</a:t>
-            </a:r>
-            <a:endParaRPr lang="en-US" sz="2800" dirty="0"/>
+              <a:t>It was interesting to see </a:t>
+            </a:r>
+            <a:endParaRPr lang="en-US" dirty="0" smtClean="0"/>
+          </a:p>
+          <a:p>
+            <a:endParaRPr lang="en-US" dirty="0"/>
           </a:p>
           <a:p>
             <a:pPr lvl="1"/>
             <a:r>
-              <a:rPr lang="en-US" dirty="0"/>
-              <a:t>Problem: getting </a:t>
-            </a:r>
-            <a:r>
-              <a:rPr lang="en-US" dirty="0" err="1"/>
-              <a:t>git</a:t>
-            </a:r>
-            <a:r>
-              <a:rPr lang="en-US" dirty="0"/>
-              <a:t> to work and sync. </a:t>
-            </a:r>
+              <a:rPr lang="en-US" sz="2400" dirty="0" smtClean="0"/>
+              <a:t> </a:t>
+            </a:r>
+            <a:r>
+              <a:rPr lang="en-US" sz="2400" dirty="0"/>
+              <a:t>Mississippi, Alabama and Arkansas were near the lowest mean household incomes across all ownership </a:t>
+            </a:r>
+            <a:r>
+              <a:rPr lang="en-US" sz="2400" dirty="0" smtClean="0"/>
+              <a:t>types.</a:t>
+            </a:r>
+          </a:p>
+          <a:p>
+            <a:pPr lvl="1"/>
+            <a:endParaRPr lang="en-US" sz="2400" dirty="0" smtClean="0"/>
+          </a:p>
+          <a:p>
+            <a:pPr lvl="1"/>
+            <a:r>
+              <a:rPr lang="en-US" sz="2400" dirty="0" smtClean="0"/>
+              <a:t>Midwest </a:t>
+            </a:r>
+            <a:r>
+              <a:rPr lang="en-US" sz="2400" dirty="0"/>
+              <a:t>has high income/occupy with no rent </a:t>
+            </a:r>
+            <a:endParaRPr lang="en-US" sz="2400" dirty="0" smtClean="0"/>
+          </a:p>
+          <a:p>
+            <a:pPr lvl="1"/>
             <a:endParaRPr lang="en-US" sz="2400" dirty="0"/>
           </a:p>
           <a:p>
             <a:pPr lvl="1"/>
             <a:r>
-              <a:rPr lang="en-US" dirty="0"/>
-              <a:t>Solutions:</a:t>
-            </a:r>
-            <a:endParaRPr lang="en-US" sz="2400" dirty="0"/>
-          </a:p>
-          <a:p>
-            <a:pPr lvl="2"/>
-            <a:r>
-              <a:rPr lang="en-US" dirty="0"/>
-              <a:t>Delete local connection, create new version control project in </a:t>
-            </a:r>
-            <a:r>
-              <a:rPr lang="en-US" dirty="0" err="1"/>
-              <a:t>Rstudio</a:t>
-            </a:r>
-            <a:r>
-              <a:rPr lang="en-US" dirty="0"/>
-              <a:t>, paste changes to new file</a:t>
-            </a:r>
-            <a:endParaRPr lang="en-US" sz="2000" dirty="0"/>
-          </a:p>
-          <a:p>
-            <a:pPr lvl="2"/>
-            <a:r>
-              <a:rPr lang="en-US" dirty="0"/>
-              <a:t>Use </a:t>
-            </a:r>
-            <a:r>
-              <a:rPr lang="en-US" dirty="0" err="1"/>
-              <a:t>github</a:t>
-            </a:r>
-            <a:r>
-              <a:rPr lang="en-US" dirty="0"/>
-              <a:t> for Mac/Windows</a:t>
-            </a:r>
-            <a:endParaRPr lang="en-US" sz="2000" dirty="0"/>
-          </a:p>
-          <a:p>
-            <a:pPr lvl="0"/>
-            <a:r>
-              <a:rPr lang="en-US" dirty="0"/>
-              <a:t>File downloads:</a:t>
-            </a:r>
-            <a:endParaRPr lang="en-US" sz="2800" dirty="0"/>
-          </a:p>
-          <a:p>
-            <a:pPr lvl="1"/>
-            <a:r>
-              <a:rPr lang="en-US" dirty="0"/>
-              <a:t>Problem: Automating the downloading process of each state from the web.</a:t>
-            </a:r>
-            <a:endParaRPr lang="en-US" sz="2400" dirty="0"/>
-          </a:p>
-          <a:p>
-            <a:pPr lvl="1"/>
-            <a:r>
-              <a:rPr lang="en-US" dirty="0"/>
-              <a:t>Solution: Download combined US household data. </a:t>
-            </a:r>
-            <a:endParaRPr lang="en-US" sz="2400" dirty="0"/>
-          </a:p>
-          <a:p>
-            <a:pPr lvl="1"/>
-            <a:r>
-              <a:rPr lang="en-US" dirty="0"/>
-              <a:t>Problem: Combined US household data comes in 4 files</a:t>
-            </a:r>
-            <a:endParaRPr lang="en-US" sz="2400" dirty="0"/>
-          </a:p>
-          <a:p>
-            <a:pPr lvl="1"/>
-            <a:r>
-              <a:rPr lang="en-US" dirty="0"/>
-              <a:t>Solution: Download all 4, use system() to merge in command line using cat.</a:t>
-            </a:r>
-            <a:endParaRPr lang="en-US" sz="4400" dirty="0"/>
+              <a:rPr lang="en-US" sz="2400" dirty="0" smtClean="0"/>
+              <a:t>Florida </a:t>
+            </a:r>
+            <a:r>
+              <a:rPr lang="en-US" sz="2400" dirty="0"/>
+              <a:t>has higher income for owned free and clear than surrounding region.</a:t>
+            </a:r>
           </a:p>
         </p:txBody>
       </p:sp>
     </p:spTree>
     <p:extLst>
       <p:ext uri="{BB962C8B-B14F-4D97-AF65-F5344CB8AC3E}">
-        <p14:creationId xmlns:p14="http://schemas.microsoft.com/office/powerpoint/2010/main" val="3030518069"/>
+        <p14:creationId xmlns:p14="http://schemas.microsoft.com/office/powerpoint/2010/main" val="4040071344"/>
       </p:ext>
     </p:extLst>
   </p:cSld>
@@ -4471,14 +4436,18 @@
         <p:spPr/>
         <p:txBody>
           <a:bodyPr>
-            <a:normAutofit fontScale="92500" lnSpcReduction="10000"/>
+            <a:normAutofit/>
           </a:bodyPr>
           <a:lstStyle/>
           <a:p>
             <a:pPr lvl="0"/>
             <a:r>
+              <a:rPr lang="en-US" dirty="0" err="1"/>
+              <a:t>Git</a:t>
+            </a:r>
+            <a:r>
               <a:rPr lang="en-US" dirty="0"/>
-              <a:t>Data import:</a:t>
+              <a:t> setup:</a:t>
             </a:r>
             <a:endParaRPr lang="en-US" sz="2800" dirty="0"/>
           </a:p>
@@ -4486,93 +4455,7 @@
             <a:pPr lvl="1"/>
             <a:r>
               <a:rPr lang="en-US" dirty="0"/>
-              <a:t>Problem: ~200 x 4 million dataset breaks R when you import it</a:t>
-            </a:r>
-            <a:endParaRPr lang="en-US" sz="2400" dirty="0"/>
-          </a:p>
-          <a:p>
-            <a:pPr lvl="1"/>
-            <a:r>
-              <a:rPr lang="en-US" dirty="0"/>
-              <a:t>Solution: Find columns of interest in the command line </a:t>
-            </a:r>
-            <a:endParaRPr lang="en-US" dirty="0" smtClean="0"/>
-          </a:p>
-          <a:p>
-            <a:pPr marL="548640" lvl="2" indent="0">
-              <a:buNone/>
-            </a:pPr>
-            <a:r>
-              <a:rPr lang="en-US" sz="1500" dirty="0" smtClean="0"/>
-              <a:t>(</a:t>
-            </a:r>
-            <a:r>
-              <a:rPr lang="en-US" sz="1500" dirty="0"/>
-              <a:t>head -n 1 ss12hus.csv | </a:t>
-            </a:r>
-            <a:r>
-              <a:rPr lang="en-US" sz="1500" dirty="0" err="1"/>
-              <a:t>tr</a:t>
-            </a:r>
-            <a:r>
-              <a:rPr lang="en-US" sz="1500" dirty="0"/>
-              <a:t> ',' '\n' | </a:t>
-            </a:r>
-            <a:r>
-              <a:rPr lang="en-US" sz="1500" dirty="0" err="1"/>
-              <a:t>nl</a:t>
-            </a:r>
-            <a:r>
-              <a:rPr lang="en-US" sz="1500" dirty="0"/>
-              <a:t> | </a:t>
-            </a:r>
-            <a:r>
-              <a:rPr lang="en-US" sz="1500" dirty="0" err="1"/>
-              <a:t>grep</a:t>
-            </a:r>
-            <a:r>
-              <a:rPr lang="en-US" sz="1500" dirty="0"/>
-              <a:t> -w 'TEN\|HINCP\|ST\|ADJHSG' | less -S</a:t>
-            </a:r>
-            <a:r>
-              <a:rPr lang="en-US" sz="1500" dirty="0" smtClean="0"/>
-              <a:t>)</a:t>
-            </a:r>
-          </a:p>
-          <a:p>
-            <a:pPr marL="548640" lvl="2" indent="0">
-              <a:buNone/>
-            </a:pPr>
-            <a:r>
-              <a:rPr lang="en-US" dirty="0" smtClean="0"/>
-              <a:t>use </a:t>
-            </a:r>
-            <a:r>
-              <a:rPr lang="en-US" dirty="0"/>
-              <a:t>cut -d, -f7,8,40,54 ss12hus.csv to only import 4 columns</a:t>
-            </a:r>
-          </a:p>
-          <a:p>
-            <a:pPr lvl="0"/>
-            <a:r>
-              <a:rPr lang="en-US" dirty="0"/>
-              <a:t>Code compatibility:</a:t>
-            </a:r>
-            <a:endParaRPr lang="en-US" sz="2800" dirty="0"/>
-          </a:p>
-          <a:p>
-            <a:pPr lvl="1"/>
-            <a:r>
-              <a:rPr lang="en-US" dirty="0"/>
-              <a:t>Problem: 1 mac, 3 windows, windows cannot run command line data fixes</a:t>
-            </a:r>
-            <a:endParaRPr lang="en-US" sz="2400" dirty="0"/>
-          </a:p>
-          <a:p>
-            <a:pPr lvl="1"/>
-            <a:r>
-              <a:rPr lang="en-US" dirty="0"/>
-              <a:t>Solution: upload modified data file to </a:t>
+              <a:t>Problem: getting </a:t>
             </a:r>
             <a:r>
               <a:rPr lang="en-US" dirty="0" err="1"/>
@@ -4580,15 +4463,55 @@
             </a:r>
             <a:r>
               <a:rPr lang="en-US" dirty="0"/>
-              <a:t> repo so it doesn’t have to be created every time</a:t>
+              <a:t> to work and sync. </a:t>
             </a:r>
             <a:endParaRPr lang="en-US" sz="2400" dirty="0"/>
           </a:p>
           <a:p>
+            <a:pPr lvl="1"/>
+            <a:r>
+              <a:rPr lang="en-US" dirty="0"/>
+              <a:t>Solutions:</a:t>
+            </a:r>
+            <a:endParaRPr lang="en-US" sz="2400" dirty="0"/>
+          </a:p>
+          <a:p>
+            <a:pPr lvl="2"/>
+            <a:r>
+              <a:rPr lang="en-US" dirty="0"/>
+              <a:t>Delete local connection, create new version control project in </a:t>
+            </a:r>
+            <a:r>
+              <a:rPr lang="en-US" dirty="0" err="1"/>
+              <a:t>Rstudio</a:t>
+            </a:r>
+            <a:r>
+              <a:rPr lang="en-US" dirty="0"/>
+              <a:t>, paste changes to new file</a:t>
+            </a:r>
+            <a:endParaRPr lang="en-US" sz="2000" dirty="0"/>
+          </a:p>
+          <a:p>
+            <a:pPr lvl="2"/>
+            <a:r>
+              <a:rPr lang="en-US" dirty="0"/>
+              <a:t>Use </a:t>
+            </a:r>
+            <a:r>
+              <a:rPr lang="en-US" dirty="0" err="1"/>
+              <a:t>github</a:t>
+            </a:r>
+            <a:r>
+              <a:rPr lang="en-US" dirty="0"/>
+              <a:t> for Mac/Windows</a:t>
+            </a:r>
+            <a:endParaRPr lang="en-US" sz="2000" dirty="0"/>
+          </a:p>
+          <a:p>
             <a:pPr lvl="0"/>
             <a:r>
               <a:rPr lang="en-US" dirty="0"/>
-              <a:t>Accidental branch diversion:</a:t>
+              <a:t>File downloads:</a:t>
             </a:r>
             <a:endParaRPr lang="en-US" sz="2800" dirty="0"/>
           </a:p>
@@ -4596,7 +4519,7 @@
             <a:pPr lvl="1"/>
             <a:r>
               <a:rPr lang="en-US" dirty="0"/>
-              <a:t>Problem: Code accidentally split into two versions, then merged, breaking code</a:t>
+              <a:t>Problem: Automating the downloading process of each state from the web.</a:t>
             </a:r>
             <a:endParaRPr lang="en-US" sz="2400" dirty="0"/>
           </a:p>
@@ -4604,12 +4527,24 @@
             <a:pPr lvl="1"/>
             <a:r>
               <a:rPr lang="en-US" dirty="0"/>
-              <a:t>Solution: Version control keeps track of code at different stages, allowing manual reversion to previous versions</a:t>
+              <a:t>Solution: Download combined US household data. </a:t>
             </a:r>
             <a:endParaRPr lang="en-US" sz="2400" dirty="0"/>
           </a:p>
           <a:p>
-            <a:pPr lvl="0"/>
+            <a:pPr lvl="1"/>
+            <a:r>
+              <a:rPr lang="en-US" dirty="0"/>
+              <a:t>Problem: Combined US household data comes in 4 files</a:t>
+            </a:r>
+            <a:endParaRPr lang="en-US" sz="2400" dirty="0"/>
+          </a:p>
+          <a:p>
+            <a:pPr lvl="1"/>
+            <a:r>
+              <a:rPr lang="en-US" dirty="0"/>
+              <a:t>Solution: Download all 4, use system() to merge in command line using cat.</a:t>
+            </a:r>
             <a:endParaRPr lang="en-US" sz="4400" dirty="0"/>
           </a:p>
         </p:txBody>
@@ -4617,7 +4552,7 @@
     </p:spTree>
     <p:extLst>
       <p:ext uri="{BB962C8B-B14F-4D97-AF65-F5344CB8AC3E}">
-        <p14:creationId xmlns:p14="http://schemas.microsoft.com/office/powerpoint/2010/main" val="994255640"/>
+        <p14:creationId xmlns:p14="http://schemas.microsoft.com/office/powerpoint/2010/main" val="3030518069"/>
       </p:ext>
     </p:extLst>
   </p:cSld>
@@ -4669,7 +4604,7 @@
             <a:pPr algn="ctr"/>
             <a:r>
               <a:rPr lang="en-US" u="sng" dirty="0" smtClean="0"/>
-              <a:t>Future Work</a:t>
+              <a:t>Obstacles and Solutions</a:t>
             </a:r>
             <a:endParaRPr lang="en-US" u="sng" dirty="0"/>
           </a:p>
@@ -4694,106 +4629,136 @@
           <a:p>
             <a:pPr lvl="0"/>
             <a:r>
-              <a:rPr lang="en-US" dirty="0" smtClean="0"/>
-              <a:t>Different groups</a:t>
-            </a:r>
+              <a:rPr lang="en-US" dirty="0"/>
+              <a:t>Data import:</a:t>
+            </a:r>
+            <a:endParaRPr lang="en-US" sz="2800" dirty="0"/>
           </a:p>
           <a:p>
             <a:pPr lvl="1"/>
             <a:r>
-              <a:rPr lang="en-US" sz="1900" dirty="0" smtClean="0"/>
-              <a:t>per </a:t>
-            </a:r>
-            <a:r>
-              <a:rPr lang="en-US" sz="1900" dirty="0"/>
-              <a:t>state based on </a:t>
-            </a:r>
-            <a:r>
-              <a:rPr lang="en-US" sz="1900" dirty="0" smtClean="0"/>
-              <a:t>year</a:t>
-            </a:r>
+              <a:rPr lang="en-US" dirty="0"/>
+              <a:t>Problem: ~200 x 4 million dataset breaks R when you import it</a:t>
+            </a:r>
+            <a:endParaRPr lang="en-US" sz="2400" dirty="0"/>
           </a:p>
           <a:p>
             <a:pPr lvl="1"/>
             <a:r>
-              <a:rPr lang="en-US" sz="1900" dirty="0" smtClean="0"/>
-              <a:t>by </a:t>
-            </a:r>
-            <a:r>
-              <a:rPr lang="en-US" sz="1900" dirty="0"/>
-              <a:t>region (East, South, West, Midwest</a:t>
-            </a:r>
-            <a:r>
-              <a:rPr lang="en-US" sz="1900" dirty="0" smtClean="0"/>
-              <a:t>)</a:t>
-            </a:r>
-          </a:p>
-          <a:p>
-            <a:pPr lvl="1"/>
-            <a:r>
-              <a:rPr lang="en-US" sz="1900" dirty="0"/>
-              <a:t>Examine counts – what proportion of people fall into what category in each state? </a:t>
-            </a:r>
-          </a:p>
-          <a:p>
-            <a:pPr marL="274320" lvl="1" indent="0">
+              <a:rPr lang="en-US" dirty="0"/>
+              <a:t>Solution: Find columns of interest in the command line </a:t>
+            </a:r>
+            <a:endParaRPr lang="en-US" dirty="0" smtClean="0"/>
+          </a:p>
+          <a:p>
+            <a:pPr marL="548640" lvl="2" indent="0">
               <a:buNone/>
             </a:pPr>
-            <a:endParaRPr lang="en-US" dirty="0"/>
+            <a:r>
+              <a:rPr lang="en-US" sz="1500" dirty="0" smtClean="0"/>
+              <a:t>(</a:t>
+            </a:r>
+            <a:r>
+              <a:rPr lang="en-US" sz="1500" dirty="0"/>
+              <a:t>head -n 1 ss12hus.csv | </a:t>
+            </a:r>
+            <a:r>
+              <a:rPr lang="en-US" sz="1500" dirty="0" err="1"/>
+              <a:t>tr</a:t>
+            </a:r>
+            <a:r>
+              <a:rPr lang="en-US" sz="1500" dirty="0"/>
+              <a:t> ',' '\n' | </a:t>
+            </a:r>
+            <a:r>
+              <a:rPr lang="en-US" sz="1500" dirty="0" err="1"/>
+              <a:t>nl</a:t>
+            </a:r>
+            <a:r>
+              <a:rPr lang="en-US" sz="1500" dirty="0"/>
+              <a:t> | </a:t>
+            </a:r>
+            <a:r>
+              <a:rPr lang="en-US" sz="1500" dirty="0" err="1"/>
+              <a:t>grep</a:t>
+            </a:r>
+            <a:r>
+              <a:rPr lang="en-US" sz="1500" dirty="0"/>
+              <a:t> -w 'TEN\|HINCP\|ST\|ADJHSG' | less -S</a:t>
+            </a:r>
+            <a:r>
+              <a:rPr lang="en-US" sz="1500" dirty="0" smtClean="0"/>
+              <a:t>)</a:t>
+            </a:r>
+          </a:p>
+          <a:p>
+            <a:pPr marL="548640" lvl="2" indent="0">
+              <a:buNone/>
+            </a:pPr>
+            <a:r>
+              <a:rPr lang="en-US" dirty="0" smtClean="0"/>
+              <a:t>use </a:t>
+            </a:r>
+            <a:r>
+              <a:rPr lang="en-US" dirty="0"/>
+              <a:t>cut -d, -f7,8,40,54 ss12hus.csv to only import 4 columns</a:t>
+            </a:r>
           </a:p>
           <a:p>
             <a:pPr lvl="0"/>
             <a:r>
               <a:rPr lang="en-US" dirty="0"/>
-              <a:t>Examine differences between each of the 4 household ownership types</a:t>
+              <a:t>Code compatibility:</a:t>
             </a:r>
             <a:endParaRPr lang="en-US" sz="2800" dirty="0"/>
           </a:p>
           <a:p>
             <a:pPr lvl="1"/>
             <a:r>
-              <a:rPr lang="en-US" sz="1900" dirty="0"/>
-              <a:t>Hypothesize that free &amp; clear owners are retired, mortgage payers are still </a:t>
-            </a:r>
-            <a:r>
-              <a:rPr lang="en-US" sz="1900" dirty="0" smtClean="0"/>
-              <a:t>working</a:t>
-            </a:r>
+              <a:rPr lang="en-US" dirty="0"/>
+              <a:t>Problem: 1 mac, 3 windows, windows cannot run command line data fixes</a:t>
+            </a:r>
+            <a:endParaRPr lang="en-US" sz="2400" dirty="0"/>
           </a:p>
           <a:p>
             <a:pPr lvl="1"/>
-            <a:endParaRPr lang="en-US" sz="1900" dirty="0"/>
+            <a:r>
+              <a:rPr lang="en-US" dirty="0"/>
+              <a:t>Solution: upload modified data file to </a:t>
+            </a:r>
+            <a:r>
+              <a:rPr lang="en-US" dirty="0" err="1"/>
+              <a:t>git</a:t>
+            </a:r>
+            <a:r>
+              <a:rPr lang="en-US" dirty="0"/>
+              <a:t> repo so it doesn’t have to be created every time</a:t>
+            </a:r>
+            <a:endParaRPr lang="en-US" sz="2400" dirty="0"/>
           </a:p>
           <a:p>
             <a:pPr lvl="0"/>
             <a:r>
-              <a:rPr lang="en-US" dirty="0" smtClean="0"/>
-              <a:t>Take </a:t>
-            </a:r>
-            <a:r>
               <a:rPr lang="en-US" dirty="0"/>
-              <a:t>into consideration negative and null </a:t>
-            </a:r>
-            <a:r>
-              <a:rPr lang="en-US" dirty="0" smtClean="0"/>
-              <a:t>income</a:t>
-            </a:r>
-          </a:p>
-          <a:p>
-            <a:pPr lvl="0"/>
+              <a:t>Accidental branch diversion:</a:t>
+            </a:r>
             <a:endParaRPr lang="en-US" sz="2800" dirty="0"/>
           </a:p>
           <a:p>
-            <a:pPr lvl="0"/>
-            <a:r>
-              <a:rPr lang="en-US" dirty="0" smtClean="0"/>
-              <a:t>Include </a:t>
-            </a:r>
+            <a:pPr lvl="1"/>
             <a:r>
               <a:rPr lang="en-US" dirty="0"/>
-              <a:t>weighting: this analysis pretended the ACS data was from a simple random sample.</a:t>
-            </a:r>
-            <a:endParaRPr lang="en-US" sz="2800" dirty="0"/>
+              <a:t>Problem: Code accidentally split into two versions, then merged, breaking code</a:t>
+            </a:r>
+            <a:endParaRPr lang="en-US" sz="2400" dirty="0"/>
+          </a:p>
+          <a:p>
+            <a:pPr lvl="1"/>
+            <a:r>
+              <a:rPr lang="en-US" dirty="0"/>
+              <a:t>Solution: Version control keeps track of code at different stages, allowing manual reversion to previous versions</a:t>
+            </a:r>
+            <a:endParaRPr lang="en-US" sz="2400" dirty="0"/>
           </a:p>
           <a:p>
             <a:pPr lvl="0"/>
@@ -4804,7 +4769,7 @@
     </p:spTree>
     <p:extLst>
       <p:ext uri="{BB962C8B-B14F-4D97-AF65-F5344CB8AC3E}">
-        <p14:creationId xmlns:p14="http://schemas.microsoft.com/office/powerpoint/2010/main" val="562526258"/>
+        <p14:creationId xmlns:p14="http://schemas.microsoft.com/office/powerpoint/2010/main" val="994255640"/>
       </p:ext>
     </p:extLst>
   </p:cSld>
@@ -4875,6 +4840,182 @@
         <p:spPr/>
         <p:txBody>
           <a:bodyPr>
+            <a:normAutofit lnSpcReduction="10000"/>
+          </a:bodyPr>
+          <a:lstStyle/>
+          <a:p>
+            <a:pPr lvl="0"/>
+            <a:r>
+              <a:rPr lang="en-US" dirty="0" smtClean="0"/>
+              <a:t>Different groups</a:t>
+            </a:r>
+          </a:p>
+          <a:p>
+            <a:pPr lvl="1"/>
+            <a:r>
+              <a:rPr lang="en-US" sz="1900" dirty="0" smtClean="0"/>
+              <a:t>per </a:t>
+            </a:r>
+            <a:r>
+              <a:rPr lang="en-US" sz="1900" dirty="0"/>
+              <a:t>state based on </a:t>
+            </a:r>
+            <a:r>
+              <a:rPr lang="en-US" sz="1900" dirty="0" smtClean="0"/>
+              <a:t>year</a:t>
+            </a:r>
+          </a:p>
+          <a:p>
+            <a:pPr lvl="1"/>
+            <a:r>
+              <a:rPr lang="en-US" sz="1900" dirty="0" smtClean="0"/>
+              <a:t>by </a:t>
+            </a:r>
+            <a:r>
+              <a:rPr lang="en-US" sz="1900" dirty="0"/>
+              <a:t>region (East, South, West, Midwest</a:t>
+            </a:r>
+            <a:r>
+              <a:rPr lang="en-US" sz="1900" dirty="0" smtClean="0"/>
+              <a:t>)</a:t>
+            </a:r>
+          </a:p>
+          <a:p>
+            <a:pPr lvl="1"/>
+            <a:r>
+              <a:rPr lang="en-US" sz="1900" dirty="0"/>
+              <a:t>Examine counts – what proportion of people fall into what category in each state? </a:t>
+            </a:r>
+          </a:p>
+          <a:p>
+            <a:pPr marL="274320" lvl="1" indent="0">
+              <a:buNone/>
+            </a:pPr>
+            <a:endParaRPr lang="en-US" dirty="0"/>
+          </a:p>
+          <a:p>
+            <a:pPr lvl="0"/>
+            <a:r>
+              <a:rPr lang="en-US" dirty="0"/>
+              <a:t>Examine differences between each of the 4 household ownership types</a:t>
+            </a:r>
+            <a:endParaRPr lang="en-US" sz="2800" dirty="0"/>
+          </a:p>
+          <a:p>
+            <a:pPr lvl="1"/>
+            <a:r>
+              <a:rPr lang="en-US" sz="1900" dirty="0"/>
+              <a:t>Hypothesize that free &amp; clear owners are retired, mortgage payers are still </a:t>
+            </a:r>
+            <a:r>
+              <a:rPr lang="en-US" sz="1900" dirty="0" smtClean="0"/>
+              <a:t>working</a:t>
+            </a:r>
+          </a:p>
+          <a:p>
+            <a:pPr lvl="1"/>
+            <a:endParaRPr lang="en-US" sz="1900" dirty="0"/>
+          </a:p>
+          <a:p>
+            <a:pPr lvl="0"/>
+            <a:r>
+              <a:rPr lang="en-US" dirty="0" smtClean="0"/>
+              <a:t>Take </a:t>
+            </a:r>
+            <a:r>
+              <a:rPr lang="en-US" dirty="0"/>
+              <a:t>into consideration negative and null </a:t>
+            </a:r>
+            <a:r>
+              <a:rPr lang="en-US" dirty="0" smtClean="0"/>
+              <a:t>income</a:t>
+            </a:r>
+            <a:r>
+              <a:rPr lang="en-US" sz="2800" dirty="0"/>
+              <a:t> </a:t>
+            </a:r>
+            <a:r>
+              <a:rPr lang="en-US" sz="2800" dirty="0" smtClean="0"/>
+              <a:t>(we ignored NAs and averaged in negatives).</a:t>
+            </a:r>
+            <a:endParaRPr lang="en-US" dirty="0" smtClean="0"/>
+          </a:p>
+        </p:txBody>
+      </p:sp>
+    </p:spTree>
+    <p:extLst>
+      <p:ext uri="{BB962C8B-B14F-4D97-AF65-F5344CB8AC3E}">
+        <p14:creationId xmlns:p14="http://schemas.microsoft.com/office/powerpoint/2010/main" val="562526258"/>
+      </p:ext>
+    </p:extLst>
+  </p:cSld>
+  <p:clrMapOvr>
+    <a:masterClrMapping/>
+  </p:clrMapOvr>
+  <p:timing>
+    <p:tnLst>
+      <p:par>
+        <p:cTn id="1" dur="indefinite" restart="never" nodeType="tmRoot"/>
+      </p:par>
+    </p:tnLst>
+  </p:timing>
+</p:sld>
+</file>
+
+<file path=ppt/slides/slide14.xml><?xml version="1.0" encoding="utf-8"?>
+<p:sld xmlns:a="http://schemas.openxmlformats.org/drawingml/2006/main" xmlns:r="http://schemas.openxmlformats.org/officeDocument/2006/relationships" xmlns:p="http://schemas.openxmlformats.org/presentationml/2006/main">
+  <p:cSld>
+    <p:spTree>
+      <p:nvGrpSpPr>
+        <p:cNvPr id="1" name=""/>
+        <p:cNvGrpSpPr/>
+        <p:nvPr/>
+      </p:nvGrpSpPr>
+      <p:grpSpPr>
+        <a:xfrm>
+          <a:off x="0" y="0"/>
+          <a:ext cx="0" cy="0"/>
+          <a:chOff x="0" y="0"/>
+          <a:chExt cx="0" cy="0"/>
+        </a:xfrm>
+      </p:grpSpPr>
+      <p:sp>
+        <p:nvSpPr>
+          <p:cNvPr id="2" name="Title 1"/>
+          <p:cNvSpPr>
+            <a:spLocks noGrp="1"/>
+          </p:cNvSpPr>
+          <p:nvPr>
+            <p:ph type="title"/>
+          </p:nvPr>
+        </p:nvSpPr>
+        <p:spPr/>
+        <p:txBody>
+          <a:bodyPr/>
+          <a:lstStyle/>
+          <a:p>
+            <a:pPr algn="ctr"/>
+            <a:r>
+              <a:rPr lang="en-US" u="sng" dirty="0" smtClean="0"/>
+              <a:t>Future Work</a:t>
+            </a:r>
+            <a:endParaRPr lang="en-US" u="sng" dirty="0"/>
+          </a:p>
+        </p:txBody>
+      </p:sp>
+      <p:sp>
+        <p:nvSpPr>
+          <p:cNvPr id="3" name="Content Placeholder 2"/>
+          <p:cNvSpPr>
+            <a:spLocks noGrp="1"/>
+          </p:cNvSpPr>
+          <p:nvPr>
+            <p:ph idx="1"/>
+          </p:nvPr>
+        </p:nvSpPr>
+        <p:spPr/>
+        <p:txBody>
+          <a:bodyPr>
             <a:normAutofit/>
           </a:bodyPr>
           <a:lstStyle/>
@@ -4930,7 +5071,15 @@
             <a:pPr lvl="0"/>
             <a:r>
               <a:rPr lang="en-US" dirty="0"/>
-              <a:t>Include weighting: this analysis pretended the ACS data was from a simple random sample.</a:t>
+              <a:t>Include weighting: this analysis pretended the ACS data was from a simple random sample</a:t>
+            </a:r>
+            <a:r>
+              <a:rPr lang="en-US" dirty="0" smtClean="0"/>
+              <a:t>.  When we ran a few states with the weighting, </a:t>
+            </a:r>
+            <a:r>
+              <a:rPr lang="en-US" dirty="0" smtClean="0"/>
+              <a:t>average incomes increased.</a:t>
             </a:r>
             <a:endParaRPr lang="en-US" sz="2800" dirty="0"/>
           </a:p>
@@ -5018,11 +5167,7 @@
           <a:p>
             <a:r>
               <a:rPr lang="en-US" dirty="0" smtClean="0"/>
-              <a:t>Data: </a:t>
-            </a:r>
-            <a:r>
-              <a:rPr lang="en-US" dirty="0" smtClean="0"/>
-              <a:t>American </a:t>
+              <a:t>Data: American </a:t>
             </a:r>
             <a:r>
               <a:rPr lang="en-US" dirty="0"/>
@@ -6157,6 +6302,240 @@
       </p:grpSpPr>
       <p:pic>
         <p:nvPicPr>
+          <p:cNvPr id="1026" name="Picture 2"/>
+          <p:cNvPicPr>
+            <a:picLocks noChangeAspect="1" noChangeArrowheads="1"/>
+          </p:cNvPicPr>
+          <p:nvPr/>
+        </p:nvPicPr>
+        <p:blipFill>
+          <a:blip r:embed="rId2">
+            <a:extLst>
+              <a:ext uri="{28A0092B-C50C-407E-A947-70E740481C1C}">
+                <a14:useLocalDpi xmlns:a14="http://schemas.microsoft.com/office/drawing/2010/main" val="0"/>
+              </a:ext>
+            </a:extLst>
+          </a:blip>
+          <a:srcRect/>
+          <a:stretch>
+            <a:fillRect/>
+          </a:stretch>
+        </p:blipFill>
+        <p:spPr bwMode="auto">
+          <a:xfrm>
+            <a:off x="6350" y="399458"/>
+            <a:ext cx="5937250" cy="5928317"/>
+          </a:xfrm>
+          <a:prstGeom prst="rect">
+            <a:avLst/>
+          </a:prstGeom>
+          <a:solidFill>
+            <a:srgbClr val="FFFFFF"/>
+          </a:solidFill>
+          <a:ln>
+            <a:noFill/>
+          </a:ln>
+          <a:extLst>
+            <a:ext uri="{91240B29-F687-4F45-9708-019B960494DF}">
+              <a14:hiddenLine xmlns:a14="http://schemas.microsoft.com/office/drawing/2010/main" w="9525">
+                <a:solidFill>
+                  <a:srgbClr val="000000"/>
+                </a:solidFill>
+                <a:miter lim="800000"/>
+                <a:headEnd/>
+                <a:tailEnd/>
+              </a14:hiddenLine>
+            </a:ext>
+          </a:extLst>
+        </p:spPr>
+      </p:pic>
+      <p:sp>
+        <p:nvSpPr>
+          <p:cNvPr id="2" name="Title 1"/>
+          <p:cNvSpPr>
+            <a:spLocks noGrp="1"/>
+          </p:cNvSpPr>
+          <p:nvPr>
+            <p:ph type="title"/>
+          </p:nvPr>
+        </p:nvSpPr>
+        <p:spPr>
+          <a:xfrm>
+            <a:off x="533400" y="533400"/>
+            <a:ext cx="8229600" cy="990600"/>
+          </a:xfrm>
+        </p:spPr>
+        <p:txBody>
+          <a:bodyPr/>
+          <a:lstStyle/>
+          <a:p>
+            <a:pPr algn="ctr"/>
+            <a:r>
+              <a:rPr lang="en-US" dirty="0" smtClean="0"/>
+              <a:t>Findings</a:t>
+            </a:r>
+            <a:endParaRPr lang="en-US" dirty="0"/>
+          </a:p>
+        </p:txBody>
+      </p:sp>
+      <p:sp>
+        <p:nvSpPr>
+          <p:cNvPr id="3" name="Content Placeholder 2"/>
+          <p:cNvSpPr>
+            <a:spLocks noGrp="1"/>
+          </p:cNvSpPr>
+          <p:nvPr>
+            <p:ph idx="1"/>
+          </p:nvPr>
+        </p:nvSpPr>
+        <p:spPr>
+          <a:xfrm>
+            <a:off x="6324600" y="1524000"/>
+            <a:ext cx="2667000" cy="4876800"/>
+          </a:xfrm>
+        </p:spPr>
+        <p:txBody>
+          <a:bodyPr>
+            <a:normAutofit/>
+          </a:bodyPr>
+          <a:lstStyle/>
+          <a:p>
+            <a:pPr marL="0" indent="0">
+              <a:buNone/>
+            </a:pPr>
+            <a:r>
+              <a:rPr lang="en-US" dirty="0"/>
+              <a:t>H</a:t>
+            </a:r>
+            <a:r>
+              <a:rPr lang="en-US" dirty="0" smtClean="0"/>
+              <a:t>ighest mean in</a:t>
+            </a:r>
+          </a:p>
+          <a:p>
+            <a:pPr marL="457200" indent="-457200">
+              <a:buFont typeface="+mj-lt"/>
+              <a:buAutoNum type="arabicPeriod"/>
+            </a:pPr>
+            <a:r>
+              <a:rPr lang="en-US" dirty="0" smtClean="0"/>
+              <a:t>Connecticut </a:t>
+            </a:r>
+            <a:r>
+              <a:rPr lang="en-US" dirty="0"/>
+              <a:t>($</a:t>
+            </a:r>
+            <a:r>
+              <a:rPr lang="en-US" dirty="0" smtClean="0"/>
+              <a:t>50,264)</a:t>
+            </a:r>
+          </a:p>
+          <a:p>
+            <a:pPr marL="457200" indent="-457200">
+              <a:buFont typeface="+mj-lt"/>
+              <a:buAutoNum type="arabicPeriod"/>
+            </a:pPr>
+            <a:r>
+              <a:rPr lang="en-US" dirty="0" smtClean="0"/>
+              <a:t>Washington </a:t>
+            </a:r>
+            <a:r>
+              <a:rPr lang="en-US" dirty="0"/>
+              <a:t>D.C. ($</a:t>
+            </a:r>
+            <a:r>
+              <a:rPr lang="en-US" dirty="0" smtClean="0"/>
+              <a:t>49,266)</a:t>
+            </a:r>
+          </a:p>
+          <a:p>
+            <a:pPr marL="457200" indent="-457200">
+              <a:buFont typeface="+mj-lt"/>
+              <a:buAutoNum type="arabicPeriod"/>
+            </a:pPr>
+            <a:r>
+              <a:rPr lang="en-US" dirty="0" smtClean="0"/>
+              <a:t>Hawaii </a:t>
+            </a:r>
+            <a:r>
+              <a:rPr lang="en-US" dirty="0"/>
+              <a:t>($</a:t>
+            </a:r>
+            <a:r>
+              <a:rPr lang="en-US" dirty="0" smtClean="0"/>
+              <a:t>47,860)</a:t>
+            </a:r>
+          </a:p>
+          <a:p>
+            <a:pPr marL="457200" indent="-457200">
+              <a:buFont typeface="+mj-lt"/>
+              <a:buAutoNum type="arabicPeriod"/>
+            </a:pPr>
+            <a:r>
+              <a:rPr lang="en-US" dirty="0" smtClean="0"/>
+              <a:t>Massachusetts </a:t>
+            </a:r>
+            <a:r>
+              <a:rPr lang="en-US" dirty="0"/>
+              <a:t>($47,224) </a:t>
+            </a:r>
+          </a:p>
+          <a:p>
+            <a:pPr marL="457200" indent="-457200">
+              <a:buFont typeface="+mj-lt"/>
+              <a:buAutoNum type="arabicPeriod"/>
+            </a:pPr>
+            <a:r>
+              <a:rPr lang="en-US" dirty="0" smtClean="0"/>
+              <a:t>New </a:t>
+            </a:r>
+            <a:r>
+              <a:rPr lang="en-US" dirty="0"/>
+              <a:t>Jersey ($47,081</a:t>
+            </a:r>
+            <a:r>
+              <a:rPr lang="en-US" dirty="0" smtClean="0"/>
+              <a:t>)</a:t>
+            </a:r>
+            <a:endParaRPr lang="en-US" dirty="0"/>
+          </a:p>
+          <a:p>
+            <a:endParaRPr lang="en-US" dirty="0"/>
+          </a:p>
+        </p:txBody>
+      </p:sp>
+    </p:spTree>
+    <p:extLst>
+      <p:ext uri="{BB962C8B-B14F-4D97-AF65-F5344CB8AC3E}">
+        <p14:creationId xmlns:p14="http://schemas.microsoft.com/office/powerpoint/2010/main" val="1609376233"/>
+      </p:ext>
+    </p:extLst>
+  </p:cSld>
+  <p:clrMapOvr>
+    <a:masterClrMapping/>
+  </p:clrMapOvr>
+</p:sld>
+</file>
+
+<file path=ppt/slides/slide9.xml><?xml version="1.0" encoding="utf-8"?>
+<p:sld xmlns:a="http://schemas.openxmlformats.org/drawingml/2006/main" xmlns:r="http://schemas.openxmlformats.org/officeDocument/2006/relationships" xmlns:p="http://schemas.openxmlformats.org/presentationml/2006/main">
+  <p:cSld>
+    <p:spTree>
+      <p:nvGrpSpPr>
+        <p:cNvPr id="1" name=""/>
+        <p:cNvGrpSpPr/>
+        <p:nvPr/>
+      </p:nvGrpSpPr>
+      <p:grpSpPr>
+        <a:xfrm>
+          <a:off x="0" y="0"/>
+          <a:ext cx="0" cy="0"/>
+          <a:chOff x="0" y="0"/>
+          <a:chExt cx="0" cy="0"/>
+        </a:xfrm>
+      </p:grpSpPr>
+      <p:pic>
+        <p:nvPicPr>
           <p:cNvPr id="5" name="Content Placeholder 4" descr="https://github.com/andy-olstad/599-POGS/blob/master/Line%20graph.png?raw=true"/>
           <p:cNvPicPr>
             <a:picLocks noGrp="1"/>
@@ -6225,141 +6604,6 @@
     <p:extLst>
       <p:ext uri="{BB962C8B-B14F-4D97-AF65-F5344CB8AC3E}">
         <p14:creationId xmlns:p14="http://schemas.microsoft.com/office/powerpoint/2010/main" val="159895881"/>
-      </p:ext>
-    </p:extLst>
-  </p:cSld>
-  <p:clrMapOvr>
-    <a:masterClrMapping/>
-  </p:clrMapOvr>
-  <p:timing>
-    <p:tnLst>
-      <p:par>
-        <p:cTn id="1" dur="indefinite" restart="never" nodeType="tmRoot"/>
-      </p:par>
-    </p:tnLst>
-  </p:timing>
-</p:sld>
-</file>
-
-<file path=ppt/slides/slide9.xml><?xml version="1.0" encoding="utf-8"?>
-<p:sld xmlns:a="http://schemas.openxmlformats.org/drawingml/2006/main" xmlns:r="http://schemas.openxmlformats.org/officeDocument/2006/relationships" xmlns:p="http://schemas.openxmlformats.org/presentationml/2006/main">
-  <p:cSld>
-    <p:spTree>
-      <p:nvGrpSpPr>
-        <p:cNvPr id="1" name=""/>
-        <p:cNvGrpSpPr/>
-        <p:nvPr/>
-      </p:nvGrpSpPr>
-      <p:grpSpPr>
-        <a:xfrm>
-          <a:off x="0" y="0"/>
-          <a:ext cx="0" cy="0"/>
-          <a:chOff x="0" y="0"/>
-          <a:chExt cx="0" cy="0"/>
-        </a:xfrm>
-      </p:grpSpPr>
-      <p:sp>
-        <p:nvSpPr>
-          <p:cNvPr id="2" name="Title 1"/>
-          <p:cNvSpPr>
-            <a:spLocks noGrp="1"/>
-          </p:cNvSpPr>
-          <p:nvPr>
-            <p:ph type="title"/>
-          </p:nvPr>
-        </p:nvSpPr>
-        <p:spPr/>
-        <p:txBody>
-          <a:bodyPr/>
-          <a:lstStyle/>
-          <a:p>
-            <a:pPr algn="ctr"/>
-            <a:r>
-              <a:rPr lang="en-US" u="sng" dirty="0" smtClean="0"/>
-              <a:t>Findings</a:t>
-            </a:r>
-            <a:endParaRPr lang="en-US" u="sng" dirty="0"/>
-          </a:p>
-        </p:txBody>
-      </p:sp>
-      <p:sp>
-        <p:nvSpPr>
-          <p:cNvPr id="3" name="Content Placeholder 2"/>
-          <p:cNvSpPr>
-            <a:spLocks noGrp="1"/>
-          </p:cNvSpPr>
-          <p:nvPr>
-            <p:ph idx="1"/>
-          </p:nvPr>
-        </p:nvSpPr>
-        <p:spPr/>
-        <p:txBody>
-          <a:bodyPr>
-            <a:normAutofit/>
-          </a:bodyPr>
-          <a:lstStyle/>
-          <a:p>
-            <a:r>
-              <a:rPr lang="en-US" dirty="0"/>
-              <a:t>It was interesting to see </a:t>
-            </a:r>
-            <a:endParaRPr lang="en-US" dirty="0" smtClean="0"/>
-          </a:p>
-          <a:p>
-            <a:endParaRPr lang="en-US" dirty="0"/>
-          </a:p>
-          <a:p>
-            <a:pPr lvl="1"/>
-            <a:r>
-              <a:rPr lang="en-US" sz="2400" dirty="0" smtClean="0"/>
-              <a:t> </a:t>
-            </a:r>
-            <a:r>
-              <a:rPr lang="en-US" sz="2400" dirty="0"/>
-              <a:t>Mississippi, Alabama and Arkansas were near the lowest mean household incomes across all ownership </a:t>
-            </a:r>
-            <a:r>
-              <a:rPr lang="en-US" sz="2400" dirty="0" smtClean="0"/>
-              <a:t>types.</a:t>
-            </a:r>
-          </a:p>
-          <a:p>
-            <a:pPr lvl="1"/>
-            <a:endParaRPr lang="en-US" sz="2400" dirty="0" smtClean="0"/>
-          </a:p>
-          <a:p>
-            <a:pPr lvl="1"/>
-            <a:r>
-              <a:rPr lang="en-US" sz="2400" dirty="0" smtClean="0"/>
-              <a:t>Midwest </a:t>
-            </a:r>
-            <a:r>
-              <a:rPr lang="en-US" sz="2400" dirty="0"/>
-              <a:t>has high income/occupy with no rent </a:t>
-            </a:r>
-            <a:endParaRPr lang="en-US" sz="2400" dirty="0" smtClean="0"/>
-          </a:p>
-          <a:p>
-            <a:pPr lvl="1"/>
-            <a:endParaRPr lang="en-US" sz="2400" dirty="0"/>
-          </a:p>
-          <a:p>
-            <a:pPr lvl="1"/>
-            <a:r>
-              <a:rPr lang="en-US" sz="2400" dirty="0" smtClean="0"/>
-              <a:t>Florida </a:t>
-            </a:r>
-            <a:r>
-              <a:rPr lang="en-US" sz="2400" dirty="0"/>
-              <a:t>has higher income for owned free and clear than surrounding region.</a:t>
-            </a:r>
-          </a:p>
-        </p:txBody>
-      </p:sp>
-    </p:spTree>
-    <p:extLst>
-      <p:ext uri="{BB962C8B-B14F-4D97-AF65-F5344CB8AC3E}">
-        <p14:creationId xmlns:p14="http://schemas.microsoft.com/office/powerpoint/2010/main" val="4040071344"/>
       </p:ext>
     </p:extLst>
   </p:cSld>

</xml_diff>

<commit_message>
Andy altered income ratio slide
</commit_message>
<xml_diff>
--- a/Project 1 Powerpoint Jasmine Edit.pptx
+++ b/Project 1 Powerpoint Jasmine Edit.pptx
@@ -5075,11 +5075,7 @@
             </a:r>
             <a:r>
               <a:rPr lang="en-US" dirty="0" smtClean="0"/>
-              <a:t>.  When we ran a few states with the weighting, </a:t>
-            </a:r>
-            <a:r>
-              <a:rPr lang="en-US" dirty="0" smtClean="0"/>
-              <a:t>average incomes increased.</a:t>
+              <a:t>.  When we ran a few states with the weighting, average incomes increased.</a:t>
             </a:r>
             <a:endParaRPr lang="en-US" sz="2800" dirty="0"/>
           </a:p>
@@ -6323,8 +6319,8 @@
         </p:blipFill>
         <p:spPr bwMode="auto">
           <a:xfrm>
-            <a:off x="6350" y="399458"/>
-            <a:ext cx="5937250" cy="5928317"/>
+            <a:off x="1143000" y="152400"/>
+            <a:ext cx="7010400" cy="6999852"/>
           </a:xfrm>
           <a:prstGeom prst="rect">
             <a:avLst/>
@@ -6374,132 +6370,6 @@
               <a:rPr lang="en-US" dirty="0" smtClean="0"/>
               <a:t>Findings</a:t>
             </a:r>
-            <a:endParaRPr lang="en-US" dirty="0"/>
-          </a:p>
-        </p:txBody>
-      </p:sp>
-      <p:sp>
-        <p:nvSpPr>
-          <p:cNvPr id="3" name="Content Placeholder 2"/>
-          <p:cNvSpPr>
-            <a:spLocks noGrp="1"/>
-          </p:cNvSpPr>
-          <p:nvPr>
-            <p:ph idx="1"/>
-          </p:nvPr>
-        </p:nvSpPr>
-        <p:spPr>
-          <a:xfrm>
-            <a:off x="6324600" y="1524000"/>
-            <a:ext cx="2667000" cy="4876800"/>
-          </a:xfrm>
-        </p:spPr>
-        <p:txBody>
-          <a:bodyPr>
-            <a:normAutofit/>
-          </a:bodyPr>
-          <a:lstStyle/>
-          <a:p>
-            <a:pPr marL="0" indent="0">
-              <a:buNone/>
-            </a:pPr>
-            <a:r>
-              <a:rPr lang="en-US" dirty="0"/>
-              <a:t>H</a:t>
-            </a:r>
-            <a:r>
-              <a:rPr lang="en-US" dirty="0" smtClean="0"/>
-              <a:t>ighest mean in</a:t>
-            </a:r>
-          </a:p>
-          <a:p>
-            <a:pPr marL="457200" indent="-457200">
-              <a:buFont typeface="+mj-lt"/>
-              <a:buAutoNum type="arabicPeriod"/>
-            </a:pPr>
-            <a:r>
-              <a:rPr lang="en-US" dirty="0" smtClean="0"/>
-              <a:t>Connecticut </a:t>
-            </a:r>
-            <a:r>
-              <a:rPr lang="en-US" dirty="0"/>
-              <a:t>($</a:t>
-            </a:r>
-            <a:r>
-              <a:rPr lang="en-US" dirty="0" smtClean="0"/>
-              <a:t>50,264)</a:t>
-            </a:r>
-          </a:p>
-          <a:p>
-            <a:pPr marL="457200" indent="-457200">
-              <a:buFont typeface="+mj-lt"/>
-              <a:buAutoNum type="arabicPeriod"/>
-            </a:pPr>
-            <a:r>
-              <a:rPr lang="en-US" dirty="0" smtClean="0"/>
-              <a:t>Washington </a:t>
-            </a:r>
-            <a:r>
-              <a:rPr lang="en-US" dirty="0"/>
-              <a:t>D.C. ($</a:t>
-            </a:r>
-            <a:r>
-              <a:rPr lang="en-US" dirty="0" smtClean="0"/>
-              <a:t>49,266)</a:t>
-            </a:r>
-          </a:p>
-          <a:p>
-            <a:pPr marL="457200" indent="-457200">
-              <a:buFont typeface="+mj-lt"/>
-              <a:buAutoNum type="arabicPeriod"/>
-            </a:pPr>
-            <a:r>
-              <a:rPr lang="en-US" dirty="0" smtClean="0"/>
-              <a:t>Hawaii </a:t>
-            </a:r>
-            <a:r>
-              <a:rPr lang="en-US" dirty="0"/>
-              <a:t>($</a:t>
-            </a:r>
-            <a:r>
-              <a:rPr lang="en-US" dirty="0" smtClean="0"/>
-              <a:t>47,860)</a:t>
-            </a:r>
-          </a:p>
-          <a:p>
-            <a:pPr marL="457200" indent="-457200">
-              <a:buFont typeface="+mj-lt"/>
-              <a:buAutoNum type="arabicPeriod"/>
-            </a:pPr>
-            <a:r>
-              <a:rPr lang="en-US" dirty="0" smtClean="0"/>
-              <a:t>Massachusetts </a:t>
-            </a:r>
-            <a:r>
-              <a:rPr lang="en-US" dirty="0"/>
-              <a:t>($47,224) </a:t>
-            </a:r>
-          </a:p>
-          <a:p>
-            <a:pPr marL="457200" indent="-457200">
-              <a:buFont typeface="+mj-lt"/>
-              <a:buAutoNum type="arabicPeriod"/>
-            </a:pPr>
-            <a:r>
-              <a:rPr lang="en-US" dirty="0" smtClean="0"/>
-              <a:t>New </a:t>
-            </a:r>
-            <a:r>
-              <a:rPr lang="en-US" dirty="0"/>
-              <a:t>Jersey ($47,081</a:t>
-            </a:r>
-            <a:r>
-              <a:rPr lang="en-US" dirty="0" smtClean="0"/>
-              <a:t>)</a:t>
-            </a:r>
-            <a:endParaRPr lang="en-US" dirty="0"/>
-          </a:p>
-          <a:p>
             <a:endParaRPr lang="en-US" dirty="0"/>
           </a:p>
         </p:txBody>

</xml_diff>

<commit_message>
Sarah: updated line graph
</commit_message>
<xml_diff>
--- a/Project 1 Powerpoint Jasmine Edit.pptx
+++ b/Project 1 Powerpoint Jasmine Edit.pptx
@@ -1,6 +1,6 @@
 
 <file path=ppt/presentation.xml><?xml version="1.0" encoding="utf-8"?>
-<p:presentation xmlns:a="http://schemas.openxmlformats.org/drawingml/2006/main" xmlns:r="http://schemas.openxmlformats.org/officeDocument/2006/relationships" xmlns:p="http://schemas.openxmlformats.org/presentationml/2006/main" saveSubsetFonts="1">
+<p:presentation xmlns:a="http://schemas.openxmlformats.org/drawingml/2006/main" xmlns:r="http://schemas.openxmlformats.org/officeDocument/2006/relationships" xmlns:mc="http://schemas.openxmlformats.org/markup-compatibility/2006" xmlns:mv="urn:schemas-microsoft-com:mac:vml" xmlns:p="http://schemas.openxmlformats.org/presentationml/2006/main" mc:Ignorable="mv" mc:PreserveAttributes="mv:*" saveSubsetFonts="1">
   <p:sldMasterIdLst>
     <p:sldMasterId id="2147483672" r:id="rId1"/>
   </p:sldMasterIdLst>
@@ -122,7 +122,7 @@
   </p:defaultTextStyle>
   <p:extLst>
     <p:ext uri="{EFAFB233-063F-42B5-8137-9DF3F51BA10A}">
-      <p15:sldGuideLst xmlns:p15="http://schemas.microsoft.com/office/powerpoint/2012/main">
+      <p15:sldGuideLst xmlns:p15="http://schemas.microsoft.com/office/powerpoint/2012/main" xmlns:p="http://schemas.openxmlformats.org/presentationml/2006/main" xmlns:r="http://schemas.openxmlformats.org/officeDocument/2006/relationships" xmlns:a="http://schemas.openxmlformats.org/drawingml/2006/main" xmlns="">
         <p15:guide id="1" orient="horz" pos="2160">
           <p15:clr>
             <a:srgbClr val="A4A3A4"/>
@@ -140,7 +140,7 @@
 </file>
 
 <file path=ppt/notesMasters/notesMaster1.xml><?xml version="1.0" encoding="utf-8"?>
-<p:notesMaster xmlns:a="http://schemas.openxmlformats.org/drawingml/2006/main" xmlns:r="http://schemas.openxmlformats.org/officeDocument/2006/relationships" xmlns:p="http://schemas.openxmlformats.org/presentationml/2006/main">
+<p:notesMaster xmlns:a="http://schemas.openxmlformats.org/drawingml/2006/main" xmlns:r="http://schemas.openxmlformats.org/officeDocument/2006/relationships" xmlns:mc="http://schemas.openxmlformats.org/markup-compatibility/2006" xmlns:mv="urn:schemas-microsoft-com:mac:vml" xmlns:p="http://schemas.openxmlformats.org/presentationml/2006/main" mc:Ignorable="mv" mc:PreserveAttributes="mv:*">
   <p:cSld>
     <p:bg>
       <p:bgRef idx="1001">
@@ -221,7 +221,8 @@
           <a:p>
             <a:fld id="{18AB6D18-EEF5-430A-88D8-27B3BDF3ED2B}" type="datetimeFigureOut">
               <a:rPr lang="en-US" smtClean="0"/>
-              <a:t>4/23/2014</a:t>
+              <a:pPr/>
+              <a:t>4/24/14</a:t>
             </a:fld>
             <a:endParaRPr lang="en-US"/>
           </a:p>
@@ -380,6 +381,7 @@
           <a:p>
             <a:fld id="{BCFE6538-8E2A-4155-88EC-2879DA714723}" type="slidenum">
               <a:rPr lang="en-US" smtClean="0"/>
+              <a:pPr/>
               <a:t>‹#›</a:t>
             </a:fld>
             <a:endParaRPr lang="en-US"/>
@@ -389,7 +391,7 @@
     </p:spTree>
     <p:extLst>
       <p:ext uri="{BB962C8B-B14F-4D97-AF65-F5344CB8AC3E}">
-        <p14:creationId xmlns:p14="http://schemas.microsoft.com/office/powerpoint/2010/main" val="3336447715"/>
+        <p14:creationId xmlns:p14="http://schemas.microsoft.com/office/powerpoint/2010/main" xmlns:p="http://schemas.openxmlformats.org/presentationml/2006/main" xmlns:r="http://schemas.openxmlformats.org/officeDocument/2006/relationships" xmlns:a="http://schemas.openxmlformats.org/drawingml/2006/main" xmlns="" val="3336447715"/>
       </p:ext>
     </p:extLst>
   </p:cSld>
@@ -490,7 +492,7 @@
 </file>
 
 <file path=ppt/notesSlides/notesSlide1.xml><?xml version="1.0" encoding="utf-8"?>
-<p:notes xmlns:a="http://schemas.openxmlformats.org/drawingml/2006/main" xmlns:r="http://schemas.openxmlformats.org/officeDocument/2006/relationships" xmlns:p="http://schemas.openxmlformats.org/presentationml/2006/main">
+<p:notes xmlns:a="http://schemas.openxmlformats.org/drawingml/2006/main" xmlns:r="http://schemas.openxmlformats.org/officeDocument/2006/relationships" xmlns:mc="http://schemas.openxmlformats.org/markup-compatibility/2006" xmlns:mv="urn:schemas-microsoft-com:mac:vml" xmlns:p="http://schemas.openxmlformats.org/presentationml/2006/main" mc:Ignorable="mv" mc:PreserveAttributes="mv:*">
   <p:cSld>
     <p:spTree>
       <p:nvGrpSpPr>
@@ -578,6 +580,7 @@
           <a:p>
             <a:fld id="{BCFE6538-8E2A-4155-88EC-2879DA714723}" type="slidenum">
               <a:rPr lang="en-US" smtClean="0"/>
+              <a:pPr/>
               <a:t>2</a:t>
             </a:fld>
             <a:endParaRPr lang="en-US"/>
@@ -587,7 +590,7 @@
     </p:spTree>
     <p:extLst>
       <p:ext uri="{BB962C8B-B14F-4D97-AF65-F5344CB8AC3E}">
-        <p14:creationId xmlns:p14="http://schemas.microsoft.com/office/powerpoint/2010/main" val="1740475329"/>
+        <p14:creationId xmlns:p14="http://schemas.microsoft.com/office/powerpoint/2010/main" xmlns:p="http://schemas.openxmlformats.org/presentationml/2006/main" xmlns:r="http://schemas.openxmlformats.org/officeDocument/2006/relationships" xmlns:a="http://schemas.openxmlformats.org/drawingml/2006/main" xmlns="" val="1740475329"/>
       </p:ext>
     </p:extLst>
   </p:cSld>
@@ -598,7 +601,7 @@
 </file>
 
 <file path=ppt/notesSlides/notesSlide2.xml><?xml version="1.0" encoding="utf-8"?>
-<p:notes xmlns:a="http://schemas.openxmlformats.org/drawingml/2006/main" xmlns:r="http://schemas.openxmlformats.org/officeDocument/2006/relationships" xmlns:p="http://schemas.openxmlformats.org/presentationml/2006/main">
+<p:notes xmlns:a="http://schemas.openxmlformats.org/drawingml/2006/main" xmlns:r="http://schemas.openxmlformats.org/officeDocument/2006/relationships" xmlns:mc="http://schemas.openxmlformats.org/markup-compatibility/2006" xmlns:mv="urn:schemas-microsoft-com:mac:vml" xmlns:p="http://schemas.openxmlformats.org/presentationml/2006/main" mc:Ignorable="mv" mc:PreserveAttributes="mv:*">
   <p:cSld>
     <p:spTree>
       <p:nvGrpSpPr>
@@ -693,6 +696,7 @@
           <a:p>
             <a:fld id="{BCFE6538-8E2A-4155-88EC-2879DA714723}" type="slidenum">
               <a:rPr lang="en-US" smtClean="0"/>
+              <a:pPr/>
               <a:t>9</a:t>
             </a:fld>
             <a:endParaRPr lang="en-US"/>
@@ -702,7 +706,7 @@
     </p:spTree>
     <p:extLst>
       <p:ext uri="{BB962C8B-B14F-4D97-AF65-F5344CB8AC3E}">
-        <p14:creationId xmlns:p14="http://schemas.microsoft.com/office/powerpoint/2010/main" val="2204740499"/>
+        <p14:creationId xmlns:p14="http://schemas.microsoft.com/office/powerpoint/2010/main" xmlns:p="http://schemas.openxmlformats.org/presentationml/2006/main" xmlns:r="http://schemas.openxmlformats.org/officeDocument/2006/relationships" xmlns:a="http://schemas.openxmlformats.org/drawingml/2006/main" xmlns="" val="2204740499"/>
       </p:ext>
     </p:extLst>
   </p:cSld>
@@ -713,7 +717,7 @@
 </file>
 
 <file path=ppt/slideLayouts/slideLayout1.xml><?xml version="1.0" encoding="utf-8"?>
-<p:sldLayout xmlns:a="http://schemas.openxmlformats.org/drawingml/2006/main" xmlns:r="http://schemas.openxmlformats.org/officeDocument/2006/relationships" xmlns:p="http://schemas.openxmlformats.org/presentationml/2006/main" type="title" preserve="1">
+<p:sldLayout xmlns:a="http://schemas.openxmlformats.org/drawingml/2006/main" xmlns:r="http://schemas.openxmlformats.org/officeDocument/2006/relationships" xmlns:mc="http://schemas.openxmlformats.org/markup-compatibility/2006" xmlns:mv="urn:schemas-microsoft-com:mac:vml" xmlns:p="http://schemas.openxmlformats.org/presentationml/2006/main" mc:Ignorable="mv" mc:PreserveAttributes="mv:*" type="title" preserve="1">
   <p:cSld name="Title Slide">
     <p:spTree>
       <p:nvGrpSpPr>
@@ -900,7 +904,8 @@
           <a:p>
             <a:fld id="{BF937137-C3AC-4AD5-BA42-A41A2E6576FB}" type="datetimeFigureOut">
               <a:rPr lang="en-US" smtClean="0"/>
-              <a:t>4/23/2014</a:t>
+              <a:pPr/>
+              <a:t>4/24/14</a:t>
             </a:fld>
             <a:endParaRPr lang="en-US"/>
           </a:p>
@@ -942,6 +947,7 @@
           <a:p>
             <a:fld id="{5CD2872D-4AF2-4978-A721-ED14AC57D2B2}" type="slidenum">
               <a:rPr lang="en-US" smtClean="0"/>
+              <a:pPr/>
               <a:t>‹#›</a:t>
             </a:fld>
             <a:endParaRPr lang="en-US"/>
@@ -992,7 +998,7 @@
 </file>
 
 <file path=ppt/slideLayouts/slideLayout10.xml><?xml version="1.0" encoding="utf-8"?>
-<p:sldLayout xmlns:a="http://schemas.openxmlformats.org/drawingml/2006/main" xmlns:r="http://schemas.openxmlformats.org/officeDocument/2006/relationships" xmlns:p="http://schemas.openxmlformats.org/presentationml/2006/main" type="vertTx" preserve="1">
+<p:sldLayout xmlns:a="http://schemas.openxmlformats.org/drawingml/2006/main" xmlns:r="http://schemas.openxmlformats.org/officeDocument/2006/relationships" xmlns:mc="http://schemas.openxmlformats.org/markup-compatibility/2006" xmlns:mv="urn:schemas-microsoft-com:mac:vml" xmlns:p="http://schemas.openxmlformats.org/presentationml/2006/main" mc:Ignorable="mv" mc:PreserveAttributes="mv:*" type="vertTx" preserve="1">
   <p:cSld name="Title and Vertical Text">
     <p:spTree>
       <p:nvGrpSpPr>
@@ -1100,7 +1106,8 @@
           <a:p>
             <a:fld id="{BF937137-C3AC-4AD5-BA42-A41A2E6576FB}" type="datetimeFigureOut">
               <a:rPr lang="en-US" smtClean="0"/>
-              <a:t>4/23/2014</a:t>
+              <a:pPr/>
+              <a:t>4/24/14</a:t>
             </a:fld>
             <a:endParaRPr lang="en-US"/>
           </a:p>
@@ -1142,6 +1149,7 @@
           <a:p>
             <a:fld id="{5CD2872D-4AF2-4978-A721-ED14AC57D2B2}" type="slidenum">
               <a:rPr lang="en-US" smtClean="0"/>
+              <a:pPr/>
               <a:t>‹#›</a:t>
             </a:fld>
             <a:endParaRPr lang="en-US"/>
@@ -1157,7 +1165,7 @@
 </file>
 
 <file path=ppt/slideLayouts/slideLayout11.xml><?xml version="1.0" encoding="utf-8"?>
-<p:sldLayout xmlns:a="http://schemas.openxmlformats.org/drawingml/2006/main" xmlns:r="http://schemas.openxmlformats.org/officeDocument/2006/relationships" xmlns:p="http://schemas.openxmlformats.org/presentationml/2006/main" type="vertTitleAndTx" preserve="1">
+<p:sldLayout xmlns:a="http://schemas.openxmlformats.org/drawingml/2006/main" xmlns:r="http://schemas.openxmlformats.org/officeDocument/2006/relationships" xmlns:mc="http://schemas.openxmlformats.org/markup-compatibility/2006" xmlns:mv="urn:schemas-microsoft-com:mac:vml" xmlns:p="http://schemas.openxmlformats.org/presentationml/2006/main" mc:Ignorable="mv" mc:PreserveAttributes="mv:*" type="vertTitleAndTx" preserve="1">
   <p:cSld name="Vertical Title and Text">
     <p:spTree>
       <p:nvGrpSpPr>
@@ -1275,7 +1283,8 @@
           <a:p>
             <a:fld id="{BF937137-C3AC-4AD5-BA42-A41A2E6576FB}" type="datetimeFigureOut">
               <a:rPr lang="en-US" smtClean="0"/>
-              <a:t>4/23/2014</a:t>
+              <a:pPr/>
+              <a:t>4/24/14</a:t>
             </a:fld>
             <a:endParaRPr lang="en-US"/>
           </a:p>
@@ -1317,6 +1326,7 @@
           <a:p>
             <a:fld id="{5CD2872D-4AF2-4978-A721-ED14AC57D2B2}" type="slidenum">
               <a:rPr lang="en-US" smtClean="0"/>
+              <a:pPr/>
               <a:t>‹#›</a:t>
             </a:fld>
             <a:endParaRPr lang="en-US"/>
@@ -1332,7 +1342,7 @@
 </file>
 
 <file path=ppt/slideLayouts/slideLayout2.xml><?xml version="1.0" encoding="utf-8"?>
-<p:sldLayout xmlns:a="http://schemas.openxmlformats.org/drawingml/2006/main" xmlns:r="http://schemas.openxmlformats.org/officeDocument/2006/relationships" xmlns:p="http://schemas.openxmlformats.org/presentationml/2006/main" type="obj" preserve="1">
+<p:sldLayout xmlns:a="http://schemas.openxmlformats.org/drawingml/2006/main" xmlns:r="http://schemas.openxmlformats.org/officeDocument/2006/relationships" xmlns:mc="http://schemas.openxmlformats.org/markup-compatibility/2006" xmlns:mv="urn:schemas-microsoft-com:mac:vml" xmlns:p="http://schemas.openxmlformats.org/presentationml/2006/main" mc:Ignorable="mv" mc:PreserveAttributes="mv:*" type="obj" preserve="1">
   <p:cSld name="Title and Content">
     <p:spTree>
       <p:nvGrpSpPr>
@@ -1440,7 +1450,8 @@
           <a:p>
             <a:fld id="{BF937137-C3AC-4AD5-BA42-A41A2E6576FB}" type="datetimeFigureOut">
               <a:rPr lang="en-US" smtClean="0"/>
-              <a:t>4/23/2014</a:t>
+              <a:pPr/>
+              <a:t>4/24/14</a:t>
             </a:fld>
             <a:endParaRPr lang="en-US"/>
           </a:p>
@@ -1482,6 +1493,7 @@
           <a:p>
             <a:fld id="{5CD2872D-4AF2-4978-A721-ED14AC57D2B2}" type="slidenum">
               <a:rPr lang="en-US" smtClean="0"/>
+              <a:pPr/>
               <a:t>‹#›</a:t>
             </a:fld>
             <a:endParaRPr lang="en-US"/>
@@ -1497,7 +1509,7 @@
 </file>
 
 <file path=ppt/slideLayouts/slideLayout3.xml><?xml version="1.0" encoding="utf-8"?>
-<p:sldLayout xmlns:a="http://schemas.openxmlformats.org/drawingml/2006/main" xmlns:r="http://schemas.openxmlformats.org/officeDocument/2006/relationships" xmlns:p="http://schemas.openxmlformats.org/presentationml/2006/main" type="secHead" preserve="1">
+<p:sldLayout xmlns:a="http://schemas.openxmlformats.org/drawingml/2006/main" xmlns:r="http://schemas.openxmlformats.org/officeDocument/2006/relationships" xmlns:mc="http://schemas.openxmlformats.org/markup-compatibility/2006" xmlns:mv="urn:schemas-microsoft-com:mac:vml" xmlns:p="http://schemas.openxmlformats.org/presentationml/2006/main" mc:Ignorable="mv" mc:PreserveAttributes="mv:*" type="secHead" preserve="1">
   <p:cSld name="Section Header">
     <p:bg>
       <p:bgRef idx="1001">
@@ -1688,7 +1700,8 @@
           <a:p>
             <a:fld id="{BF937137-C3AC-4AD5-BA42-A41A2E6576FB}" type="datetimeFigureOut">
               <a:rPr lang="en-US" smtClean="0"/>
-              <a:t>4/23/2014</a:t>
+              <a:pPr/>
+              <a:t>4/24/14</a:t>
             </a:fld>
             <a:endParaRPr lang="en-US"/>
           </a:p>
@@ -1730,6 +1743,7 @@
           <a:p>
             <a:fld id="{5CD2872D-4AF2-4978-A721-ED14AC57D2B2}" type="slidenum">
               <a:rPr lang="en-US" smtClean="0"/>
+              <a:pPr/>
               <a:t>‹#›</a:t>
             </a:fld>
             <a:endParaRPr lang="en-US"/>
@@ -1780,7 +1794,7 @@
 </file>
 
 <file path=ppt/slideLayouts/slideLayout4.xml><?xml version="1.0" encoding="utf-8"?>
-<p:sldLayout xmlns:a="http://schemas.openxmlformats.org/drawingml/2006/main" xmlns:r="http://schemas.openxmlformats.org/officeDocument/2006/relationships" xmlns:p="http://schemas.openxmlformats.org/presentationml/2006/main" type="twoObj" preserve="1">
+<p:sldLayout xmlns:a="http://schemas.openxmlformats.org/drawingml/2006/main" xmlns:r="http://schemas.openxmlformats.org/officeDocument/2006/relationships" xmlns:mc="http://schemas.openxmlformats.org/markup-compatibility/2006" xmlns:mv="urn:schemas-microsoft-com:mac:vml" xmlns:p="http://schemas.openxmlformats.org/presentationml/2006/main" mc:Ignorable="mv" mc:PreserveAttributes="mv:*" type="twoObj" preserve="1">
   <p:cSld name="Two Content">
     <p:spTree>
       <p:nvGrpSpPr>
@@ -2006,7 +2020,8 @@
           <a:p>
             <a:fld id="{BF937137-C3AC-4AD5-BA42-A41A2E6576FB}" type="datetimeFigureOut">
               <a:rPr lang="en-US" smtClean="0"/>
-              <a:t>4/23/2014</a:t>
+              <a:pPr/>
+              <a:t>4/24/14</a:t>
             </a:fld>
             <a:endParaRPr lang="en-US"/>
           </a:p>
@@ -2048,6 +2063,7 @@
           <a:p>
             <a:fld id="{5CD2872D-4AF2-4978-A721-ED14AC57D2B2}" type="slidenum">
               <a:rPr lang="en-US" smtClean="0"/>
+              <a:pPr/>
               <a:t>‹#›</a:t>
             </a:fld>
             <a:endParaRPr lang="en-US"/>
@@ -2063,7 +2079,7 @@
 </file>
 
 <file path=ppt/slideLayouts/slideLayout5.xml><?xml version="1.0" encoding="utf-8"?>
-<p:sldLayout xmlns:a="http://schemas.openxmlformats.org/drawingml/2006/main" xmlns:r="http://schemas.openxmlformats.org/officeDocument/2006/relationships" xmlns:p="http://schemas.openxmlformats.org/presentationml/2006/main" type="twoTxTwoObj" preserve="1">
+<p:sldLayout xmlns:a="http://schemas.openxmlformats.org/drawingml/2006/main" xmlns:r="http://schemas.openxmlformats.org/officeDocument/2006/relationships" xmlns:mc="http://schemas.openxmlformats.org/markup-compatibility/2006" xmlns:mv="urn:schemas-microsoft-com:mac:vml" xmlns:p="http://schemas.openxmlformats.org/presentationml/2006/main" mc:Ignorable="mv" mc:PreserveAttributes="mv:*" type="twoTxTwoObj" preserve="1">
   <p:cSld name="Comparison">
     <p:spTree>
       <p:nvGrpSpPr>
@@ -2472,7 +2488,8 @@
           <a:p>
             <a:fld id="{BF937137-C3AC-4AD5-BA42-A41A2E6576FB}" type="datetimeFigureOut">
               <a:rPr lang="en-US" smtClean="0"/>
-              <a:t>4/23/2014</a:t>
+              <a:pPr/>
+              <a:t>4/24/14</a:t>
             </a:fld>
             <a:endParaRPr lang="en-US"/>
           </a:p>
@@ -2514,6 +2531,7 @@
           <a:p>
             <a:fld id="{5CD2872D-4AF2-4978-A721-ED14AC57D2B2}" type="slidenum">
               <a:rPr lang="en-US" smtClean="0"/>
+              <a:pPr/>
               <a:t>‹#›</a:t>
             </a:fld>
             <a:endParaRPr lang="en-US"/>
@@ -2564,7 +2582,7 @@
 </file>
 
 <file path=ppt/slideLayouts/slideLayout6.xml><?xml version="1.0" encoding="utf-8"?>
-<p:sldLayout xmlns:a="http://schemas.openxmlformats.org/drawingml/2006/main" xmlns:r="http://schemas.openxmlformats.org/officeDocument/2006/relationships" xmlns:p="http://schemas.openxmlformats.org/presentationml/2006/main" type="titleOnly" preserve="1">
+<p:sldLayout xmlns:a="http://schemas.openxmlformats.org/drawingml/2006/main" xmlns:r="http://schemas.openxmlformats.org/officeDocument/2006/relationships" xmlns:mc="http://schemas.openxmlformats.org/markup-compatibility/2006" xmlns:mv="urn:schemas-microsoft-com:mac:vml" xmlns:p="http://schemas.openxmlformats.org/presentationml/2006/main" mc:Ignorable="mv" mc:PreserveAttributes="mv:*" type="titleOnly" preserve="1">
   <p:cSld name="Title Only">
     <p:spTree>
       <p:nvGrpSpPr>
@@ -2620,7 +2638,8 @@
           <a:p>
             <a:fld id="{BF937137-C3AC-4AD5-BA42-A41A2E6576FB}" type="datetimeFigureOut">
               <a:rPr lang="en-US" smtClean="0"/>
-              <a:t>4/23/2014</a:t>
+              <a:pPr/>
+              <a:t>4/24/14</a:t>
             </a:fld>
             <a:endParaRPr lang="en-US"/>
           </a:p>
@@ -2662,6 +2681,7 @@
           <a:p>
             <a:fld id="{5CD2872D-4AF2-4978-A721-ED14AC57D2B2}" type="slidenum">
               <a:rPr lang="en-US" smtClean="0"/>
+              <a:pPr/>
               <a:t>‹#›</a:t>
             </a:fld>
             <a:endParaRPr lang="en-US"/>
@@ -2677,7 +2697,7 @@
 </file>
 
 <file path=ppt/slideLayouts/slideLayout7.xml><?xml version="1.0" encoding="utf-8"?>
-<p:sldLayout xmlns:a="http://schemas.openxmlformats.org/drawingml/2006/main" xmlns:r="http://schemas.openxmlformats.org/officeDocument/2006/relationships" xmlns:p="http://schemas.openxmlformats.org/presentationml/2006/main" type="blank" preserve="1">
+<p:sldLayout xmlns:a="http://schemas.openxmlformats.org/drawingml/2006/main" xmlns:r="http://schemas.openxmlformats.org/officeDocument/2006/relationships" xmlns:mc="http://schemas.openxmlformats.org/markup-compatibility/2006" xmlns:mv="urn:schemas-microsoft-com:mac:vml" xmlns:p="http://schemas.openxmlformats.org/presentationml/2006/main" mc:Ignorable="mv" mc:PreserveAttributes="mv:*" type="blank" preserve="1">
   <p:cSld name="Blank">
     <p:spTree>
       <p:nvGrpSpPr>
@@ -2710,7 +2730,8 @@
           <a:p>
             <a:fld id="{BF937137-C3AC-4AD5-BA42-A41A2E6576FB}" type="datetimeFigureOut">
               <a:rPr lang="en-US" smtClean="0"/>
-              <a:t>4/23/2014</a:t>
+              <a:pPr/>
+              <a:t>4/24/14</a:t>
             </a:fld>
             <a:endParaRPr lang="en-US"/>
           </a:p>
@@ -2752,6 +2773,7 @@
           <a:p>
             <a:fld id="{5CD2872D-4AF2-4978-A721-ED14AC57D2B2}" type="slidenum">
               <a:rPr lang="en-US" smtClean="0"/>
+              <a:pPr/>
               <a:t>‹#›</a:t>
             </a:fld>
             <a:endParaRPr lang="en-US"/>
@@ -2767,7 +2789,7 @@
 </file>
 
 <file path=ppt/slideLayouts/slideLayout8.xml><?xml version="1.0" encoding="utf-8"?>
-<p:sldLayout xmlns:a="http://schemas.openxmlformats.org/drawingml/2006/main" xmlns:r="http://schemas.openxmlformats.org/officeDocument/2006/relationships" xmlns:p="http://schemas.openxmlformats.org/presentationml/2006/main" type="objTx" preserve="1">
+<p:sldLayout xmlns:a="http://schemas.openxmlformats.org/drawingml/2006/main" xmlns:r="http://schemas.openxmlformats.org/officeDocument/2006/relationships" xmlns:mc="http://schemas.openxmlformats.org/markup-compatibility/2006" xmlns:mv="urn:schemas-microsoft-com:mac:vml" xmlns:p="http://schemas.openxmlformats.org/presentationml/2006/main" mc:Ignorable="mv" mc:PreserveAttributes="mv:*" type="objTx" preserve="1">
   <p:cSld name="Content with Caption">
     <p:spTree>
       <p:nvGrpSpPr>
@@ -2984,7 +3006,8 @@
           <a:p>
             <a:fld id="{BF937137-C3AC-4AD5-BA42-A41A2E6576FB}" type="datetimeFigureOut">
               <a:rPr lang="en-US" smtClean="0"/>
-              <a:t>4/23/2014</a:t>
+              <a:pPr/>
+              <a:t>4/24/14</a:t>
             </a:fld>
             <a:endParaRPr lang="en-US"/>
           </a:p>
@@ -3026,6 +3049,7 @@
           <a:p>
             <a:fld id="{5CD2872D-4AF2-4978-A721-ED14AC57D2B2}" type="slidenum">
               <a:rPr lang="en-US" smtClean="0"/>
+              <a:pPr/>
               <a:t>‹#›</a:t>
             </a:fld>
             <a:endParaRPr lang="en-US"/>
@@ -3076,7 +3100,7 @@
 </file>
 
 <file path=ppt/slideLayouts/slideLayout9.xml><?xml version="1.0" encoding="utf-8"?>
-<p:sldLayout xmlns:a="http://schemas.openxmlformats.org/drawingml/2006/main" xmlns:r="http://schemas.openxmlformats.org/officeDocument/2006/relationships" xmlns:p="http://schemas.openxmlformats.org/presentationml/2006/main" type="picTx" preserve="1">
+<p:sldLayout xmlns:a="http://schemas.openxmlformats.org/drawingml/2006/main" xmlns:r="http://schemas.openxmlformats.org/officeDocument/2006/relationships" xmlns:mc="http://schemas.openxmlformats.org/markup-compatibility/2006" xmlns:mv="urn:schemas-microsoft-com:mac:vml" xmlns:p="http://schemas.openxmlformats.org/presentationml/2006/main" mc:Ignorable="mv" mc:PreserveAttributes="mv:*" type="picTx" preserve="1">
   <p:cSld name="Picture with Caption">
     <p:spTree>
       <p:nvGrpSpPr>
@@ -3289,7 +3313,8 @@
           <a:p>
             <a:fld id="{BF937137-C3AC-4AD5-BA42-A41A2E6576FB}" type="datetimeFigureOut">
               <a:rPr lang="en-US" smtClean="0"/>
-              <a:t>4/23/2014</a:t>
+              <a:pPr/>
+              <a:t>4/24/14</a:t>
             </a:fld>
             <a:endParaRPr lang="en-US"/>
           </a:p>
@@ -3331,6 +3356,7 @@
           <a:p>
             <a:fld id="{5CD2872D-4AF2-4978-A721-ED14AC57D2B2}" type="slidenum">
               <a:rPr lang="en-US" smtClean="0"/>
+              <a:pPr/>
               <a:t>‹#›</a:t>
             </a:fld>
             <a:endParaRPr lang="en-US"/>
@@ -3346,7 +3372,7 @@
 </file>
 
 <file path=ppt/slideMasters/slideMaster1.xml><?xml version="1.0" encoding="utf-8"?>
-<p:sldMaster xmlns:a="http://schemas.openxmlformats.org/drawingml/2006/main" xmlns:r="http://schemas.openxmlformats.org/officeDocument/2006/relationships" xmlns:p="http://schemas.openxmlformats.org/presentationml/2006/main">
+<p:sldMaster xmlns:a="http://schemas.openxmlformats.org/drawingml/2006/main" xmlns:r="http://schemas.openxmlformats.org/officeDocument/2006/relationships" xmlns:mc="http://schemas.openxmlformats.org/markup-compatibility/2006" xmlns:mv="urn:schemas-microsoft-com:mac:vml" xmlns:p="http://schemas.openxmlformats.org/presentationml/2006/main" mc:Ignorable="mv" mc:PreserveAttributes="mv:*">
   <p:cSld>
     <p:bg>
       <p:bgRef idx="1001">
@@ -3587,7 +3613,8 @@
           <a:p>
             <a:fld id="{BF937137-C3AC-4AD5-BA42-A41A2E6576FB}" type="datetimeFigureOut">
               <a:rPr lang="en-US" smtClean="0"/>
-              <a:t>4/23/2014</a:t>
+              <a:pPr/>
+              <a:t>4/24/14</a:t>
             </a:fld>
             <a:endParaRPr lang="en-US"/>
           </a:p>
@@ -3661,6 +3688,7 @@
           <a:p>
             <a:fld id="{5CD2872D-4AF2-4978-A721-ED14AC57D2B2}" type="slidenum">
               <a:rPr lang="en-US" smtClean="0"/>
+              <a:pPr/>
               <a:t>‹#›</a:t>
             </a:fld>
             <a:endParaRPr lang="en-US"/>
@@ -3968,7 +3996,7 @@
 </file>
 
 <file path=ppt/slides/slide1.xml><?xml version="1.0" encoding="utf-8"?>
-<p:sld xmlns:a="http://schemas.openxmlformats.org/drawingml/2006/main" xmlns:r="http://schemas.openxmlformats.org/officeDocument/2006/relationships" xmlns:p="http://schemas.openxmlformats.org/presentationml/2006/main">
+<p:sld xmlns:a="http://schemas.openxmlformats.org/drawingml/2006/main" xmlns:r="http://schemas.openxmlformats.org/officeDocument/2006/relationships" xmlns:mc="http://schemas.openxmlformats.org/markup-compatibility/2006" xmlns:mv="urn:schemas-microsoft-com:mac:vml" xmlns:p="http://schemas.openxmlformats.org/presentationml/2006/main" mc:Ignorable="mv" mc:PreserveAttributes="mv:*">
   <p:cSld>
     <p:spTree>
       <p:nvGrpSpPr>
@@ -4205,7 +4233,7 @@
           <a:blip r:embed="rId2" cstate="print">
             <a:extLst>
               <a:ext uri="{28A0092B-C50C-407E-A947-70E740481C1C}">
-                <a14:useLocalDpi xmlns:a14="http://schemas.microsoft.com/office/drawing/2010/main" val="0"/>
+                <a14:useLocalDpi xmlns:a14="http://schemas.microsoft.com/office/drawing/2010/main" xmlns:p="http://schemas.openxmlformats.org/presentationml/2006/main" xmlns:r="http://schemas.openxmlformats.org/officeDocument/2006/relationships" xmlns:a="http://schemas.openxmlformats.org/drawingml/2006/main" xmlns="" val="0"/>
               </a:ext>
             </a:extLst>
           </a:blip>
@@ -4225,7 +4253,7 @@
           <a:noFill/>
           <a:extLst>
             <a:ext uri="{909E8E84-426E-40DD-AFC4-6F175D3DCCD1}">
-              <a14:hiddenFill xmlns:a14="http://schemas.microsoft.com/office/drawing/2010/main">
+              <a14:hiddenFill xmlns:a14="http://schemas.microsoft.com/office/drawing/2010/main" xmlns:p="http://schemas.openxmlformats.org/presentationml/2006/main" xmlns:r="http://schemas.openxmlformats.org/officeDocument/2006/relationships" xmlns:a="http://schemas.openxmlformats.org/drawingml/2006/main" xmlns="">
                 <a:solidFill>
                   <a:srgbClr val="FFFFFF"/>
                 </a:solidFill>
@@ -4237,7 +4265,7 @@
     </p:spTree>
     <p:extLst>
       <p:ext uri="{BB962C8B-B14F-4D97-AF65-F5344CB8AC3E}">
-        <p14:creationId xmlns:p14="http://schemas.microsoft.com/office/powerpoint/2010/main" val="378752242"/>
+        <p14:creationId xmlns:p14="http://schemas.microsoft.com/office/powerpoint/2010/main" xmlns:p="http://schemas.openxmlformats.org/presentationml/2006/main" xmlns:r="http://schemas.openxmlformats.org/officeDocument/2006/relationships" xmlns:a="http://schemas.openxmlformats.org/drawingml/2006/main" xmlns="" val="378752242"/>
       </p:ext>
     </p:extLst>
   </p:cSld>
@@ -4248,7 +4276,7 @@
 </file>
 
 <file path=ppt/slides/slide10.xml><?xml version="1.0" encoding="utf-8"?>
-<p:sld xmlns:a="http://schemas.openxmlformats.org/drawingml/2006/main" xmlns:r="http://schemas.openxmlformats.org/officeDocument/2006/relationships" xmlns:p="http://schemas.openxmlformats.org/presentationml/2006/main">
+<p:sld xmlns:a="http://schemas.openxmlformats.org/drawingml/2006/main" xmlns:r="http://schemas.openxmlformats.org/officeDocument/2006/relationships" xmlns:mc="http://schemas.openxmlformats.org/markup-compatibility/2006" xmlns:mv="urn:schemas-microsoft-com:mac:vml" xmlns:p="http://schemas.openxmlformats.org/presentationml/2006/main" mc:Ignorable="mv" mc:PreserveAttributes="mv:*">
   <p:cSld>
     <p:spTree>
       <p:nvGrpSpPr>
@@ -4365,7 +4393,7 @@
     </p:spTree>
     <p:extLst>
       <p:ext uri="{BB962C8B-B14F-4D97-AF65-F5344CB8AC3E}">
-        <p14:creationId xmlns:p14="http://schemas.microsoft.com/office/powerpoint/2010/main" val="4040071344"/>
+        <p14:creationId xmlns:p14="http://schemas.microsoft.com/office/powerpoint/2010/main" xmlns:p="http://schemas.openxmlformats.org/presentationml/2006/main" xmlns:r="http://schemas.openxmlformats.org/officeDocument/2006/relationships" xmlns:a="http://schemas.openxmlformats.org/drawingml/2006/main" xmlns="" val="4040071344"/>
       </p:ext>
     </p:extLst>
   </p:cSld>
@@ -4383,7 +4411,7 @@
 </file>
 
 <file path=ppt/slides/slide11.xml><?xml version="1.0" encoding="utf-8"?>
-<p:sld xmlns:a="http://schemas.openxmlformats.org/drawingml/2006/main" xmlns:r="http://schemas.openxmlformats.org/officeDocument/2006/relationships" xmlns:p="http://schemas.openxmlformats.org/presentationml/2006/main">
+<p:sld xmlns:a="http://schemas.openxmlformats.org/drawingml/2006/main" xmlns:r="http://schemas.openxmlformats.org/officeDocument/2006/relationships" xmlns:mc="http://schemas.openxmlformats.org/markup-compatibility/2006" xmlns:mv="urn:schemas-microsoft-com:mac:vml" xmlns:p="http://schemas.openxmlformats.org/presentationml/2006/main" mc:Ignorable="mv" mc:PreserveAttributes="mv:*">
   <p:cSld>
     <p:spTree>
       <p:nvGrpSpPr>
@@ -4552,7 +4580,7 @@
     </p:spTree>
     <p:extLst>
       <p:ext uri="{BB962C8B-B14F-4D97-AF65-F5344CB8AC3E}">
-        <p14:creationId xmlns:p14="http://schemas.microsoft.com/office/powerpoint/2010/main" val="3030518069"/>
+        <p14:creationId xmlns:p14="http://schemas.microsoft.com/office/powerpoint/2010/main" xmlns:p="http://schemas.openxmlformats.org/presentationml/2006/main" xmlns:r="http://schemas.openxmlformats.org/officeDocument/2006/relationships" xmlns:a="http://schemas.openxmlformats.org/drawingml/2006/main" xmlns="" val="3030518069"/>
       </p:ext>
     </p:extLst>
   </p:cSld>
@@ -4570,7 +4598,7 @@
 </file>
 
 <file path=ppt/slides/slide12.xml><?xml version="1.0" encoding="utf-8"?>
-<p:sld xmlns:a="http://schemas.openxmlformats.org/drawingml/2006/main" xmlns:r="http://schemas.openxmlformats.org/officeDocument/2006/relationships" xmlns:p="http://schemas.openxmlformats.org/presentationml/2006/main">
+<p:sld xmlns:a="http://schemas.openxmlformats.org/drawingml/2006/main" xmlns:r="http://schemas.openxmlformats.org/officeDocument/2006/relationships" xmlns:mc="http://schemas.openxmlformats.org/markup-compatibility/2006" xmlns:mv="urn:schemas-microsoft-com:mac:vml" xmlns:p="http://schemas.openxmlformats.org/presentationml/2006/main" mc:Ignorable="mv" mc:PreserveAttributes="mv:*">
   <p:cSld>
     <p:spTree>
       <p:nvGrpSpPr>
@@ -4769,7 +4797,7 @@
     </p:spTree>
     <p:extLst>
       <p:ext uri="{BB962C8B-B14F-4D97-AF65-F5344CB8AC3E}">
-        <p14:creationId xmlns:p14="http://schemas.microsoft.com/office/powerpoint/2010/main" val="994255640"/>
+        <p14:creationId xmlns:p14="http://schemas.microsoft.com/office/powerpoint/2010/main" xmlns:p="http://schemas.openxmlformats.org/presentationml/2006/main" xmlns:r="http://schemas.openxmlformats.org/officeDocument/2006/relationships" xmlns:a="http://schemas.openxmlformats.org/drawingml/2006/main" xmlns="" val="994255640"/>
       </p:ext>
     </p:extLst>
   </p:cSld>
@@ -4787,7 +4815,7 @@
 </file>
 
 <file path=ppt/slides/slide13.xml><?xml version="1.0" encoding="utf-8"?>
-<p:sld xmlns:a="http://schemas.openxmlformats.org/drawingml/2006/main" xmlns:r="http://schemas.openxmlformats.org/officeDocument/2006/relationships" xmlns:p="http://schemas.openxmlformats.org/presentationml/2006/main">
+<p:sld xmlns:a="http://schemas.openxmlformats.org/drawingml/2006/main" xmlns:r="http://schemas.openxmlformats.org/officeDocument/2006/relationships" xmlns:mc="http://schemas.openxmlformats.org/markup-compatibility/2006" xmlns:mv="urn:schemas-microsoft-com:mac:vml" xmlns:p="http://schemas.openxmlformats.org/presentationml/2006/main" mc:Ignorable="mv" mc:PreserveAttributes="mv:*">
   <p:cSld>
     <p:spTree>
       <p:nvGrpSpPr>
@@ -4840,7 +4868,7 @@
         <p:spPr/>
         <p:txBody>
           <a:bodyPr>
-            <a:normAutofit lnSpcReduction="10000"/>
+            <a:normAutofit/>
           </a:bodyPr>
           <a:lstStyle/>
           <a:p>
@@ -4931,21 +4959,20 @@
               <a:t>income</a:t>
             </a:r>
             <a:r>
-              <a:rPr lang="en-US" sz="2800" dirty="0"/>
+              <a:rPr lang="en-US" dirty="0"/>
               <a:t> </a:t>
             </a:r>
             <a:r>
-              <a:rPr lang="en-US" sz="2800" dirty="0" smtClean="0"/>
+              <a:rPr lang="en-US" dirty="0" smtClean="0"/>
               <a:t>(we ignored NAs and averaged in negatives).</a:t>
             </a:r>
-            <a:endParaRPr lang="en-US" dirty="0" smtClean="0"/>
           </a:p>
         </p:txBody>
       </p:sp>
     </p:spTree>
     <p:extLst>
       <p:ext uri="{BB962C8B-B14F-4D97-AF65-F5344CB8AC3E}">
-        <p14:creationId xmlns:p14="http://schemas.microsoft.com/office/powerpoint/2010/main" val="562526258"/>
+        <p14:creationId xmlns:p14="http://schemas.microsoft.com/office/powerpoint/2010/main" xmlns:p="http://schemas.openxmlformats.org/presentationml/2006/main" xmlns:r="http://schemas.openxmlformats.org/officeDocument/2006/relationships" xmlns:a="http://schemas.openxmlformats.org/drawingml/2006/main" xmlns="" val="562526258"/>
       </p:ext>
     </p:extLst>
   </p:cSld>
@@ -4963,7 +4990,7 @@
 </file>
 
 <file path=ppt/slides/slide14.xml><?xml version="1.0" encoding="utf-8"?>
-<p:sld xmlns:a="http://schemas.openxmlformats.org/drawingml/2006/main" xmlns:r="http://schemas.openxmlformats.org/officeDocument/2006/relationships" xmlns:p="http://schemas.openxmlformats.org/presentationml/2006/main">
+<p:sld xmlns:a="http://schemas.openxmlformats.org/drawingml/2006/main" xmlns:r="http://schemas.openxmlformats.org/officeDocument/2006/relationships" xmlns:mc="http://schemas.openxmlformats.org/markup-compatibility/2006" xmlns:mv="urn:schemas-microsoft-com:mac:vml" xmlns:p="http://schemas.openxmlformats.org/presentationml/2006/main" mc:Ignorable="mv" mc:PreserveAttributes="mv:*">
   <p:cSld>
     <p:spTree>
       <p:nvGrpSpPr>
@@ -5088,7 +5115,7 @@
     </p:spTree>
     <p:extLst>
       <p:ext uri="{BB962C8B-B14F-4D97-AF65-F5344CB8AC3E}">
-        <p14:creationId xmlns:p14="http://schemas.microsoft.com/office/powerpoint/2010/main" val="2577069204"/>
+        <p14:creationId xmlns:p14="http://schemas.microsoft.com/office/powerpoint/2010/main" xmlns:p="http://schemas.openxmlformats.org/presentationml/2006/main" xmlns:r="http://schemas.openxmlformats.org/officeDocument/2006/relationships" xmlns:a="http://schemas.openxmlformats.org/drawingml/2006/main" xmlns="" val="2577069204"/>
       </p:ext>
     </p:extLst>
   </p:cSld>
@@ -5106,7 +5133,7 @@
 </file>
 
 <file path=ppt/slides/slide2.xml><?xml version="1.0" encoding="utf-8"?>
-<p:sld xmlns:a="http://schemas.openxmlformats.org/drawingml/2006/main" xmlns:r="http://schemas.openxmlformats.org/officeDocument/2006/relationships" xmlns:p="http://schemas.openxmlformats.org/presentationml/2006/main">
+<p:sld xmlns:a="http://schemas.openxmlformats.org/drawingml/2006/main" xmlns:r="http://schemas.openxmlformats.org/officeDocument/2006/relationships" xmlns:mc="http://schemas.openxmlformats.org/markup-compatibility/2006" xmlns:mv="urn:schemas-microsoft-com:mac:vml" xmlns:p="http://schemas.openxmlformats.org/presentationml/2006/main" mc:Ignorable="mv" mc:PreserveAttributes="mv:*">
   <p:cSld>
     <p:spTree>
       <p:nvGrpSpPr>
@@ -5229,7 +5256,7 @@
     </p:spTree>
     <p:extLst>
       <p:ext uri="{BB962C8B-B14F-4D97-AF65-F5344CB8AC3E}">
-        <p14:creationId xmlns:p14="http://schemas.microsoft.com/office/powerpoint/2010/main" val="4158567981"/>
+        <p14:creationId xmlns:p14="http://schemas.microsoft.com/office/powerpoint/2010/main" xmlns:p="http://schemas.openxmlformats.org/presentationml/2006/main" xmlns:r="http://schemas.openxmlformats.org/officeDocument/2006/relationships" xmlns:a="http://schemas.openxmlformats.org/drawingml/2006/main" xmlns="" val="4158567981"/>
       </p:ext>
     </p:extLst>
   </p:cSld>
@@ -5240,7 +5267,7 @@
 </file>
 
 <file path=ppt/slides/slide3.xml><?xml version="1.0" encoding="utf-8"?>
-<p:sld xmlns:a="http://schemas.openxmlformats.org/drawingml/2006/main" xmlns:r="http://schemas.openxmlformats.org/officeDocument/2006/relationships" xmlns:p="http://schemas.openxmlformats.org/presentationml/2006/main">
+<p:sld xmlns:a="http://schemas.openxmlformats.org/drawingml/2006/main" xmlns:r="http://schemas.openxmlformats.org/officeDocument/2006/relationships" xmlns:mc="http://schemas.openxmlformats.org/markup-compatibility/2006" xmlns:mv="urn:schemas-microsoft-com:mac:vml" xmlns:p="http://schemas.openxmlformats.org/presentationml/2006/main" mc:Ignorable="mv" mc:PreserveAttributes="mv:*">
   <p:cSld>
     <p:spTree>
       <p:nvGrpSpPr>
@@ -5412,7 +5439,7 @@
     </p:spTree>
     <p:extLst>
       <p:ext uri="{BB962C8B-B14F-4D97-AF65-F5344CB8AC3E}">
-        <p14:creationId xmlns:p14="http://schemas.microsoft.com/office/powerpoint/2010/main" val="76887766"/>
+        <p14:creationId xmlns:p14="http://schemas.microsoft.com/office/powerpoint/2010/main" xmlns:p="http://schemas.openxmlformats.org/presentationml/2006/main" xmlns:r="http://schemas.openxmlformats.org/officeDocument/2006/relationships" xmlns:a="http://schemas.openxmlformats.org/drawingml/2006/main" xmlns="" val="76887766"/>
       </p:ext>
     </p:extLst>
   </p:cSld>
@@ -5423,7 +5450,7 @@
 </file>
 
 <file path=ppt/slides/slide4.xml><?xml version="1.0" encoding="utf-8"?>
-<p:sld xmlns:a="http://schemas.openxmlformats.org/drawingml/2006/main" xmlns:r="http://schemas.openxmlformats.org/officeDocument/2006/relationships" xmlns:p="http://schemas.openxmlformats.org/presentationml/2006/main">
+<p:sld xmlns:a="http://schemas.openxmlformats.org/drawingml/2006/main" xmlns:r="http://schemas.openxmlformats.org/officeDocument/2006/relationships" xmlns:mc="http://schemas.openxmlformats.org/markup-compatibility/2006" xmlns:mv="urn:schemas-microsoft-com:mac:vml" xmlns:p="http://schemas.openxmlformats.org/presentationml/2006/main" mc:Ignorable="mv" mc:PreserveAttributes="mv:*">
   <p:cSld>
     <p:spTree>
       <p:nvGrpSpPr>
@@ -5499,7 +5526,7 @@
     </p:spTree>
     <p:extLst>
       <p:ext uri="{BB962C8B-B14F-4D97-AF65-F5344CB8AC3E}">
-        <p14:creationId xmlns:p14="http://schemas.microsoft.com/office/powerpoint/2010/main" val="1996770165"/>
+        <p14:creationId xmlns:p14="http://schemas.microsoft.com/office/powerpoint/2010/main" xmlns:p="http://schemas.openxmlformats.org/presentationml/2006/main" xmlns:r="http://schemas.openxmlformats.org/officeDocument/2006/relationships" xmlns:a="http://schemas.openxmlformats.org/drawingml/2006/main" xmlns="" val="1996770165"/>
       </p:ext>
     </p:extLst>
   </p:cSld>
@@ -5517,7 +5544,7 @@
 </file>
 
 <file path=ppt/slides/slide5.xml><?xml version="1.0" encoding="utf-8"?>
-<p:sld xmlns:a="http://schemas.openxmlformats.org/drawingml/2006/main" xmlns:r="http://schemas.openxmlformats.org/officeDocument/2006/relationships" xmlns:p="http://schemas.openxmlformats.org/presentationml/2006/main">
+<p:sld xmlns:a="http://schemas.openxmlformats.org/drawingml/2006/main" xmlns:r="http://schemas.openxmlformats.org/officeDocument/2006/relationships" xmlns:mc="http://schemas.openxmlformats.org/markup-compatibility/2006" xmlns:mv="urn:schemas-microsoft-com:mac:vml" xmlns:p="http://schemas.openxmlformats.org/presentationml/2006/main" mc:Ignorable="mv" mc:PreserveAttributes="mv:*">
   <p:cSld>
     <p:spTree>
       <p:nvGrpSpPr>
@@ -5704,7 +5731,7 @@
           <a:blip r:embed="rId2">
             <a:extLst>
               <a:ext uri="{28A0092B-C50C-407E-A947-70E740481C1C}">
-                <a14:useLocalDpi xmlns:a14="http://schemas.microsoft.com/office/drawing/2010/main" val="0"/>
+                <a14:useLocalDpi xmlns:a14="http://schemas.microsoft.com/office/drawing/2010/main" xmlns:p="http://schemas.openxmlformats.org/presentationml/2006/main" xmlns:r="http://schemas.openxmlformats.org/officeDocument/2006/relationships" xmlns:a="http://schemas.openxmlformats.org/drawingml/2006/main" xmlns="" val="0"/>
               </a:ext>
             </a:extLst>
           </a:blip>
@@ -5725,14 +5752,14 @@
           </a:ln>
           <a:extLst>
             <a:ext uri="{909E8E84-426E-40DD-AFC4-6F175D3DCCD1}">
-              <a14:hiddenFill xmlns:a14="http://schemas.microsoft.com/office/drawing/2010/main">
+              <a14:hiddenFill xmlns:a14="http://schemas.microsoft.com/office/drawing/2010/main" xmlns:p="http://schemas.openxmlformats.org/presentationml/2006/main" xmlns:r="http://schemas.openxmlformats.org/officeDocument/2006/relationships" xmlns:a="http://schemas.openxmlformats.org/drawingml/2006/main" xmlns="">
                 <a:solidFill>
                   <a:schemeClr val="accent1"/>
                 </a:solidFill>
               </a14:hiddenFill>
             </a:ext>
             <a:ext uri="{91240B29-F687-4F45-9708-019B960494DF}">
-              <a14:hiddenLine xmlns:a14="http://schemas.microsoft.com/office/drawing/2010/main" w="9525">
+              <a14:hiddenLine xmlns:a14="http://schemas.microsoft.com/office/drawing/2010/main" xmlns:p="http://schemas.openxmlformats.org/presentationml/2006/main" xmlns:r="http://schemas.openxmlformats.org/officeDocument/2006/relationships" xmlns:a="http://schemas.openxmlformats.org/drawingml/2006/main" xmlns="" w="9525">
                 <a:solidFill>
                   <a:schemeClr val="tx1"/>
                 </a:solidFill>
@@ -5789,7 +5816,7 @@
     </p:spTree>
     <p:extLst>
       <p:ext uri="{BB962C8B-B14F-4D97-AF65-F5344CB8AC3E}">
-        <p14:creationId xmlns:p14="http://schemas.microsoft.com/office/powerpoint/2010/main" val="177926487"/>
+        <p14:creationId xmlns:p14="http://schemas.microsoft.com/office/powerpoint/2010/main" xmlns:p="http://schemas.openxmlformats.org/presentationml/2006/main" xmlns:r="http://schemas.openxmlformats.org/officeDocument/2006/relationships" xmlns:a="http://schemas.openxmlformats.org/drawingml/2006/main" xmlns="" val="177926487"/>
       </p:ext>
     </p:extLst>
   </p:cSld>
@@ -5800,7 +5827,7 @@
 </file>
 
 <file path=ppt/slides/slide6.xml><?xml version="1.0" encoding="utf-8"?>
-<p:sld xmlns:a="http://schemas.openxmlformats.org/drawingml/2006/main" xmlns:r="http://schemas.openxmlformats.org/officeDocument/2006/relationships" xmlns:p="http://schemas.openxmlformats.org/presentationml/2006/main">
+<p:sld xmlns:a="http://schemas.openxmlformats.org/drawingml/2006/main" xmlns:r="http://schemas.openxmlformats.org/officeDocument/2006/relationships" xmlns:mc="http://schemas.openxmlformats.org/markup-compatibility/2006" xmlns:mv="urn:schemas-microsoft-com:mac:vml" xmlns:p="http://schemas.openxmlformats.org/presentationml/2006/main" mc:Ignorable="mv" mc:PreserveAttributes="mv:*">
   <p:cSld>
     <p:spTree>
       <p:nvGrpSpPr>
@@ -5987,7 +6014,7 @@
           <a:blip r:embed="rId2">
             <a:extLst>
               <a:ext uri="{28A0092B-C50C-407E-A947-70E740481C1C}">
-                <a14:useLocalDpi xmlns:a14="http://schemas.microsoft.com/office/drawing/2010/main" val="0"/>
+                <a14:useLocalDpi xmlns:a14="http://schemas.microsoft.com/office/drawing/2010/main" xmlns:p="http://schemas.openxmlformats.org/presentationml/2006/main" xmlns:r="http://schemas.openxmlformats.org/officeDocument/2006/relationships" xmlns:a="http://schemas.openxmlformats.org/drawingml/2006/main" xmlns="" val="0"/>
               </a:ext>
             </a:extLst>
           </a:blip>
@@ -6008,14 +6035,14 @@
           </a:ln>
           <a:extLst>
             <a:ext uri="{909E8E84-426E-40DD-AFC4-6F175D3DCCD1}">
-              <a14:hiddenFill xmlns:a14="http://schemas.microsoft.com/office/drawing/2010/main">
+              <a14:hiddenFill xmlns:a14="http://schemas.microsoft.com/office/drawing/2010/main" xmlns:p="http://schemas.openxmlformats.org/presentationml/2006/main" xmlns:r="http://schemas.openxmlformats.org/officeDocument/2006/relationships" xmlns:a="http://schemas.openxmlformats.org/drawingml/2006/main" xmlns="">
                 <a:solidFill>
                   <a:schemeClr val="accent1"/>
                 </a:solidFill>
               </a14:hiddenFill>
             </a:ext>
             <a:ext uri="{91240B29-F687-4F45-9708-019B960494DF}">
-              <a14:hiddenLine xmlns:a14="http://schemas.microsoft.com/office/drawing/2010/main" w="9525">
+              <a14:hiddenLine xmlns:a14="http://schemas.microsoft.com/office/drawing/2010/main" xmlns:p="http://schemas.openxmlformats.org/presentationml/2006/main" xmlns:r="http://schemas.openxmlformats.org/officeDocument/2006/relationships" xmlns:a="http://schemas.openxmlformats.org/drawingml/2006/main" xmlns="" w="9525">
                 <a:solidFill>
                   <a:schemeClr val="tx1"/>
                 </a:solidFill>
@@ -6030,7 +6057,7 @@
     </p:spTree>
     <p:extLst>
       <p:ext uri="{BB962C8B-B14F-4D97-AF65-F5344CB8AC3E}">
-        <p14:creationId xmlns:p14="http://schemas.microsoft.com/office/powerpoint/2010/main" val="3745031302"/>
+        <p14:creationId xmlns:p14="http://schemas.microsoft.com/office/powerpoint/2010/main" xmlns:p="http://schemas.openxmlformats.org/presentationml/2006/main" xmlns:r="http://schemas.openxmlformats.org/officeDocument/2006/relationships" xmlns:a="http://schemas.openxmlformats.org/drawingml/2006/main" xmlns="" val="3745031302"/>
       </p:ext>
     </p:extLst>
   </p:cSld>
@@ -6041,7 +6068,7 @@
 </file>
 
 <file path=ppt/slides/slide7.xml><?xml version="1.0" encoding="utf-8"?>
-<p:sld xmlns:a="http://schemas.openxmlformats.org/drawingml/2006/main" xmlns:r="http://schemas.openxmlformats.org/officeDocument/2006/relationships" xmlns:p="http://schemas.openxmlformats.org/presentationml/2006/main">
+<p:sld xmlns:a="http://schemas.openxmlformats.org/drawingml/2006/main" xmlns:r="http://schemas.openxmlformats.org/officeDocument/2006/relationships" xmlns:mc="http://schemas.openxmlformats.org/markup-compatibility/2006" xmlns:mv="urn:schemas-microsoft-com:mac:vml" xmlns:p="http://schemas.openxmlformats.org/presentationml/2006/main" mc:Ignorable="mv" mc:PreserveAttributes="mv:*">
   <p:cSld>
     <p:spTree>
       <p:nvGrpSpPr>
@@ -6224,7 +6251,7 @@
           <a:blip r:embed="rId2">
             <a:extLst>
               <a:ext uri="{28A0092B-C50C-407E-A947-70E740481C1C}">
-                <a14:useLocalDpi xmlns:a14="http://schemas.microsoft.com/office/drawing/2010/main" val="0"/>
+                <a14:useLocalDpi xmlns:a14="http://schemas.microsoft.com/office/drawing/2010/main" xmlns:p="http://schemas.openxmlformats.org/presentationml/2006/main" xmlns:r="http://schemas.openxmlformats.org/officeDocument/2006/relationships" xmlns:a="http://schemas.openxmlformats.org/drawingml/2006/main" xmlns="" val="0"/>
               </a:ext>
             </a:extLst>
           </a:blip>
@@ -6247,14 +6274,14 @@
           </a:ln>
           <a:extLst>
             <a:ext uri="{909E8E84-426E-40DD-AFC4-6F175D3DCCD1}">
-              <a14:hiddenFill xmlns:a14="http://schemas.microsoft.com/office/drawing/2010/main">
+              <a14:hiddenFill xmlns:a14="http://schemas.microsoft.com/office/drawing/2010/main" xmlns:p="http://schemas.openxmlformats.org/presentationml/2006/main" xmlns:r="http://schemas.openxmlformats.org/officeDocument/2006/relationships" xmlns:a="http://schemas.openxmlformats.org/drawingml/2006/main" xmlns="">
                 <a:solidFill>
                   <a:schemeClr val="accent1"/>
                 </a:solidFill>
               </a14:hiddenFill>
             </a:ext>
             <a:ext uri="{91240B29-F687-4F45-9708-019B960494DF}">
-              <a14:hiddenLine xmlns:a14="http://schemas.microsoft.com/office/drawing/2010/main" w="9525">
+              <a14:hiddenLine xmlns:a14="http://schemas.microsoft.com/office/drawing/2010/main" xmlns:p="http://schemas.openxmlformats.org/presentationml/2006/main" xmlns:r="http://schemas.openxmlformats.org/officeDocument/2006/relationships" xmlns:a="http://schemas.openxmlformats.org/drawingml/2006/main" xmlns="" w="9525">
                 <a:solidFill>
                   <a:schemeClr val="tx1"/>
                 </a:solidFill>
@@ -6269,7 +6296,7 @@
     </p:spTree>
     <p:extLst>
       <p:ext uri="{BB962C8B-B14F-4D97-AF65-F5344CB8AC3E}">
-        <p14:creationId xmlns:p14="http://schemas.microsoft.com/office/powerpoint/2010/main" val="453767130"/>
+        <p14:creationId xmlns:p14="http://schemas.microsoft.com/office/powerpoint/2010/main" xmlns:p="http://schemas.openxmlformats.org/presentationml/2006/main" xmlns:r="http://schemas.openxmlformats.org/officeDocument/2006/relationships" xmlns:a="http://schemas.openxmlformats.org/drawingml/2006/main" xmlns="" val="453767130"/>
       </p:ext>
     </p:extLst>
   </p:cSld>
@@ -6280,7 +6307,7 @@
 </file>
 
 <file path=ppt/slides/slide8.xml><?xml version="1.0" encoding="utf-8"?>
-<p:sld xmlns:a="http://schemas.openxmlformats.org/drawingml/2006/main" xmlns:r="http://schemas.openxmlformats.org/officeDocument/2006/relationships" xmlns:p="http://schemas.openxmlformats.org/presentationml/2006/main">
+<p:sld xmlns:a="http://schemas.openxmlformats.org/drawingml/2006/main" xmlns:r="http://schemas.openxmlformats.org/officeDocument/2006/relationships" xmlns:mc="http://schemas.openxmlformats.org/markup-compatibility/2006" xmlns:mv="urn:schemas-microsoft-com:mac:vml" xmlns:p="http://schemas.openxmlformats.org/presentationml/2006/main" mc:Ignorable="mv" mc:PreserveAttributes="mv:*">
   <p:cSld>
     <p:spTree>
       <p:nvGrpSpPr>
@@ -6308,19 +6335,19 @@
           <a:blip r:embed="rId2">
             <a:extLst>
               <a:ext uri="{28A0092B-C50C-407E-A947-70E740481C1C}">
-                <a14:useLocalDpi xmlns:a14="http://schemas.microsoft.com/office/drawing/2010/main" val="0"/>
+                <a14:useLocalDpi xmlns:a14="http://schemas.microsoft.com/office/drawing/2010/main" xmlns:p="http://schemas.openxmlformats.org/presentationml/2006/main" xmlns:r="http://schemas.openxmlformats.org/officeDocument/2006/relationships" xmlns:a="http://schemas.openxmlformats.org/drawingml/2006/main" xmlns="" val="0"/>
               </a:ext>
             </a:extLst>
           </a:blip>
-          <a:srcRect/>
+          <a:srcRect t="5443" b="8558"/>
           <a:stretch>
             <a:fillRect/>
           </a:stretch>
         </p:blipFill>
         <p:spPr bwMode="auto">
           <a:xfrm>
-            <a:off x="1143000" y="152400"/>
-            <a:ext cx="7010400" cy="6999852"/>
+            <a:off x="1143000" y="533400"/>
+            <a:ext cx="7010400" cy="6019800"/>
           </a:xfrm>
           <a:prstGeom prst="rect">
             <a:avLst/>
@@ -6333,7 +6360,7 @@
           </a:ln>
           <a:extLst>
             <a:ext uri="{91240B29-F687-4F45-9708-019B960494DF}">
-              <a14:hiddenLine xmlns:a14="http://schemas.microsoft.com/office/drawing/2010/main" w="9525">
+              <a14:hiddenLine xmlns:a14="http://schemas.microsoft.com/office/drawing/2010/main" xmlns:p="http://schemas.openxmlformats.org/presentationml/2006/main" xmlns:r="http://schemas.openxmlformats.org/officeDocument/2006/relationships" xmlns:a="http://schemas.openxmlformats.org/drawingml/2006/main" xmlns="" w="9525">
                 <a:solidFill>
                   <a:srgbClr val="000000"/>
                 </a:solidFill>
@@ -6377,7 +6404,7 @@
     </p:spTree>
     <p:extLst>
       <p:ext uri="{BB962C8B-B14F-4D97-AF65-F5344CB8AC3E}">
-        <p14:creationId xmlns:p14="http://schemas.microsoft.com/office/powerpoint/2010/main" val="1609376233"/>
+        <p14:creationId xmlns:p14="http://schemas.microsoft.com/office/powerpoint/2010/main" xmlns:p="http://schemas.openxmlformats.org/presentationml/2006/main" xmlns:r="http://schemas.openxmlformats.org/officeDocument/2006/relationships" xmlns:a="http://schemas.openxmlformats.org/drawingml/2006/main" xmlns="" val="1609376233"/>
       </p:ext>
     </p:extLst>
   </p:cSld>
@@ -6388,7 +6415,7 @@
 </file>
 
 <file path=ppt/slides/slide9.xml><?xml version="1.0" encoding="utf-8"?>
-<p:sld xmlns:a="http://schemas.openxmlformats.org/drawingml/2006/main" xmlns:r="http://schemas.openxmlformats.org/officeDocument/2006/relationships" xmlns:p="http://schemas.openxmlformats.org/presentationml/2006/main">
+<p:sld xmlns:a="http://schemas.openxmlformats.org/drawingml/2006/main" xmlns:r="http://schemas.openxmlformats.org/officeDocument/2006/relationships" xmlns:mc="http://schemas.openxmlformats.org/markup-compatibility/2006" xmlns:mv="urn:schemas-microsoft-com:mac:vml" xmlns:p="http://schemas.openxmlformats.org/presentationml/2006/main" mc:Ignorable="mv" mc:PreserveAttributes="mv:*">
   <p:cSld>
     <p:spTree>
       <p:nvGrpSpPr>
@@ -6404,76 +6431,58 @@
           <a:chExt cx="0" cy="0"/>
         </a:xfrm>
       </p:grpSpPr>
+      <p:sp>
+        <p:nvSpPr>
+          <p:cNvPr id="3" name="Title 1"/>
+          <p:cNvSpPr>
+            <a:spLocks noGrp="1"/>
+          </p:cNvSpPr>
+          <p:nvPr>
+            <p:ph type="title"/>
+          </p:nvPr>
+        </p:nvSpPr>
+        <p:spPr/>
+        <p:txBody>
+          <a:bodyPr/>
+          <a:lstStyle/>
+          <a:p>
+            <a:pPr algn="ctr"/>
+            <a:r>
+              <a:rPr lang="en-US" dirty="0" smtClean="0"/>
+              <a:t>Findings</a:t>
+            </a:r>
+            <a:endParaRPr lang="en-US" dirty="0"/>
+          </a:p>
+        </p:txBody>
+      </p:sp>
       <p:pic>
         <p:nvPicPr>
-          <p:cNvPr id="5" name="Content Placeholder 4" descr="https://github.com/andy-olstad/599-POGS/blob/master/Line%20graph.png?raw=true"/>
+          <p:cNvPr id="10" name="Picture 9" descr="Rplot.png"/>
           <p:cNvPicPr>
-            <a:picLocks noGrp="1"/>
+            <a:picLocks noChangeAspect="1"/>
           </p:cNvPicPr>
-          <p:nvPr>
-            <p:ph idx="1"/>
-          </p:nvPr>
+          <p:nvPr/>
         </p:nvPicPr>
         <p:blipFill>
-          <a:blip r:embed="rId3" cstate="print">
-            <a:extLst>
-              <a:ext uri="{28A0092B-C50C-407E-A947-70E740481C1C}">
-                <a14:useLocalDpi xmlns:a14="http://schemas.microsoft.com/office/drawing/2010/main" val="0"/>
-              </a:ext>
-            </a:extLst>
-          </a:blip>
-          <a:srcRect/>
+          <a:blip r:embed="rId3"/>
           <a:stretch>
             <a:fillRect/>
           </a:stretch>
         </p:blipFill>
-        <p:spPr bwMode="auto">
+        <p:spPr>
           <a:xfrm>
-            <a:off x="152400" y="1219200"/>
-            <a:ext cx="8991600" cy="4724400"/>
+            <a:off x="0" y="1295400"/>
+            <a:ext cx="9144000" cy="5494465"/>
           </a:xfrm>
           <a:prstGeom prst="rect">
             <a:avLst/>
           </a:prstGeom>
-          <a:noFill/>
-          <a:ln>
-            <a:noFill/>
-          </a:ln>
         </p:spPr>
       </p:pic>
-      <p:sp>
-        <p:nvSpPr>
-          <p:cNvPr id="3" name="Title 1"/>
-          <p:cNvSpPr>
-            <a:spLocks noGrp="1"/>
-          </p:cNvSpPr>
-          <p:nvPr>
-            <p:ph type="title"/>
-          </p:nvPr>
-        </p:nvSpPr>
-        <p:spPr>
-          <a:xfrm>
-            <a:off x="533400" y="533400"/>
-            <a:ext cx="8229600" cy="990600"/>
-          </a:xfrm>
-        </p:spPr>
-        <p:txBody>
-          <a:bodyPr/>
-          <a:lstStyle/>
-          <a:p>
-            <a:pPr algn="ctr"/>
-            <a:r>
-              <a:rPr lang="en-US" dirty="0" smtClean="0"/>
-              <a:t>Findings</a:t>
-            </a:r>
-            <a:endParaRPr lang="en-US" dirty="0"/>
-          </a:p>
-        </p:txBody>
-      </p:sp>
     </p:spTree>
     <p:extLst>
       <p:ext uri="{BB962C8B-B14F-4D97-AF65-F5344CB8AC3E}">
-        <p14:creationId xmlns:p14="http://schemas.microsoft.com/office/powerpoint/2010/main" val="159895881"/>
+        <p14:creationId xmlns:p14="http://schemas.microsoft.com/office/powerpoint/2010/main" xmlns:p="http://schemas.openxmlformats.org/presentationml/2006/main" xmlns:r="http://schemas.openxmlformats.org/officeDocument/2006/relationships" xmlns:a="http://schemas.openxmlformats.org/drawingml/2006/main" xmlns="" val="159895881"/>
       </p:ext>
     </p:extLst>
   </p:cSld>

</xml_diff>

<commit_message>
Andy added maps with more colors
</commit_message>
<xml_diff>
--- a/Project 1 Powerpoint Jasmine Edit.pptx
+++ b/Project 1 Powerpoint Jasmine Edit.pptx
@@ -5,22 +5,26 @@
     <p:sldMasterId id="2147483672" r:id="rId1"/>
   </p:sldMasterIdLst>
   <p:notesMasterIdLst>
-    <p:notesMasterId r:id="rId15"/>
+    <p:notesMasterId r:id="rId19"/>
   </p:notesMasterIdLst>
   <p:sldIdLst>
     <p:sldId id="256" r:id="rId2"/>
     <p:sldId id="257" r:id="rId3"/>
     <p:sldId id="258" r:id="rId4"/>
     <p:sldId id="260" r:id="rId5"/>
-    <p:sldId id="266" r:id="rId6"/>
-    <p:sldId id="267" r:id="rId7"/>
-    <p:sldId id="268" r:id="rId8"/>
-    <p:sldId id="270" r:id="rId9"/>
-    <p:sldId id="262" r:id="rId10"/>
-    <p:sldId id="261" r:id="rId11"/>
-    <p:sldId id="263" r:id="rId12"/>
-    <p:sldId id="264" r:id="rId13"/>
-    <p:sldId id="265" r:id="rId14"/>
+    <p:sldId id="271" r:id="rId6"/>
+    <p:sldId id="266" r:id="rId7"/>
+    <p:sldId id="272" r:id="rId8"/>
+    <p:sldId id="267" r:id="rId9"/>
+    <p:sldId id="273" r:id="rId10"/>
+    <p:sldId id="268" r:id="rId11"/>
+    <p:sldId id="274" r:id="rId12"/>
+    <p:sldId id="270" r:id="rId13"/>
+    <p:sldId id="262" r:id="rId14"/>
+    <p:sldId id="261" r:id="rId15"/>
+    <p:sldId id="263" r:id="rId16"/>
+    <p:sldId id="264" r:id="rId17"/>
+    <p:sldId id="265" r:id="rId18"/>
   </p:sldIdLst>
   <p:sldSz cx="9144000" cy="6858000" type="screen4x3"/>
   <p:notesSz cx="6858000" cy="9144000"/>
@@ -121,7 +125,7 @@
   </p:defaultTextStyle>
   <p:extLst>
     <p:ext uri="{EFAFB233-063F-42B5-8137-9DF3F51BA10A}">
-      <p15:sldGuideLst xmlns="" xmlns:p15="http://schemas.microsoft.com/office/powerpoint/2012/main" xmlns:mv="urn:schemas-microsoft-com:mac:vml" xmlns:mc="http://schemas.openxmlformats.org/markup-compatibility/2006">
+      <p15:sldGuideLst xmlns:p15="http://schemas.microsoft.com/office/powerpoint/2012/main">
         <p15:guide id="1" orient="horz" pos="2160">
           <p15:clr>
             <a:srgbClr val="A4A3A4"/>
@@ -621,6 +625,201 @@
           <a:p>
             <a:r>
               <a:rPr lang="en-US" dirty="0" smtClean="0"/>
+              <a:t>Files downloads:</a:t>
+            </a:r>
+            <a:r>
+              <a:rPr lang="en-US" baseline="0" dirty="0" smtClean="0"/>
+              <a:t> mention the process…1. Used CA only, 2. started to get a loop for all states, 3. Found US total data, 4. Merged US data over 4 data sets</a:t>
+            </a:r>
+            <a:endParaRPr lang="en-US" dirty="0"/>
+          </a:p>
+        </p:txBody>
+      </p:sp>
+      <p:sp>
+        <p:nvSpPr>
+          <p:cNvPr id="4" name="Slide Number Placeholder 3"/>
+          <p:cNvSpPr>
+            <a:spLocks noGrp="1"/>
+          </p:cNvSpPr>
+          <p:nvPr>
+            <p:ph type="sldNum" sz="quarter" idx="10"/>
+          </p:nvPr>
+        </p:nvSpPr>
+        <p:spPr/>
+        <p:txBody>
+          <a:bodyPr/>
+          <a:lstStyle/>
+          <a:p>
+            <a:fld id="{BCFE6538-8E2A-4155-88EC-2879DA714723}" type="slidenum">
+              <a:rPr lang="en-US" smtClean="0"/>
+              <a:pPr/>
+              <a:t>15</a:t>
+            </a:fld>
+            <a:endParaRPr lang="en-US"/>
+          </a:p>
+        </p:txBody>
+      </p:sp>
+    </p:spTree>
+    <p:extLst>
+      <p:ext uri="{BB962C8B-B14F-4D97-AF65-F5344CB8AC3E}">
+        <p14:creationId xmlns:p14="http://schemas.microsoft.com/office/powerpoint/2010/main" val="2426638069"/>
+      </p:ext>
+    </p:extLst>
+  </p:cSld>
+  <p:clrMapOvr>
+    <a:masterClrMapping/>
+  </p:clrMapOvr>
+</p:notes>
+</file>
+
+<file path=ppt/notesSlides/notesSlide11.xml><?xml version="1.0" encoding="utf-8"?>
+<p:notes xmlns:a="http://schemas.openxmlformats.org/drawingml/2006/main" xmlns:r="http://schemas.openxmlformats.org/officeDocument/2006/relationships" xmlns:p="http://schemas.openxmlformats.org/presentationml/2006/main">
+  <p:cSld>
+    <p:spTree>
+      <p:nvGrpSpPr>
+        <p:cNvPr id="1" name=""/>
+        <p:cNvGrpSpPr/>
+        <p:nvPr/>
+      </p:nvGrpSpPr>
+      <p:grpSpPr>
+        <a:xfrm>
+          <a:off x="0" y="0"/>
+          <a:ext cx="0" cy="0"/>
+          <a:chOff x="0" y="0"/>
+          <a:chExt cx="0" cy="0"/>
+        </a:xfrm>
+      </p:grpSpPr>
+      <p:sp>
+        <p:nvSpPr>
+          <p:cNvPr id="2" name="Slide Image Placeholder 1"/>
+          <p:cNvSpPr>
+            <a:spLocks noGrp="1" noRot="1" noChangeAspect="1"/>
+          </p:cNvSpPr>
+          <p:nvPr>
+            <p:ph type="sldImg"/>
+          </p:nvPr>
+        </p:nvSpPr>
+        <p:spPr/>
+      </p:sp>
+      <p:sp>
+        <p:nvSpPr>
+          <p:cNvPr id="3" name="Notes Placeholder 2"/>
+          <p:cNvSpPr>
+            <a:spLocks noGrp="1"/>
+          </p:cNvSpPr>
+          <p:nvPr>
+            <p:ph type="body" idx="1"/>
+          </p:nvPr>
+        </p:nvSpPr>
+        <p:spPr/>
+        <p:txBody>
+          <a:bodyPr/>
+          <a:lstStyle/>
+          <a:p>
+            <a:r>
+              <a:rPr lang="en-US" dirty="0" smtClean="0"/>
+              <a:t>Code Compatibility:</a:t>
+            </a:r>
+            <a:r>
+              <a:rPr lang="en-US" baseline="0" dirty="0" smtClean="0"/>
+              <a:t> Windows cannot run system commands in R</a:t>
+            </a:r>
+          </a:p>
+          <a:p>
+            <a:endParaRPr lang="en-US" baseline="0" dirty="0" smtClean="0"/>
+          </a:p>
+          <a:p>
+            <a:r>
+              <a:rPr lang="en-US" baseline="0" dirty="0" smtClean="0"/>
+              <a:t>Accidental branch diversion: Sometimes split into two versions, merged and then the code broke. Version control allowed us to go back to previous versions and correct the merging errors</a:t>
+            </a:r>
+            <a:endParaRPr lang="en-US" dirty="0"/>
+          </a:p>
+        </p:txBody>
+      </p:sp>
+      <p:sp>
+        <p:nvSpPr>
+          <p:cNvPr id="4" name="Slide Number Placeholder 3"/>
+          <p:cNvSpPr>
+            <a:spLocks noGrp="1"/>
+          </p:cNvSpPr>
+          <p:nvPr>
+            <p:ph type="sldNum" sz="quarter" idx="10"/>
+          </p:nvPr>
+        </p:nvSpPr>
+        <p:spPr/>
+        <p:txBody>
+          <a:bodyPr/>
+          <a:lstStyle/>
+          <a:p>
+            <a:fld id="{BCFE6538-8E2A-4155-88EC-2879DA714723}" type="slidenum">
+              <a:rPr lang="en-US" smtClean="0"/>
+              <a:pPr/>
+              <a:t>16</a:t>
+            </a:fld>
+            <a:endParaRPr lang="en-US"/>
+          </a:p>
+        </p:txBody>
+      </p:sp>
+    </p:spTree>
+    <p:extLst>
+      <p:ext uri="{BB962C8B-B14F-4D97-AF65-F5344CB8AC3E}">
+        <p14:creationId xmlns:p14="http://schemas.microsoft.com/office/powerpoint/2010/main" val="2125724765"/>
+      </p:ext>
+    </p:extLst>
+  </p:cSld>
+  <p:clrMapOvr>
+    <a:masterClrMapping/>
+  </p:clrMapOvr>
+</p:notes>
+</file>
+
+<file path=ppt/notesSlides/notesSlide12.xml><?xml version="1.0" encoding="utf-8"?>
+<p:notes xmlns:a="http://schemas.openxmlformats.org/drawingml/2006/main" xmlns:r="http://schemas.openxmlformats.org/officeDocument/2006/relationships" xmlns:p="http://schemas.openxmlformats.org/presentationml/2006/main">
+  <p:cSld>
+    <p:spTree>
+      <p:nvGrpSpPr>
+        <p:cNvPr id="1" name=""/>
+        <p:cNvGrpSpPr/>
+        <p:nvPr/>
+      </p:nvGrpSpPr>
+      <p:grpSpPr>
+        <a:xfrm>
+          <a:off x="0" y="0"/>
+          <a:ext cx="0" cy="0"/>
+          <a:chOff x="0" y="0"/>
+          <a:chExt cx="0" cy="0"/>
+        </a:xfrm>
+      </p:grpSpPr>
+      <p:sp>
+        <p:nvSpPr>
+          <p:cNvPr id="2" name="Slide Image Placeholder 1"/>
+          <p:cNvSpPr>
+            <a:spLocks noGrp="1" noRot="1" noChangeAspect="1"/>
+          </p:cNvSpPr>
+          <p:nvPr>
+            <p:ph type="sldImg"/>
+          </p:nvPr>
+        </p:nvSpPr>
+        <p:spPr/>
+      </p:sp>
+      <p:sp>
+        <p:nvSpPr>
+          <p:cNvPr id="3" name="Notes Placeholder 2"/>
+          <p:cNvSpPr>
+            <a:spLocks noGrp="1"/>
+          </p:cNvSpPr>
+          <p:nvPr>
+            <p:ph type="body" idx="1"/>
+          </p:nvPr>
+        </p:nvSpPr>
+        <p:spPr/>
+        <p:txBody>
+          <a:bodyPr/>
+          <a:lstStyle/>
+          <a:p>
+            <a:r>
+              <a:rPr lang="en-US" dirty="0" smtClean="0"/>
               <a:t>Negative</a:t>
             </a:r>
             <a:r>
@@ -662,7 +861,7 @@
             <a:fld id="{BCFE6538-8E2A-4155-88EC-2879DA714723}" type="slidenum">
               <a:rPr lang="en-US" smtClean="0"/>
               <a:pPr/>
-              <a:t>13</a:t>
+              <a:t>17</a:t>
             </a:fld>
             <a:endParaRPr lang="en-US"/>
           </a:p>
@@ -1034,12 +1233,16 @@
           <a:lstStyle/>
           <a:p>
             <a:r>
+              <a:rPr lang="en-US" baseline="0" dirty="0" smtClean="0"/>
+              <a:t>(This slide can be brief) </a:t>
+            </a:r>
+            <a:r>
               <a:rPr lang="en-US" dirty="0" smtClean="0"/>
-              <a:t>D.C., Hawaii, and Alaska (and maybe California) may be high here due to moving</a:t>
+              <a:t>East coast/west</a:t>
             </a:r>
             <a:r>
               <a:rPr lang="en-US" baseline="0" dirty="0" smtClean="0"/>
-              <a:t> for a job (not a permanent resident of that state/area). </a:t>
+              <a:t> coast has high income across all ownership levels. This is probably due the high cost of living on the coasts. </a:t>
             </a:r>
             <a:endParaRPr lang="en-US" dirty="0"/>
           </a:p>
@@ -1063,7 +1266,7 @@
             <a:fld id="{BCFE6538-8E2A-4155-88EC-2879DA714723}" type="slidenum">
               <a:rPr lang="en-US" smtClean="0"/>
               <a:pPr/>
-              <a:t>6</a:t>
+              <a:t>5</a:t>
             </a:fld>
             <a:endParaRPr lang="en-US"/>
           </a:p>
@@ -1072,7 +1275,7 @@
     </p:spTree>
     <p:extLst>
       <p:ext uri="{BB962C8B-B14F-4D97-AF65-F5344CB8AC3E}">
-        <p14:creationId xmlns:p14="http://schemas.microsoft.com/office/powerpoint/2010/main" val="1575302593"/>
+        <p14:creationId xmlns:p14="http://schemas.microsoft.com/office/powerpoint/2010/main" val="515887643"/>
       </p:ext>
     </p:extLst>
   </p:cSld>
@@ -1126,37 +1329,14 @@
           <a:bodyPr/>
           <a:lstStyle/>
           <a:p>
-            <a:pPr marL="0" marR="0" indent="0" algn="l" defTabSz="914400" rtl="0" eaLnBrk="1" fontAlgn="auto" latinLnBrk="0" hangingPunct="1">
-              <a:lnSpc>
-                <a:spcPct val="100000"/>
-              </a:lnSpc>
-              <a:spcBef>
-                <a:spcPts val="0"/>
-              </a:spcBef>
-              <a:spcAft>
-                <a:spcPts val="0"/>
-              </a:spcAft>
-              <a:buClrTx/>
-              <a:buSzTx/>
-              <a:buFontTx/>
-              <a:buNone/>
-              <a:tabLst/>
-              <a:defRPr/>
-            </a:pPr>
-            <a:r>
-              <a:rPr lang="en-US" sz="1200" dirty="0" smtClean="0"/>
-              <a:t>We also notice that households owning with a mortgage or loan had higher mean income than owning free and clear across all states. A possible explanation may be due to retirees (</a:t>
-            </a:r>
-            <a:r>
-              <a:rPr lang="en-US" sz="1200" dirty="0" err="1" smtClean="0"/>
-              <a:t>ie</a:t>
-            </a:r>
-            <a:r>
-              <a:rPr lang="en-US" sz="1200" dirty="0" smtClean="0"/>
-              <a:t>: smaller income but likely to have paid off the house). We see that renting and occupying without rent were fairly similar within all states.</a:t>
-            </a:r>
-          </a:p>
-          <a:p>
+            <a:r>
+              <a:rPr lang="en-US" dirty="0" smtClean="0"/>
+              <a:t>D.C., Hawaii, and Alaska (and maybe California) may be high here due to moving</a:t>
+            </a:r>
+            <a:r>
+              <a:rPr lang="en-US" baseline="0" dirty="0" smtClean="0"/>
+              <a:t> for a job (not a permanent resident of that state/area). </a:t>
+            </a:r>
             <a:endParaRPr lang="en-US" dirty="0"/>
           </a:p>
         </p:txBody>
@@ -1179,7 +1359,7 @@
             <a:fld id="{BCFE6538-8E2A-4155-88EC-2879DA714723}" type="slidenum">
               <a:rPr lang="en-US" smtClean="0"/>
               <a:pPr/>
-              <a:t>9</a:t>
+              <a:t>8</a:t>
             </a:fld>
             <a:endParaRPr lang="en-US"/>
           </a:p>
@@ -1188,7 +1368,7 @@
     </p:spTree>
     <p:extLst>
       <p:ext uri="{BB962C8B-B14F-4D97-AF65-F5344CB8AC3E}">
-        <p14:creationId xmlns:p14="http://schemas.microsoft.com/office/powerpoint/2010/main" val="2204740499"/>
+        <p14:creationId xmlns:p14="http://schemas.microsoft.com/office/powerpoint/2010/main" val="1575302593"/>
       </p:ext>
     </p:extLst>
   </p:cSld>
@@ -1244,11 +1424,11 @@
           <a:p>
             <a:r>
               <a:rPr lang="en-US" dirty="0" smtClean="0"/>
-              <a:t>Military housing fell under No Payment of Rent. As did tenant farmers, parsonages (clergy</a:t>
+              <a:t>D.C., Hawaii, and Alaska (and maybe California) may be high here due to moving</a:t>
             </a:r>
             <a:r>
               <a:rPr lang="en-US" baseline="0" dirty="0" smtClean="0"/>
-              <a:t> housing), caretakers, and housing owned by others not living there.</a:t>
+              <a:t> for a job (not a permanent resident of that state/area). </a:t>
             </a:r>
             <a:endParaRPr lang="en-US" dirty="0"/>
           </a:p>
@@ -1272,7 +1452,7 @@
             <a:fld id="{BCFE6538-8E2A-4155-88EC-2879DA714723}" type="slidenum">
               <a:rPr lang="en-US" smtClean="0"/>
               <a:pPr/>
-              <a:t>10</a:t>
+              <a:t>9</a:t>
             </a:fld>
             <a:endParaRPr lang="en-US"/>
           </a:p>
@@ -1281,7 +1461,7 @@
     </p:spTree>
     <p:extLst>
       <p:ext uri="{BB962C8B-B14F-4D97-AF65-F5344CB8AC3E}">
-        <p14:creationId xmlns:p14="http://schemas.microsoft.com/office/powerpoint/2010/main" val="1242786403"/>
+        <p14:creationId xmlns:p14="http://schemas.microsoft.com/office/powerpoint/2010/main" val="1043641529"/>
       </p:ext>
     </p:extLst>
   </p:cSld>
@@ -1335,14 +1515,37 @@
           <a:bodyPr/>
           <a:lstStyle/>
           <a:p>
-            <a:r>
-              <a:rPr lang="en-US" dirty="0" smtClean="0"/>
-              <a:t>Files downloads:</a:t>
-            </a:r>
-            <a:r>
-              <a:rPr lang="en-US" baseline="0" dirty="0" smtClean="0"/>
-              <a:t> mention the process…1. Used CA only, 2. started to get a loop for all states, 3. Found US total data, 4. Merged US data over 4 data sets</a:t>
-            </a:r>
+            <a:pPr marL="0" marR="0" indent="0" algn="l" defTabSz="914400" rtl="0" eaLnBrk="1" fontAlgn="auto" latinLnBrk="0" hangingPunct="1">
+              <a:lnSpc>
+                <a:spcPct val="100000"/>
+              </a:lnSpc>
+              <a:spcBef>
+                <a:spcPts val="0"/>
+              </a:spcBef>
+              <a:spcAft>
+                <a:spcPts val="0"/>
+              </a:spcAft>
+              <a:buClrTx/>
+              <a:buSzTx/>
+              <a:buFontTx/>
+              <a:buNone/>
+              <a:tabLst/>
+              <a:defRPr/>
+            </a:pPr>
+            <a:r>
+              <a:rPr lang="en-US" sz="1200" dirty="0" smtClean="0"/>
+              <a:t>We also notice that households owning with a mortgage or loan had higher mean income than owning free and clear across all states. A possible explanation may be due to retirees (</a:t>
+            </a:r>
+            <a:r>
+              <a:rPr lang="en-US" sz="1200" dirty="0" err="1" smtClean="0"/>
+              <a:t>ie</a:t>
+            </a:r>
+            <a:r>
+              <a:rPr lang="en-US" sz="1200" dirty="0" smtClean="0"/>
+              <a:t>: smaller income but likely to have paid off the house). We see that renting and occupying without rent were fairly similar within all states.</a:t>
+            </a:r>
+          </a:p>
+          <a:p>
             <a:endParaRPr lang="en-US" dirty="0"/>
           </a:p>
         </p:txBody>
@@ -1365,7 +1568,7 @@
             <a:fld id="{BCFE6538-8E2A-4155-88EC-2879DA714723}" type="slidenum">
               <a:rPr lang="en-US" smtClean="0"/>
               <a:pPr/>
-              <a:t>11</a:t>
+              <a:t>13</a:t>
             </a:fld>
             <a:endParaRPr lang="en-US"/>
           </a:p>
@@ -1374,7 +1577,7 @@
     </p:spTree>
     <p:extLst>
       <p:ext uri="{BB962C8B-B14F-4D97-AF65-F5344CB8AC3E}">
-        <p14:creationId xmlns:p14="http://schemas.microsoft.com/office/powerpoint/2010/main" val="2426638069"/>
+        <p14:creationId xmlns:p14="http://schemas.microsoft.com/office/powerpoint/2010/main" val="2204740499"/>
       </p:ext>
     </p:extLst>
   </p:cSld>
@@ -1430,20 +1633,11 @@
           <a:p>
             <a:r>
               <a:rPr lang="en-US" dirty="0" smtClean="0"/>
-              <a:t>Code Compatibility:</a:t>
+              <a:t>Military housing fell under No Payment of Rent. As did tenant farmers, parsonages (clergy</a:t>
             </a:r>
             <a:r>
               <a:rPr lang="en-US" baseline="0" dirty="0" smtClean="0"/>
-              <a:t> Windows cannot run system commands in R</a:t>
-            </a:r>
-          </a:p>
-          <a:p>
-            <a:endParaRPr lang="en-US" baseline="0" dirty="0" smtClean="0"/>
-          </a:p>
-          <a:p>
-            <a:r>
-              <a:rPr lang="en-US" baseline="0" dirty="0" smtClean="0"/>
-              <a:t>Accidental branch diversion: Sometimes split into two versions, merged and then the code broke. Version control allowed us to go back to previous versions and correct the merging errors</a:t>
+              <a:t> housing), caretakers, and housing owned by others not living there.</a:t>
             </a:r>
             <a:endParaRPr lang="en-US" dirty="0"/>
           </a:p>
@@ -1467,7 +1661,7 @@
             <a:fld id="{BCFE6538-8E2A-4155-88EC-2879DA714723}" type="slidenum">
               <a:rPr lang="en-US" smtClean="0"/>
               <a:pPr/>
-              <a:t>12</a:t>
+              <a:t>14</a:t>
             </a:fld>
             <a:endParaRPr lang="en-US"/>
           </a:p>
@@ -1476,7 +1670,7 @@
     </p:spTree>
     <p:extLst>
       <p:ext uri="{BB962C8B-B14F-4D97-AF65-F5344CB8AC3E}">
-        <p14:creationId xmlns:p14="http://schemas.microsoft.com/office/powerpoint/2010/main" val="2125724765"/>
+        <p14:creationId xmlns:p14="http://schemas.microsoft.com/office/powerpoint/2010/main" val="1242786403"/>
       </p:ext>
     </p:extLst>
   </p:cSld>
@@ -5079,1164 +5273,6 @@
             <p:ph type="title"/>
           </p:nvPr>
         </p:nvSpPr>
-        <p:spPr/>
-        <p:txBody>
-          <a:bodyPr/>
-          <a:lstStyle/>
-          <a:p>
-            <a:pPr algn="ctr"/>
-            <a:r>
-              <a:rPr lang="en-US" u="sng" dirty="0" smtClean="0"/>
-              <a:t>Findings</a:t>
-            </a:r>
-            <a:endParaRPr lang="en-US" u="sng" dirty="0"/>
-          </a:p>
-        </p:txBody>
-      </p:sp>
-      <p:sp>
-        <p:nvSpPr>
-          <p:cNvPr id="3" name="Content Placeholder 2"/>
-          <p:cNvSpPr>
-            <a:spLocks noGrp="1"/>
-          </p:cNvSpPr>
-          <p:nvPr>
-            <p:ph idx="1"/>
-          </p:nvPr>
-        </p:nvSpPr>
-        <p:spPr/>
-        <p:txBody>
-          <a:bodyPr>
-            <a:normAutofit/>
-          </a:bodyPr>
-          <a:lstStyle/>
-          <a:p>
-            <a:pPr marL="0" indent="0">
-              <a:buNone/>
-            </a:pPr>
-            <a:r>
-              <a:rPr lang="en-US" dirty="0"/>
-              <a:t>It was interesting to </a:t>
-            </a:r>
-            <a:r>
-              <a:rPr lang="en-US" dirty="0" smtClean="0"/>
-              <a:t>see: </a:t>
-            </a:r>
-            <a:endParaRPr lang="en-US" dirty="0" smtClean="0"/>
-          </a:p>
-          <a:p>
-            <a:endParaRPr lang="en-US" dirty="0"/>
-          </a:p>
-          <a:p>
-            <a:pPr marL="731520" lvl="1" indent="-457200">
-              <a:buFont typeface="+mj-lt"/>
-              <a:buAutoNum type="arabicPeriod"/>
-            </a:pPr>
-            <a:r>
-              <a:rPr lang="en-US" sz="2400" dirty="0" smtClean="0"/>
-              <a:t>Mississippi</a:t>
-            </a:r>
-            <a:r>
-              <a:rPr lang="en-US" sz="2400" dirty="0"/>
-              <a:t>, Alabama and Arkansas were near the lowest mean household incomes across all ownership </a:t>
-            </a:r>
-            <a:r>
-              <a:rPr lang="en-US" sz="2400" dirty="0" smtClean="0"/>
-              <a:t>types.</a:t>
-            </a:r>
-          </a:p>
-          <a:p>
-            <a:pPr marL="731520" lvl="1" indent="-457200">
-              <a:buFont typeface="+mj-lt"/>
-              <a:buAutoNum type="arabicPeriod"/>
-            </a:pPr>
-            <a:endParaRPr lang="en-US" sz="2400" dirty="0" smtClean="0"/>
-          </a:p>
-          <a:p>
-            <a:pPr marL="731520" lvl="1" indent="-457200">
-              <a:buFont typeface="+mj-lt"/>
-              <a:buAutoNum type="arabicPeriod"/>
-            </a:pPr>
-            <a:r>
-              <a:rPr lang="en-US" sz="2400" dirty="0" smtClean="0"/>
-              <a:t>Midwest </a:t>
-            </a:r>
-            <a:r>
-              <a:rPr lang="en-US" sz="2400" dirty="0"/>
-              <a:t>has high income/occupy with no rent </a:t>
-            </a:r>
-            <a:endParaRPr lang="en-US" sz="2400" dirty="0" smtClean="0"/>
-          </a:p>
-          <a:p>
-            <a:pPr marL="731520" lvl="1" indent="-457200">
-              <a:buFont typeface="+mj-lt"/>
-              <a:buAutoNum type="arabicPeriod"/>
-            </a:pPr>
-            <a:endParaRPr lang="en-US" sz="2400" dirty="0"/>
-          </a:p>
-          <a:p>
-            <a:pPr marL="731520" lvl="1" indent="-457200">
-              <a:buFont typeface="+mj-lt"/>
-              <a:buAutoNum type="arabicPeriod"/>
-            </a:pPr>
-            <a:r>
-              <a:rPr lang="en-US" sz="2400" dirty="0" smtClean="0"/>
-              <a:t>Florida </a:t>
-            </a:r>
-            <a:r>
-              <a:rPr lang="en-US" sz="2400" dirty="0"/>
-              <a:t>has higher income for owned free and clear than surrounding region.</a:t>
-            </a:r>
-          </a:p>
-        </p:txBody>
-      </p:sp>
-    </p:spTree>
-    <p:extLst>
-      <p:ext uri="{BB962C8B-B14F-4D97-AF65-F5344CB8AC3E}">
-        <p14:creationId xmlns:p14="http://schemas.microsoft.com/office/powerpoint/2010/main" val="4040071344"/>
-      </p:ext>
-    </p:extLst>
-  </p:cSld>
-  <p:clrMapOvr>
-    <a:masterClrMapping/>
-  </p:clrMapOvr>
-  <p:timing>
-    <p:tnLst>
-      <p:par>
-        <p:cTn id="1" dur="indefinite" restart="never" nodeType="tmRoot"/>
-      </p:par>
-    </p:tnLst>
-  </p:timing>
-</p:sld>
-</file>
-
-<file path=ppt/slides/slide11.xml><?xml version="1.0" encoding="utf-8"?>
-<p:sld xmlns:a="http://schemas.openxmlformats.org/drawingml/2006/main" xmlns:r="http://schemas.openxmlformats.org/officeDocument/2006/relationships" xmlns:p="http://schemas.openxmlformats.org/presentationml/2006/main">
-  <p:cSld>
-    <p:spTree>
-      <p:nvGrpSpPr>
-        <p:cNvPr id="1" name=""/>
-        <p:cNvGrpSpPr/>
-        <p:nvPr/>
-      </p:nvGrpSpPr>
-      <p:grpSpPr>
-        <a:xfrm>
-          <a:off x="0" y="0"/>
-          <a:ext cx="0" cy="0"/>
-          <a:chOff x="0" y="0"/>
-          <a:chExt cx="0" cy="0"/>
-        </a:xfrm>
-      </p:grpSpPr>
-      <p:sp>
-        <p:nvSpPr>
-          <p:cNvPr id="2" name="Title 1"/>
-          <p:cNvSpPr>
-            <a:spLocks noGrp="1"/>
-          </p:cNvSpPr>
-          <p:nvPr>
-            <p:ph type="title"/>
-          </p:nvPr>
-        </p:nvSpPr>
-        <p:spPr/>
-        <p:txBody>
-          <a:bodyPr/>
-          <a:lstStyle/>
-          <a:p>
-            <a:pPr algn="ctr"/>
-            <a:r>
-              <a:rPr lang="en-US" u="sng" dirty="0" smtClean="0"/>
-              <a:t>Obstacles and Solutions</a:t>
-            </a:r>
-            <a:endParaRPr lang="en-US" u="sng" dirty="0"/>
-          </a:p>
-        </p:txBody>
-      </p:sp>
-      <p:sp>
-        <p:nvSpPr>
-          <p:cNvPr id="3" name="Content Placeholder 2"/>
-          <p:cNvSpPr>
-            <a:spLocks noGrp="1"/>
-          </p:cNvSpPr>
-          <p:nvPr>
-            <p:ph idx="1"/>
-          </p:nvPr>
-        </p:nvSpPr>
-        <p:spPr/>
-        <p:txBody>
-          <a:bodyPr>
-            <a:normAutofit/>
-          </a:bodyPr>
-          <a:lstStyle/>
-          <a:p>
-            <a:pPr lvl="0"/>
-            <a:r>
-              <a:rPr lang="en-US" dirty="0" err="1"/>
-              <a:t>Git</a:t>
-            </a:r>
-            <a:r>
-              <a:rPr lang="en-US" dirty="0"/>
-              <a:t> setup:</a:t>
-            </a:r>
-            <a:endParaRPr lang="en-US" sz="2800" dirty="0"/>
-          </a:p>
-          <a:p>
-            <a:pPr lvl="1"/>
-            <a:r>
-              <a:rPr lang="en-US" dirty="0"/>
-              <a:t>Problem: getting </a:t>
-            </a:r>
-            <a:r>
-              <a:rPr lang="en-US" dirty="0" err="1"/>
-              <a:t>git</a:t>
-            </a:r>
-            <a:r>
-              <a:rPr lang="en-US" dirty="0"/>
-              <a:t> to work and sync. </a:t>
-            </a:r>
-            <a:endParaRPr lang="en-US" sz="2400" dirty="0"/>
-          </a:p>
-          <a:p>
-            <a:pPr lvl="1"/>
-            <a:r>
-              <a:rPr lang="en-US" dirty="0"/>
-              <a:t>Solutions:</a:t>
-            </a:r>
-            <a:endParaRPr lang="en-US" sz="2400" dirty="0"/>
-          </a:p>
-          <a:p>
-            <a:pPr lvl="2"/>
-            <a:r>
-              <a:rPr lang="en-US" dirty="0"/>
-              <a:t>Delete local connection, create new version control project in </a:t>
-            </a:r>
-            <a:r>
-              <a:rPr lang="en-US" dirty="0" err="1"/>
-              <a:t>Rstudio</a:t>
-            </a:r>
-            <a:r>
-              <a:rPr lang="en-US" dirty="0"/>
-              <a:t>, paste changes to new file</a:t>
-            </a:r>
-            <a:endParaRPr lang="en-US" sz="2000" dirty="0"/>
-          </a:p>
-          <a:p>
-            <a:pPr lvl="2"/>
-            <a:r>
-              <a:rPr lang="en-US" dirty="0"/>
-              <a:t>Use </a:t>
-            </a:r>
-            <a:r>
-              <a:rPr lang="en-US" dirty="0" err="1"/>
-              <a:t>github</a:t>
-            </a:r>
-            <a:r>
-              <a:rPr lang="en-US" dirty="0"/>
-              <a:t> for Mac/Windows</a:t>
-            </a:r>
-            <a:endParaRPr lang="en-US" sz="2000" dirty="0"/>
-          </a:p>
-          <a:p>
-            <a:pPr lvl="0"/>
-            <a:r>
-              <a:rPr lang="en-US" dirty="0"/>
-              <a:t>File downloads:</a:t>
-            </a:r>
-            <a:endParaRPr lang="en-US" sz="2800" dirty="0"/>
-          </a:p>
-          <a:p>
-            <a:pPr lvl="1"/>
-            <a:r>
-              <a:rPr lang="en-US" dirty="0"/>
-              <a:t>Problem: Automating the downloading process of each state from the web.</a:t>
-            </a:r>
-            <a:endParaRPr lang="en-US" sz="2400" dirty="0"/>
-          </a:p>
-          <a:p>
-            <a:pPr lvl="1"/>
-            <a:r>
-              <a:rPr lang="en-US" dirty="0"/>
-              <a:t>Solution: Download combined US household data. </a:t>
-            </a:r>
-            <a:endParaRPr lang="en-US" sz="2400" dirty="0"/>
-          </a:p>
-          <a:p>
-            <a:pPr lvl="1"/>
-            <a:r>
-              <a:rPr lang="en-US" dirty="0"/>
-              <a:t>Problem: Combined US household data comes in 4 files</a:t>
-            </a:r>
-            <a:endParaRPr lang="en-US" sz="2400" dirty="0"/>
-          </a:p>
-          <a:p>
-            <a:pPr lvl="1"/>
-            <a:r>
-              <a:rPr lang="en-US" dirty="0"/>
-              <a:t>Solution: Download all 4, use system() to merge in command line using cat.</a:t>
-            </a:r>
-            <a:endParaRPr lang="en-US" sz="4400" dirty="0"/>
-          </a:p>
-        </p:txBody>
-      </p:sp>
-    </p:spTree>
-    <p:extLst>
-      <p:ext uri="{BB962C8B-B14F-4D97-AF65-F5344CB8AC3E}">
-        <p14:creationId xmlns:p14="http://schemas.microsoft.com/office/powerpoint/2010/main" val="3030518069"/>
-      </p:ext>
-    </p:extLst>
-  </p:cSld>
-  <p:clrMapOvr>
-    <a:masterClrMapping/>
-  </p:clrMapOvr>
-  <p:timing>
-    <p:tnLst>
-      <p:par>
-        <p:cTn id="1" dur="indefinite" restart="never" nodeType="tmRoot"/>
-      </p:par>
-    </p:tnLst>
-  </p:timing>
-</p:sld>
-</file>
-
-<file path=ppt/slides/slide12.xml><?xml version="1.0" encoding="utf-8"?>
-<p:sld xmlns:a="http://schemas.openxmlformats.org/drawingml/2006/main" xmlns:r="http://schemas.openxmlformats.org/officeDocument/2006/relationships" xmlns:p="http://schemas.openxmlformats.org/presentationml/2006/main">
-  <p:cSld>
-    <p:spTree>
-      <p:nvGrpSpPr>
-        <p:cNvPr id="1" name=""/>
-        <p:cNvGrpSpPr/>
-        <p:nvPr/>
-      </p:nvGrpSpPr>
-      <p:grpSpPr>
-        <a:xfrm>
-          <a:off x="0" y="0"/>
-          <a:ext cx="0" cy="0"/>
-          <a:chOff x="0" y="0"/>
-          <a:chExt cx="0" cy="0"/>
-        </a:xfrm>
-      </p:grpSpPr>
-      <p:sp>
-        <p:nvSpPr>
-          <p:cNvPr id="2" name="Title 1"/>
-          <p:cNvSpPr>
-            <a:spLocks noGrp="1"/>
-          </p:cNvSpPr>
-          <p:nvPr>
-            <p:ph type="title"/>
-          </p:nvPr>
-        </p:nvSpPr>
-        <p:spPr/>
-        <p:txBody>
-          <a:bodyPr/>
-          <a:lstStyle/>
-          <a:p>
-            <a:pPr algn="ctr"/>
-            <a:r>
-              <a:rPr lang="en-US" u="sng" dirty="0" smtClean="0"/>
-              <a:t>Obstacles and Solutions</a:t>
-            </a:r>
-            <a:endParaRPr lang="en-US" u="sng" dirty="0"/>
-          </a:p>
-        </p:txBody>
-      </p:sp>
-      <p:sp>
-        <p:nvSpPr>
-          <p:cNvPr id="3" name="Content Placeholder 2"/>
-          <p:cNvSpPr>
-            <a:spLocks noGrp="1"/>
-          </p:cNvSpPr>
-          <p:nvPr>
-            <p:ph idx="1"/>
-          </p:nvPr>
-        </p:nvSpPr>
-        <p:spPr/>
-        <p:txBody>
-          <a:bodyPr>
-            <a:normAutofit/>
-          </a:bodyPr>
-          <a:lstStyle/>
-          <a:p>
-            <a:pPr lvl="0"/>
-            <a:r>
-              <a:rPr lang="en-US" dirty="0"/>
-              <a:t>Data import:</a:t>
-            </a:r>
-            <a:endParaRPr lang="en-US" sz="2800" dirty="0"/>
-          </a:p>
-          <a:p>
-            <a:pPr lvl="1"/>
-            <a:r>
-              <a:rPr lang="en-US" dirty="0"/>
-              <a:t>Problem: ~200 x 4 million dataset breaks R </a:t>
-            </a:r>
-            <a:endParaRPr lang="en-US" dirty="0" smtClean="0"/>
-          </a:p>
-          <a:p>
-            <a:pPr lvl="1"/>
-            <a:r>
-              <a:rPr lang="en-US" dirty="0" smtClean="0"/>
-              <a:t>Solution</a:t>
-            </a:r>
-            <a:r>
-              <a:rPr lang="en-US" dirty="0"/>
-              <a:t>: </a:t>
-            </a:r>
-            <a:r>
-              <a:rPr lang="en-US" dirty="0" smtClean="0"/>
-              <a:t>Use </a:t>
-            </a:r>
-            <a:r>
-              <a:rPr lang="en-US" i="1" dirty="0" smtClean="0"/>
-              <a:t>cut</a:t>
-            </a:r>
-            <a:r>
-              <a:rPr lang="en-US" dirty="0" smtClean="0"/>
-              <a:t> to find columns of interest</a:t>
-            </a:r>
-            <a:endParaRPr lang="en-US" dirty="0"/>
-          </a:p>
-          <a:p>
-            <a:pPr lvl="0"/>
-            <a:r>
-              <a:rPr lang="en-US" dirty="0"/>
-              <a:t>Code compatibility:</a:t>
-            </a:r>
-            <a:endParaRPr lang="en-US" sz="2800" dirty="0"/>
-          </a:p>
-          <a:p>
-            <a:pPr lvl="1"/>
-            <a:r>
-              <a:rPr lang="en-US" dirty="0"/>
-              <a:t>Problem: 1 mac, 3 </a:t>
-            </a:r>
-            <a:r>
-              <a:rPr lang="en-US" dirty="0" smtClean="0"/>
-              <a:t>windows </a:t>
-            </a:r>
-          </a:p>
-          <a:p>
-            <a:pPr lvl="1"/>
-            <a:r>
-              <a:rPr lang="en-US" dirty="0" smtClean="0"/>
-              <a:t>Solution</a:t>
-            </a:r>
-            <a:r>
-              <a:rPr lang="en-US" dirty="0"/>
-              <a:t>: upload modified data file to </a:t>
-            </a:r>
-            <a:r>
-              <a:rPr lang="en-US" dirty="0" err="1"/>
-              <a:t>g</a:t>
-            </a:r>
-            <a:r>
-              <a:rPr lang="en-US" dirty="0" err="1" smtClean="0"/>
-              <a:t>it</a:t>
-            </a:r>
-            <a:r>
-              <a:rPr lang="en-US" dirty="0" smtClean="0"/>
-              <a:t> repo</a:t>
-            </a:r>
-            <a:endParaRPr lang="en-US" sz="2400" dirty="0" smtClean="0"/>
-          </a:p>
-          <a:p>
-            <a:pPr lvl="0"/>
-            <a:r>
-              <a:rPr lang="en-US" dirty="0" smtClean="0"/>
-              <a:t>Accidental branch diversion:</a:t>
-            </a:r>
-            <a:endParaRPr lang="en-US" sz="2800" dirty="0" smtClean="0"/>
-          </a:p>
-          <a:p>
-            <a:pPr lvl="1"/>
-            <a:r>
-              <a:rPr lang="en-US" dirty="0" smtClean="0"/>
-              <a:t>Problem</a:t>
-            </a:r>
-            <a:r>
-              <a:rPr lang="en-US" dirty="0"/>
-              <a:t>: </a:t>
-            </a:r>
-            <a:r>
-              <a:rPr lang="en-US" dirty="0" smtClean="0"/>
-              <a:t>Accidental split/merge</a:t>
-            </a:r>
-            <a:endParaRPr lang="en-US" sz="2400" dirty="0"/>
-          </a:p>
-          <a:p>
-            <a:pPr lvl="1"/>
-            <a:r>
-              <a:rPr lang="en-US" dirty="0"/>
-              <a:t>Solution: Version control </a:t>
-            </a:r>
-            <a:r>
-              <a:rPr lang="en-US" dirty="0" smtClean="0"/>
-              <a:t>allows manual </a:t>
-            </a:r>
-            <a:r>
-              <a:rPr lang="en-US" dirty="0"/>
-              <a:t>reversion to previous versions</a:t>
-            </a:r>
-            <a:endParaRPr lang="en-US" sz="2400" dirty="0"/>
-          </a:p>
-          <a:p>
-            <a:pPr lvl="0"/>
-            <a:endParaRPr lang="en-US" sz="4400" dirty="0"/>
-          </a:p>
-        </p:txBody>
-      </p:sp>
-    </p:spTree>
-    <p:extLst>
-      <p:ext uri="{BB962C8B-B14F-4D97-AF65-F5344CB8AC3E}">
-        <p14:creationId xmlns:p14="http://schemas.microsoft.com/office/powerpoint/2010/main" val="994255640"/>
-      </p:ext>
-    </p:extLst>
-  </p:cSld>
-  <p:clrMapOvr>
-    <a:masterClrMapping/>
-  </p:clrMapOvr>
-  <p:timing>
-    <p:tnLst>
-      <p:par>
-        <p:cTn id="1" dur="indefinite" restart="never" nodeType="tmRoot"/>
-      </p:par>
-    </p:tnLst>
-  </p:timing>
-</p:sld>
-</file>
-
-<file path=ppt/slides/slide13.xml><?xml version="1.0" encoding="utf-8"?>
-<p:sld xmlns:a="http://schemas.openxmlformats.org/drawingml/2006/main" xmlns:r="http://schemas.openxmlformats.org/officeDocument/2006/relationships" xmlns:p="http://schemas.openxmlformats.org/presentationml/2006/main">
-  <p:cSld>
-    <p:spTree>
-      <p:nvGrpSpPr>
-        <p:cNvPr id="1" name=""/>
-        <p:cNvGrpSpPr/>
-        <p:nvPr/>
-      </p:nvGrpSpPr>
-      <p:grpSpPr>
-        <a:xfrm>
-          <a:off x="0" y="0"/>
-          <a:ext cx="0" cy="0"/>
-          <a:chOff x="0" y="0"/>
-          <a:chExt cx="0" cy="0"/>
-        </a:xfrm>
-      </p:grpSpPr>
-      <p:sp>
-        <p:nvSpPr>
-          <p:cNvPr id="2" name="Title 1"/>
-          <p:cNvSpPr>
-            <a:spLocks noGrp="1"/>
-          </p:cNvSpPr>
-          <p:nvPr>
-            <p:ph type="title"/>
-          </p:nvPr>
-        </p:nvSpPr>
-        <p:spPr/>
-        <p:txBody>
-          <a:bodyPr/>
-          <a:lstStyle/>
-          <a:p>
-            <a:pPr algn="ctr"/>
-            <a:r>
-              <a:rPr lang="en-US" u="sng" dirty="0" smtClean="0"/>
-              <a:t>Future Work</a:t>
-            </a:r>
-            <a:endParaRPr lang="en-US" u="sng" dirty="0"/>
-          </a:p>
-        </p:txBody>
-      </p:sp>
-      <p:sp>
-        <p:nvSpPr>
-          <p:cNvPr id="3" name="Content Placeholder 2"/>
-          <p:cNvSpPr>
-            <a:spLocks noGrp="1"/>
-          </p:cNvSpPr>
-          <p:nvPr>
-            <p:ph idx="1"/>
-          </p:nvPr>
-        </p:nvSpPr>
-        <p:spPr/>
-        <p:txBody>
-          <a:bodyPr>
-            <a:normAutofit/>
-          </a:bodyPr>
-          <a:lstStyle/>
-          <a:p>
-            <a:pPr lvl="0"/>
-            <a:r>
-              <a:rPr lang="en-US" dirty="0" smtClean="0"/>
-              <a:t>Different groups</a:t>
-            </a:r>
-          </a:p>
-          <a:p>
-            <a:pPr lvl="1"/>
-            <a:r>
-              <a:rPr lang="en-US" sz="1900" dirty="0" smtClean="0"/>
-              <a:t>per </a:t>
-            </a:r>
-            <a:r>
-              <a:rPr lang="en-US" sz="1900" dirty="0"/>
-              <a:t>state based on </a:t>
-            </a:r>
-            <a:r>
-              <a:rPr lang="en-US" sz="1900" dirty="0" smtClean="0"/>
-              <a:t>year</a:t>
-            </a:r>
-          </a:p>
-          <a:p>
-            <a:pPr lvl="1"/>
-            <a:r>
-              <a:rPr lang="en-US" sz="1900" dirty="0" smtClean="0"/>
-              <a:t>by </a:t>
-            </a:r>
-            <a:r>
-              <a:rPr lang="en-US" sz="1900" dirty="0"/>
-              <a:t>region (East, South, West, Midwest</a:t>
-            </a:r>
-            <a:r>
-              <a:rPr lang="en-US" sz="1900" dirty="0" smtClean="0"/>
-              <a:t>)</a:t>
-            </a:r>
-          </a:p>
-          <a:p>
-            <a:pPr lvl="1"/>
-            <a:r>
-              <a:rPr lang="en-US" sz="1900" dirty="0"/>
-              <a:t>Examine counts – what proportion of </a:t>
-            </a:r>
-            <a:r>
-              <a:rPr lang="en-US" sz="1900" dirty="0" smtClean="0"/>
-              <a:t>households </a:t>
-            </a:r>
-            <a:r>
-              <a:rPr lang="en-US" sz="1900" dirty="0"/>
-              <a:t>fall into what category in each state? </a:t>
-            </a:r>
-            <a:r>
-              <a:rPr lang="en-US" sz="1900" dirty="0" smtClean="0"/>
-              <a:t>Is it similar across states.</a:t>
-            </a:r>
-            <a:endParaRPr lang="en-US" dirty="0"/>
-          </a:p>
-          <a:p>
-            <a:pPr lvl="0"/>
-            <a:r>
-              <a:rPr lang="en-US" dirty="0"/>
-              <a:t>Examine differences between each of the 4 household ownership types</a:t>
-            </a:r>
-            <a:endParaRPr lang="en-US" sz="2800" dirty="0"/>
-          </a:p>
-          <a:p>
-            <a:pPr lvl="1"/>
-            <a:r>
-              <a:rPr lang="en-US" sz="1900" dirty="0"/>
-              <a:t>Hypothesize that free &amp; clear owners are retired, mortgage payers are still </a:t>
-            </a:r>
-            <a:r>
-              <a:rPr lang="en-US" sz="1900" dirty="0" smtClean="0"/>
-              <a:t>working</a:t>
-            </a:r>
-            <a:endParaRPr lang="en-US" sz="1900" dirty="0"/>
-          </a:p>
-          <a:p>
-            <a:pPr lvl="0"/>
-            <a:r>
-              <a:rPr lang="en-US" dirty="0" smtClean="0"/>
-              <a:t>Take </a:t>
-            </a:r>
-            <a:r>
-              <a:rPr lang="en-US" dirty="0"/>
-              <a:t>into consideration negative and null </a:t>
-            </a:r>
-            <a:r>
-              <a:rPr lang="en-US" dirty="0" smtClean="0"/>
-              <a:t>income</a:t>
-            </a:r>
-          </a:p>
-          <a:p>
-            <a:r>
-              <a:rPr lang="en-US" dirty="0"/>
-              <a:t>Include </a:t>
-            </a:r>
-            <a:r>
-              <a:rPr lang="en-US" dirty="0" smtClean="0"/>
-              <a:t>weighting, inflation.</a:t>
-            </a:r>
-            <a:endParaRPr lang="en-US" sz="2800" dirty="0"/>
-          </a:p>
-          <a:p>
-            <a:pPr lvl="0"/>
-            <a:endParaRPr lang="en-US" dirty="0" smtClean="0"/>
-          </a:p>
-        </p:txBody>
-      </p:sp>
-    </p:spTree>
-    <p:extLst>
-      <p:ext uri="{BB962C8B-B14F-4D97-AF65-F5344CB8AC3E}">
-        <p14:creationId xmlns:p14="http://schemas.microsoft.com/office/powerpoint/2010/main" val="562526258"/>
-      </p:ext>
-    </p:extLst>
-  </p:cSld>
-  <p:clrMapOvr>
-    <a:masterClrMapping/>
-  </p:clrMapOvr>
-  <p:timing>
-    <p:tnLst>
-      <p:par>
-        <p:cTn id="1" dur="indefinite" restart="never" nodeType="tmRoot"/>
-      </p:par>
-    </p:tnLst>
-  </p:timing>
-</p:sld>
-</file>
-
-<file path=ppt/slides/slide2.xml><?xml version="1.0" encoding="utf-8"?>
-<p:sld xmlns:a="http://schemas.openxmlformats.org/drawingml/2006/main" xmlns:r="http://schemas.openxmlformats.org/officeDocument/2006/relationships" xmlns:p="http://schemas.openxmlformats.org/presentationml/2006/main">
-  <p:cSld>
-    <p:spTree>
-      <p:nvGrpSpPr>
-        <p:cNvPr id="1" name=""/>
-        <p:cNvGrpSpPr/>
-        <p:nvPr/>
-      </p:nvGrpSpPr>
-      <p:grpSpPr>
-        <a:xfrm>
-          <a:off x="0" y="0"/>
-          <a:ext cx="0" cy="0"/>
-          <a:chOff x="0" y="0"/>
-          <a:chExt cx="0" cy="0"/>
-        </a:xfrm>
-      </p:grpSpPr>
-      <p:sp>
-        <p:nvSpPr>
-          <p:cNvPr id="2" name="Title 1"/>
-          <p:cNvSpPr>
-            <a:spLocks noGrp="1"/>
-          </p:cNvSpPr>
-          <p:nvPr>
-            <p:ph type="title"/>
-          </p:nvPr>
-        </p:nvSpPr>
-        <p:spPr/>
-        <p:txBody>
-          <a:bodyPr/>
-          <a:lstStyle/>
-          <a:p>
-            <a:pPr algn="ctr"/>
-            <a:r>
-              <a:rPr lang="en-US" u="sng" dirty="0" smtClean="0"/>
-              <a:t>Overview</a:t>
-            </a:r>
-            <a:endParaRPr lang="en-US" u="sng" dirty="0"/>
-          </a:p>
-        </p:txBody>
-      </p:sp>
-      <p:sp>
-        <p:nvSpPr>
-          <p:cNvPr id="3" name="Content Placeholder 2"/>
-          <p:cNvSpPr>
-            <a:spLocks noGrp="1"/>
-          </p:cNvSpPr>
-          <p:nvPr>
-            <p:ph idx="1"/>
-          </p:nvPr>
-        </p:nvSpPr>
-        <p:spPr/>
-        <p:txBody>
-          <a:bodyPr/>
-          <a:lstStyle/>
-          <a:p>
-            <a:r>
-              <a:rPr lang="en-US" dirty="0" smtClean="0"/>
-              <a:t>Data: American </a:t>
-            </a:r>
-            <a:r>
-              <a:rPr lang="en-US" dirty="0"/>
-              <a:t>Community Survey (ACS) </a:t>
-            </a:r>
-            <a:endParaRPr lang="en-US" dirty="0" smtClean="0"/>
-          </a:p>
-          <a:p>
-            <a:endParaRPr lang="en-US" dirty="0" smtClean="0"/>
-          </a:p>
-          <a:p>
-            <a:r>
-              <a:rPr lang="en-US" dirty="0" smtClean="0"/>
-              <a:t>Distributed each yearly </a:t>
-            </a:r>
-          </a:p>
-          <a:p>
-            <a:endParaRPr lang="en-US" dirty="0" smtClean="0"/>
-          </a:p>
-          <a:p>
-            <a:r>
-              <a:rPr lang="en-US" dirty="0" smtClean="0"/>
-              <a:t>The </a:t>
-            </a:r>
-            <a:r>
-              <a:rPr lang="en-US" dirty="0"/>
-              <a:t>ACS collects social, </a:t>
-            </a:r>
-            <a:r>
-              <a:rPr lang="en-US" dirty="0">
-                <a:solidFill>
-                  <a:srgbClr val="FF0000"/>
-                </a:solidFill>
-              </a:rPr>
-              <a:t>economic, housing </a:t>
-            </a:r>
-            <a:r>
-              <a:rPr lang="en-US" dirty="0"/>
-              <a:t>and demographic data. </a:t>
-            </a:r>
-            <a:endParaRPr lang="en-US" dirty="0" smtClean="0"/>
-          </a:p>
-          <a:p>
-            <a:endParaRPr lang="en-US" dirty="0"/>
-          </a:p>
-          <a:p>
-            <a:r>
-              <a:rPr lang="en-US" dirty="0" smtClean="0"/>
-              <a:t>3 </a:t>
-            </a:r>
-            <a:r>
-              <a:rPr lang="en-US" dirty="0" smtClean="0"/>
-              <a:t>year </a:t>
-            </a:r>
-            <a:r>
-              <a:rPr lang="en-US" dirty="0" smtClean="0"/>
-              <a:t>ACS (2010-2012)</a:t>
-            </a:r>
-            <a:endParaRPr lang="en-US" dirty="0"/>
-          </a:p>
-        </p:txBody>
-      </p:sp>
-    </p:spTree>
-    <p:extLst>
-      <p:ext uri="{BB962C8B-B14F-4D97-AF65-F5344CB8AC3E}">
-        <p14:creationId xmlns:p14="http://schemas.microsoft.com/office/powerpoint/2010/main" val="4158567981"/>
-      </p:ext>
-    </p:extLst>
-  </p:cSld>
-  <p:clrMapOvr>
-    <a:masterClrMapping/>
-  </p:clrMapOvr>
-  <p:timing>
-    <p:tnLst>
-      <p:par>
-        <p:cTn id="1" dur="indefinite" restart="never" nodeType="tmRoot"/>
-      </p:par>
-    </p:tnLst>
-  </p:timing>
-</p:sld>
-</file>
-
-<file path=ppt/slides/slide3.xml><?xml version="1.0" encoding="utf-8"?>
-<p:sld xmlns:a="http://schemas.openxmlformats.org/drawingml/2006/main" xmlns:r="http://schemas.openxmlformats.org/officeDocument/2006/relationships" xmlns:p="http://schemas.openxmlformats.org/presentationml/2006/main">
-  <p:cSld>
-    <p:spTree>
-      <p:nvGrpSpPr>
-        <p:cNvPr id="1" name=""/>
-        <p:cNvGrpSpPr/>
-        <p:nvPr/>
-      </p:nvGrpSpPr>
-      <p:grpSpPr>
-        <a:xfrm>
-          <a:off x="0" y="0"/>
-          <a:ext cx="0" cy="0"/>
-          <a:chOff x="0" y="0"/>
-          <a:chExt cx="0" cy="0"/>
-        </a:xfrm>
-      </p:grpSpPr>
-      <p:sp>
-        <p:nvSpPr>
-          <p:cNvPr id="2" name="Title 1"/>
-          <p:cNvSpPr>
-            <a:spLocks noGrp="1"/>
-          </p:cNvSpPr>
-          <p:nvPr>
-            <p:ph type="title"/>
-          </p:nvPr>
-        </p:nvSpPr>
-        <p:spPr/>
-        <p:txBody>
-          <a:bodyPr/>
-          <a:lstStyle/>
-          <a:p>
-            <a:pPr algn="ctr"/>
-            <a:r>
-              <a:rPr lang="en-US" u="sng" dirty="0" smtClean="0"/>
-              <a:t>Question of Interest</a:t>
-            </a:r>
-            <a:endParaRPr lang="en-US" u="sng" dirty="0"/>
-          </a:p>
-        </p:txBody>
-      </p:sp>
-      <p:sp>
-        <p:nvSpPr>
-          <p:cNvPr id="3" name="Content Placeholder 2"/>
-          <p:cNvSpPr>
-            <a:spLocks noGrp="1"/>
-          </p:cNvSpPr>
-          <p:nvPr>
-            <p:ph idx="1"/>
-          </p:nvPr>
-        </p:nvSpPr>
-        <p:spPr/>
-        <p:txBody>
-          <a:bodyPr/>
-          <a:lstStyle/>
-          <a:p>
-            <a:r>
-              <a:rPr lang="en-US" i="1" dirty="0"/>
-              <a:t>How different are the mean household incomes for different household ownership </a:t>
-            </a:r>
-            <a:r>
-              <a:rPr lang="en-US" i="1" dirty="0" smtClean="0"/>
-              <a:t>in </a:t>
-            </a:r>
-            <a:r>
-              <a:rPr lang="en-US" i="1" dirty="0"/>
-              <a:t>the </a:t>
-            </a:r>
-            <a:r>
-              <a:rPr lang="en-US" i="1" dirty="0" smtClean="0"/>
-              <a:t>US?</a:t>
-            </a:r>
-            <a:endParaRPr lang="en-US" i="1" dirty="0" smtClean="0"/>
-          </a:p>
-          <a:p>
-            <a:endParaRPr lang="en-US" i="1" dirty="0"/>
-          </a:p>
-          <a:p>
-            <a:r>
-              <a:rPr lang="en-US" i="1" dirty="0" smtClean="0"/>
-              <a:t>Household ownership types:</a:t>
-            </a:r>
-          </a:p>
-          <a:p>
-            <a:pPr marL="731520" lvl="1" indent="-457200">
-              <a:buFont typeface="+mj-lt"/>
-              <a:buAutoNum type="arabicPeriod"/>
-            </a:pPr>
-            <a:r>
-              <a:rPr lang="en-US" i="1" dirty="0"/>
-              <a:t>O</a:t>
-            </a:r>
-            <a:r>
-              <a:rPr lang="en-US" i="1" dirty="0" smtClean="0"/>
-              <a:t>wn </a:t>
-            </a:r>
-            <a:r>
-              <a:rPr lang="en-US" i="1" dirty="0"/>
-              <a:t>with a mortgage or </a:t>
-            </a:r>
-            <a:r>
-              <a:rPr lang="en-US" i="1" dirty="0" smtClean="0"/>
-              <a:t>loan </a:t>
-            </a:r>
-          </a:p>
-          <a:p>
-            <a:pPr marL="731520" lvl="1" indent="-457200">
-              <a:buFont typeface="+mj-lt"/>
-              <a:buAutoNum type="arabicPeriod"/>
-            </a:pPr>
-            <a:r>
-              <a:rPr lang="en-US" i="1" dirty="0"/>
-              <a:t>O</a:t>
-            </a:r>
-            <a:r>
-              <a:rPr lang="en-US" i="1" dirty="0" smtClean="0"/>
-              <a:t>wn </a:t>
-            </a:r>
-            <a:r>
-              <a:rPr lang="en-US" i="1" dirty="0"/>
-              <a:t>free and </a:t>
-            </a:r>
-            <a:r>
-              <a:rPr lang="en-US" i="1" dirty="0" smtClean="0"/>
-              <a:t>clear</a:t>
-            </a:r>
-          </a:p>
-          <a:p>
-            <a:pPr marL="731520" lvl="1" indent="-457200">
-              <a:buFont typeface="+mj-lt"/>
-              <a:buAutoNum type="arabicPeriod"/>
-            </a:pPr>
-            <a:r>
-              <a:rPr lang="en-US" i="1" dirty="0" smtClean="0"/>
-              <a:t>Rented</a:t>
-            </a:r>
-          </a:p>
-          <a:p>
-            <a:pPr marL="731520" lvl="1" indent="-457200">
-              <a:buFont typeface="+mj-lt"/>
-              <a:buAutoNum type="arabicPeriod"/>
-            </a:pPr>
-            <a:r>
-              <a:rPr lang="en-US" i="1" dirty="0"/>
-              <a:t>O</a:t>
-            </a:r>
-            <a:r>
-              <a:rPr lang="en-US" i="1" dirty="0" smtClean="0"/>
-              <a:t>ccupied </a:t>
-            </a:r>
-            <a:r>
-              <a:rPr lang="en-US" i="1" dirty="0"/>
-              <a:t>without payment of rent</a:t>
-            </a:r>
-            <a:endParaRPr lang="en-US" dirty="0"/>
-          </a:p>
-          <a:p>
-            <a:endParaRPr lang="en-US" dirty="0" smtClean="0"/>
-          </a:p>
-          <a:p>
-            <a:pPr marL="0" indent="0">
-              <a:buNone/>
-            </a:pPr>
-            <a:endParaRPr lang="en-US" sz="2000" dirty="0"/>
-          </a:p>
-        </p:txBody>
-      </p:sp>
-    </p:spTree>
-    <p:extLst>
-      <p:ext uri="{BB962C8B-B14F-4D97-AF65-F5344CB8AC3E}">
-        <p14:creationId xmlns:p14="http://schemas.microsoft.com/office/powerpoint/2010/main" val="76887766"/>
-      </p:ext>
-    </p:extLst>
-  </p:cSld>
-  <p:clrMapOvr>
-    <a:masterClrMapping/>
-  </p:clrMapOvr>
-  <p:timing>
-    <p:tnLst>
-      <p:par>
-        <p:cTn id="1" dur="indefinite" restart="never" nodeType="tmRoot"/>
-      </p:par>
-    </p:tnLst>
-  </p:timing>
-</p:sld>
-</file>
-
-<file path=ppt/slides/slide4.xml><?xml version="1.0" encoding="utf-8"?>
-<p:sld xmlns:a="http://schemas.openxmlformats.org/drawingml/2006/main" xmlns:r="http://schemas.openxmlformats.org/officeDocument/2006/relationships" xmlns:p="http://schemas.openxmlformats.org/presentationml/2006/main">
-  <p:cSld>
-    <p:spTree>
-      <p:nvGrpSpPr>
-        <p:cNvPr id="1" name=""/>
-        <p:cNvGrpSpPr/>
-        <p:nvPr/>
-      </p:nvGrpSpPr>
-      <p:grpSpPr>
-        <a:xfrm>
-          <a:off x="0" y="0"/>
-          <a:ext cx="0" cy="0"/>
-          <a:chOff x="0" y="0"/>
-          <a:chExt cx="0" cy="0"/>
-        </a:xfrm>
-      </p:grpSpPr>
-      <p:pic>
-        <p:nvPicPr>
-          <p:cNvPr id="4" name="Content Placeholder 3" descr="Panel map.png"/>
-          <p:cNvPicPr>
-            <a:picLocks noGrp="1"/>
-          </p:cNvPicPr>
-          <p:nvPr>
-            <p:ph idx="1"/>
-          </p:nvPr>
-        </p:nvPicPr>
-        <p:blipFill>
-          <a:blip r:embed="rId3" cstate="print"/>
-          <a:stretch>
-            <a:fillRect/>
-          </a:stretch>
-        </p:blipFill>
-        <p:spPr>
-          <a:xfrm>
-            <a:off x="609600" y="990600"/>
-            <a:ext cx="8027984" cy="5334000"/>
-          </a:xfrm>
-          <a:prstGeom prst="rect">
-            <a:avLst/>
-          </a:prstGeom>
-        </p:spPr>
-      </p:pic>
-      <p:sp>
-        <p:nvSpPr>
-          <p:cNvPr id="3" name="Title 1"/>
-          <p:cNvSpPr>
-            <a:spLocks noGrp="1"/>
-          </p:cNvSpPr>
-          <p:nvPr>
-            <p:ph type="title"/>
-          </p:nvPr>
-        </p:nvSpPr>
-        <p:spPr>
-          <a:xfrm>
-            <a:off x="457200" y="381000"/>
-            <a:ext cx="8229600" cy="685800"/>
-          </a:xfrm>
-        </p:spPr>
-        <p:txBody>
-          <a:bodyPr>
-            <a:normAutofit fontScale="90000"/>
-          </a:bodyPr>
-          <a:lstStyle/>
-          <a:p>
-            <a:pPr algn="ctr"/>
-            <a:r>
-              <a:rPr lang="en-US" u="sng" dirty="0" smtClean="0"/>
-              <a:t>Findings</a:t>
-            </a:r>
-            <a:endParaRPr lang="en-US" u="sng" dirty="0"/>
-          </a:p>
-        </p:txBody>
-      </p:sp>
-    </p:spTree>
-    <p:extLst>
-      <p:ext uri="{BB962C8B-B14F-4D97-AF65-F5344CB8AC3E}">
-        <p14:creationId xmlns:p14="http://schemas.microsoft.com/office/powerpoint/2010/main" val="1996770165"/>
-      </p:ext>
-    </p:extLst>
-  </p:cSld>
-  <p:clrMapOvr>
-    <a:masterClrMapping/>
-  </p:clrMapOvr>
-  <p:timing>
-    <p:tnLst>
-      <p:par>
-        <p:cTn id="1" dur="indefinite" restart="never" nodeType="tmRoot"/>
-      </p:par>
-    </p:tnLst>
-  </p:timing>
-</p:sld>
-</file>
-
-<file path=ppt/slides/slide5.xml><?xml version="1.0" encoding="utf-8"?>
-<p:sld xmlns:a="http://schemas.openxmlformats.org/drawingml/2006/main" xmlns:r="http://schemas.openxmlformats.org/officeDocument/2006/relationships" xmlns:p="http://schemas.openxmlformats.org/presentationml/2006/main">
-  <p:cSld>
-    <p:spTree>
-      <p:nvGrpSpPr>
-        <p:cNvPr id="1" name=""/>
-        <p:cNvGrpSpPr/>
-        <p:nvPr/>
-      </p:nvGrpSpPr>
-      <p:grpSpPr>
-        <a:xfrm>
-          <a:off x="0" y="0"/>
-          <a:ext cx="0" cy="0"/>
-          <a:chOff x="0" y="0"/>
-          <a:chExt cx="0" cy="0"/>
-        </a:xfrm>
-      </p:grpSpPr>
-      <p:sp>
-        <p:nvSpPr>
-          <p:cNvPr id="2" name="Title 1"/>
-          <p:cNvSpPr>
-            <a:spLocks noGrp="1"/>
-          </p:cNvSpPr>
-          <p:nvPr>
-            <p:ph type="title"/>
-          </p:nvPr>
-        </p:nvSpPr>
         <p:spPr>
           <a:xfrm>
             <a:off x="533400" y="533400"/>
@@ -6268,7 +5304,7 @@
         </p:nvSpPr>
         <p:spPr>
           <a:xfrm>
-            <a:off x="6314440" y="1636931"/>
+            <a:off x="6324600" y="1524000"/>
             <a:ext cx="2667000" cy="4876800"/>
           </a:xfrm>
         </p:spPr>
@@ -6297,29 +5333,15 @@
             </a:pPr>
             <a:r>
               <a:rPr lang="en-US" sz="2200" dirty="0" smtClean="0"/>
-              <a:t>D.C</a:t>
+              <a:t>Connecticut </a:t>
             </a:r>
             <a:r>
               <a:rPr lang="en-US" sz="2200" dirty="0"/>
-              <a:t>. </a:t>
-            </a:r>
-            <a:endParaRPr lang="en-US" sz="2200" dirty="0" smtClean="0"/>
-          </a:p>
-          <a:p>
-            <a:pPr marL="0" indent="0">
-              <a:buNone/>
-            </a:pPr>
+              <a:t>($</a:t>
+            </a:r>
             <a:r>
               <a:rPr lang="en-US" sz="2200" dirty="0" smtClean="0"/>
-              <a:t>      ($</a:t>
-            </a:r>
-            <a:r>
-              <a:rPr lang="en-US" sz="2200" dirty="0"/>
-              <a:t>154,465</a:t>
-            </a:r>
-            <a:r>
-              <a:rPr lang="en-US" sz="2200" dirty="0" smtClean="0"/>
-              <a:t>)</a:t>
+              <a:t>50,264)</a:t>
             </a:r>
           </a:p>
           <a:p>
@@ -6329,575 +5351,25 @@
             </a:pPr>
             <a:r>
               <a:rPr lang="en-US" sz="2200" dirty="0" smtClean="0"/>
-              <a:t>Connecticut </a:t>
+              <a:t>D.C</a:t>
             </a:r>
             <a:r>
               <a:rPr lang="en-US" sz="2200" dirty="0"/>
-              <a:t>($126,760</a:t>
-            </a:r>
-            <a:r>
-              <a:rPr lang="en-US" sz="2200" dirty="0" smtClean="0"/>
-              <a:t>) </a:t>
-            </a:r>
-          </a:p>
-          <a:p>
-            <a:pPr marL="457200" indent="-457200">
-              <a:buFont typeface="+mj-lt"/>
-              <a:buAutoNum type="arabicPeriod"/>
-            </a:pPr>
-            <a:r>
-              <a:rPr lang="en-US" sz="2200" dirty="0" smtClean="0"/>
-              <a:t>New </a:t>
-            </a:r>
-            <a:r>
-              <a:rPr lang="en-US" sz="2200" dirty="0"/>
-              <a:t>Jersey ($</a:t>
-            </a:r>
-            <a:r>
-              <a:rPr lang="en-US" sz="2200" dirty="0" smtClean="0"/>
-              <a:t>124,364)</a:t>
-            </a:r>
-          </a:p>
-          <a:p>
-            <a:pPr marL="457200" indent="-457200">
-              <a:buFont typeface="+mj-lt"/>
-              <a:buAutoNum type="arabicPeriod"/>
-            </a:pPr>
-            <a:r>
-              <a:rPr lang="en-US" sz="2200" dirty="0" smtClean="0"/>
-              <a:t>Maryland </a:t>
-            </a:r>
-            <a:r>
-              <a:rPr lang="en-US" sz="2200" dirty="0"/>
-              <a:t>($</a:t>
-            </a:r>
-            <a:r>
-              <a:rPr lang="en-US" sz="2200" dirty="0" smtClean="0"/>
-              <a:t>119,358)</a:t>
-            </a:r>
-          </a:p>
-          <a:p>
-            <a:pPr marL="457200" indent="-457200">
-              <a:buFont typeface="+mj-lt"/>
-              <a:buAutoNum type="arabicPeriod"/>
-            </a:pPr>
-            <a:r>
-              <a:rPr lang="en-US" sz="2200" dirty="0" smtClean="0"/>
-              <a:t>Massachusetts </a:t>
-            </a:r>
-            <a:r>
-              <a:rPr lang="en-US" sz="2200" dirty="0"/>
-              <a:t>($118,119</a:t>
-            </a:r>
-            <a:r>
-              <a:rPr lang="en-US" sz="2200" dirty="0" smtClean="0"/>
-              <a:t>)</a:t>
-            </a:r>
-            <a:endParaRPr lang="en-US" sz="2200" dirty="0"/>
-          </a:p>
-          <a:p>
-            <a:endParaRPr lang="en-US" dirty="0"/>
-          </a:p>
-        </p:txBody>
-      </p:sp>
-      <p:pic>
-        <p:nvPicPr>
-          <p:cNvPr id="1026" name="Picture 2"/>
-          <p:cNvPicPr>
-            <a:picLocks noChangeAspect="1" noChangeArrowheads="1"/>
-          </p:cNvPicPr>
-          <p:nvPr/>
-        </p:nvPicPr>
-        <p:blipFill rotWithShape="1">
-          <a:blip r:embed="rId2">
-            <a:extLst>
-              <a:ext uri="{28A0092B-C50C-407E-A947-70E740481C1C}">
-                <a14:useLocalDpi xmlns:a14="http://schemas.microsoft.com/office/drawing/2010/main" val="0"/>
-              </a:ext>
-            </a:extLst>
-          </a:blip>
-          <a:srcRect r="2186"/>
-          <a:stretch/>
-        </p:blipFill>
-        <p:spPr bwMode="auto">
-          <a:xfrm>
-            <a:off x="-15240" y="1752600"/>
-            <a:ext cx="6329680" cy="3657600"/>
-          </a:xfrm>
-          <a:prstGeom prst="rect">
-            <a:avLst/>
-          </a:prstGeom>
-          <a:noFill/>
-          <a:ln>
-            <a:noFill/>
-          </a:ln>
-          <a:extLst>
-            <a:ext uri="{909E8E84-426E-40DD-AFC4-6F175D3DCCD1}">
-              <a14:hiddenFill xmlns:a14="http://schemas.microsoft.com/office/drawing/2010/main">
-                <a:solidFill>
-                  <a:schemeClr val="accent1"/>
-                </a:solidFill>
-              </a14:hiddenFill>
-            </a:ext>
-            <a:ext uri="{91240B29-F687-4F45-9708-019B960494DF}">
-              <a14:hiddenLine xmlns:a14="http://schemas.microsoft.com/office/drawing/2010/main" w="9525">
-                <a:solidFill>
-                  <a:schemeClr val="tx1"/>
-                </a:solidFill>
-                <a:miter lim="800000"/>
-                <a:headEnd/>
-                <a:tailEnd/>
-              </a14:hiddenLine>
-            </a:ext>
-          </a:extLst>
-        </p:spPr>
-      </p:pic>
-      <p:sp>
-        <p:nvSpPr>
-          <p:cNvPr id="4" name="TextBox 3"/>
-          <p:cNvSpPr txBox="1"/>
-          <p:nvPr/>
-        </p:nvSpPr>
-        <p:spPr>
-          <a:xfrm>
-            <a:off x="749300" y="5867400"/>
-            <a:ext cx="4800600" cy="646331"/>
-          </a:xfrm>
-          <a:prstGeom prst="rect">
-            <a:avLst/>
-          </a:prstGeom>
-          <a:noFill/>
-        </p:spPr>
-        <p:txBody>
-          <a:bodyPr wrap="square" rtlCol="0">
-            <a:spAutoFit/>
-          </a:bodyPr>
-          <a:lstStyle/>
-          <a:p>
-            <a:pPr marL="285750" indent="-285750">
-              <a:buFont typeface="Arial" panose="020B0604020202020204" pitchFamily="34" charset="0"/>
-              <a:buChar char="•"/>
-            </a:pPr>
-            <a:r>
-              <a:rPr lang="en-US" dirty="0" smtClean="0"/>
-              <a:t>Similar results for </a:t>
-            </a:r>
-            <a:r>
-              <a:rPr lang="en-US" dirty="0"/>
-              <a:t>those owning free and </a:t>
-            </a:r>
-            <a:r>
-              <a:rPr lang="en-US" dirty="0" smtClean="0"/>
-              <a:t>clear.</a:t>
-            </a:r>
-            <a:endParaRPr lang="en-US" dirty="0"/>
-          </a:p>
-        </p:txBody>
-      </p:sp>
-    </p:spTree>
-    <p:extLst>
-      <p:ext uri="{BB962C8B-B14F-4D97-AF65-F5344CB8AC3E}">
-        <p14:creationId xmlns:p14="http://schemas.microsoft.com/office/powerpoint/2010/main" val="177926487"/>
-      </p:ext>
-    </p:extLst>
-  </p:cSld>
-  <p:clrMapOvr>
-    <a:masterClrMapping/>
-  </p:clrMapOvr>
-</p:sld>
-</file>
-
-<file path=ppt/slides/slide6.xml><?xml version="1.0" encoding="utf-8"?>
-<p:sld xmlns:a="http://schemas.openxmlformats.org/drawingml/2006/main" xmlns:r="http://schemas.openxmlformats.org/officeDocument/2006/relationships" xmlns:p="http://schemas.openxmlformats.org/presentationml/2006/main">
-  <p:cSld>
-    <p:spTree>
-      <p:nvGrpSpPr>
-        <p:cNvPr id="1" name=""/>
-        <p:cNvGrpSpPr/>
-        <p:nvPr/>
-      </p:nvGrpSpPr>
-      <p:grpSpPr>
-        <a:xfrm>
-          <a:off x="0" y="0"/>
-          <a:ext cx="0" cy="0"/>
-          <a:chOff x="0" y="0"/>
-          <a:chExt cx="0" cy="0"/>
-        </a:xfrm>
-      </p:grpSpPr>
-      <p:sp>
-        <p:nvSpPr>
-          <p:cNvPr id="2" name="Title 1"/>
-          <p:cNvSpPr>
-            <a:spLocks noGrp="1"/>
-          </p:cNvSpPr>
-          <p:nvPr>
-            <p:ph type="title"/>
-          </p:nvPr>
-        </p:nvSpPr>
-        <p:spPr>
-          <a:xfrm>
-            <a:off x="533400" y="533400"/>
-            <a:ext cx="8229600" cy="990600"/>
-          </a:xfrm>
-        </p:spPr>
-        <p:txBody>
-          <a:bodyPr/>
-          <a:lstStyle/>
-          <a:p>
-            <a:pPr algn="ctr"/>
-            <a:r>
-              <a:rPr lang="en-US" dirty="0" smtClean="0"/>
-              <a:t>Findings</a:t>
-            </a:r>
-            <a:endParaRPr lang="en-US" dirty="0"/>
-          </a:p>
-        </p:txBody>
-      </p:sp>
-      <p:sp>
-        <p:nvSpPr>
-          <p:cNvPr id="3" name="Content Placeholder 2"/>
-          <p:cNvSpPr>
-            <a:spLocks noGrp="1"/>
-          </p:cNvSpPr>
-          <p:nvPr>
-            <p:ph idx="1"/>
-          </p:nvPr>
-        </p:nvSpPr>
-        <p:spPr>
-          <a:xfrm>
-            <a:off x="6324600" y="1524000"/>
-            <a:ext cx="2667000" cy="4876800"/>
-          </a:xfrm>
-        </p:spPr>
-        <p:txBody>
-          <a:bodyPr>
-            <a:normAutofit/>
-          </a:bodyPr>
-          <a:lstStyle/>
+              <a:t>. </a:t>
+            </a:r>
+            <a:endParaRPr lang="en-US" sz="2200" dirty="0" smtClean="0"/>
+          </a:p>
           <a:p>
             <a:pPr marL="0" indent="0">
               <a:buNone/>
             </a:pPr>
             <a:r>
-              <a:rPr lang="en-US" dirty="0"/>
-              <a:t>H</a:t>
-            </a:r>
-            <a:r>
-              <a:rPr lang="en-US" dirty="0" smtClean="0"/>
-              <a:t>ighest mean in</a:t>
-            </a:r>
-          </a:p>
-          <a:p>
-            <a:pPr marL="457200" indent="-457200">
-              <a:buFont typeface="+mj-lt"/>
-              <a:buAutoNum type="arabicPeriod"/>
-            </a:pPr>
-            <a:r>
-              <a:rPr lang="en-US" sz="2200" dirty="0" smtClean="0"/>
-              <a:t>D.C</a:t>
-            </a:r>
-            <a:r>
-              <a:rPr lang="en-US" sz="2200" dirty="0"/>
-              <a:t>. </a:t>
-            </a:r>
-            <a:endParaRPr lang="en-US" sz="2200" dirty="0" smtClean="0"/>
-          </a:p>
-          <a:p>
-            <a:pPr marL="0" indent="0">
-              <a:buNone/>
-            </a:pPr>
-            <a:r>
               <a:rPr lang="en-US" sz="2200" dirty="0"/>
               <a:t> </a:t>
             </a:r>
             <a:r>
               <a:rPr lang="en-US" sz="2200" dirty="0" smtClean="0"/>
-              <a:t>    </a:t>
-            </a:r>
-            <a:r>
-              <a:rPr lang="en-US" sz="2200" dirty="0" smtClean="0"/>
-              <a:t>($</a:t>
-            </a:r>
-            <a:r>
-              <a:rPr lang="en-US" sz="2200" dirty="0" smtClean="0"/>
-              <a:t>62,337)</a:t>
-            </a:r>
-          </a:p>
-          <a:p>
-            <a:pPr marL="457200" indent="-457200">
-              <a:buFont typeface="+mj-lt"/>
-              <a:buAutoNum type="arabicPeriod"/>
-            </a:pPr>
-            <a:r>
-              <a:rPr lang="en-US" sz="2200" dirty="0" smtClean="0"/>
-              <a:t>Hawaii </a:t>
-            </a:r>
-            <a:r>
-              <a:rPr lang="en-US" sz="2200" dirty="0"/>
-              <a:t>($</a:t>
-            </a:r>
-            <a:r>
-              <a:rPr lang="en-US" sz="2200" dirty="0" smtClean="0"/>
-              <a:t>58,077)</a:t>
-            </a:r>
-          </a:p>
-          <a:p>
-            <a:pPr marL="457200" indent="-457200">
-              <a:buFont typeface="+mj-lt"/>
-              <a:buAutoNum type="arabicPeriod"/>
-            </a:pPr>
-            <a:r>
-              <a:rPr lang="en-US" sz="2200" dirty="0" smtClean="0"/>
-              <a:t>Alaska </a:t>
-            </a:r>
-            <a:r>
-              <a:rPr lang="en-US" sz="2200" dirty="0"/>
-              <a:t>($</a:t>
-            </a:r>
-            <a:r>
-              <a:rPr lang="en-US" sz="2200" dirty="0" smtClean="0"/>
-              <a:t>54,918)</a:t>
-            </a:r>
-          </a:p>
-          <a:p>
-            <a:pPr marL="457200" indent="-457200">
-              <a:buFont typeface="+mj-lt"/>
-              <a:buAutoNum type="arabicPeriod"/>
-            </a:pPr>
-            <a:r>
-              <a:rPr lang="en-US" sz="2200" dirty="0" smtClean="0"/>
-              <a:t>California </a:t>
-            </a:r>
-            <a:r>
-              <a:rPr lang="en-US" sz="2200" dirty="0"/>
-              <a:t>($</a:t>
-            </a:r>
-            <a:r>
-              <a:rPr lang="en-US" sz="2200" dirty="0" smtClean="0"/>
-              <a:t>52,423)</a:t>
-            </a:r>
-          </a:p>
-          <a:p>
-            <a:pPr marL="457200" indent="-457200">
-              <a:buFont typeface="+mj-lt"/>
-              <a:buAutoNum type="arabicPeriod"/>
-            </a:pPr>
-            <a:r>
-              <a:rPr lang="en-US" sz="2200" dirty="0" smtClean="0"/>
-              <a:t>Maryland </a:t>
-            </a:r>
-            <a:r>
-              <a:rPr lang="en-US" sz="2200" dirty="0"/>
-              <a:t>($52,404</a:t>
-            </a:r>
-            <a:r>
-              <a:rPr lang="en-US" sz="2200" dirty="0" smtClean="0"/>
-              <a:t>)</a:t>
-            </a:r>
-            <a:endParaRPr lang="en-US" sz="2200" dirty="0"/>
-          </a:p>
-          <a:p>
-            <a:endParaRPr lang="en-US" dirty="0"/>
-          </a:p>
-        </p:txBody>
-      </p:sp>
-      <p:pic>
-        <p:nvPicPr>
-          <p:cNvPr id="2050" name="Picture 2"/>
-          <p:cNvPicPr>
-            <a:picLocks noChangeAspect="1" noChangeArrowheads="1"/>
-          </p:cNvPicPr>
-          <p:nvPr/>
-        </p:nvPicPr>
-        <p:blipFill rotWithShape="1">
-          <a:blip r:embed="rId3">
-            <a:extLst>
-              <a:ext uri="{28A0092B-C50C-407E-A947-70E740481C1C}">
-                <a14:useLocalDpi xmlns:a14="http://schemas.microsoft.com/office/drawing/2010/main" val="0"/>
-              </a:ext>
-            </a:extLst>
-          </a:blip>
-          <a:srcRect r="3099"/>
-          <a:stretch/>
-        </p:blipFill>
-        <p:spPr bwMode="auto">
-          <a:xfrm>
-            <a:off x="0" y="1676400"/>
-            <a:ext cx="6319520" cy="4038600"/>
-          </a:xfrm>
-          <a:prstGeom prst="rect">
-            <a:avLst/>
-          </a:prstGeom>
-          <a:noFill/>
-          <a:ln>
-            <a:noFill/>
-          </a:ln>
-          <a:extLst>
-            <a:ext uri="{909E8E84-426E-40DD-AFC4-6F175D3DCCD1}">
-              <a14:hiddenFill xmlns:a14="http://schemas.microsoft.com/office/drawing/2010/main">
-                <a:solidFill>
-                  <a:schemeClr val="accent1"/>
-                </a:solidFill>
-              </a14:hiddenFill>
-            </a:ext>
-            <a:ext uri="{91240B29-F687-4F45-9708-019B960494DF}">
-              <a14:hiddenLine xmlns:a14="http://schemas.microsoft.com/office/drawing/2010/main" w="9525">
-                <a:solidFill>
-                  <a:schemeClr val="tx1"/>
-                </a:solidFill>
-                <a:miter lim="800000"/>
-                <a:headEnd/>
-                <a:tailEnd/>
-              </a14:hiddenLine>
-            </a:ext>
-          </a:extLst>
-        </p:spPr>
-      </p:pic>
-    </p:spTree>
-    <p:extLst>
-      <p:ext uri="{BB962C8B-B14F-4D97-AF65-F5344CB8AC3E}">
-        <p14:creationId xmlns:p14="http://schemas.microsoft.com/office/powerpoint/2010/main" val="3745031302"/>
-      </p:ext>
-    </p:extLst>
-  </p:cSld>
-  <p:clrMapOvr>
-    <a:masterClrMapping/>
-  </p:clrMapOvr>
-</p:sld>
-</file>
-
-<file path=ppt/slides/slide7.xml><?xml version="1.0" encoding="utf-8"?>
-<p:sld xmlns:a="http://schemas.openxmlformats.org/drawingml/2006/main" xmlns:r="http://schemas.openxmlformats.org/officeDocument/2006/relationships" xmlns:p="http://schemas.openxmlformats.org/presentationml/2006/main">
-  <p:cSld>
-    <p:spTree>
-      <p:nvGrpSpPr>
-        <p:cNvPr id="1" name=""/>
-        <p:cNvGrpSpPr/>
-        <p:nvPr/>
-      </p:nvGrpSpPr>
-      <p:grpSpPr>
-        <a:xfrm>
-          <a:off x="0" y="0"/>
-          <a:ext cx="0" cy="0"/>
-          <a:chOff x="0" y="0"/>
-          <a:chExt cx="0" cy="0"/>
-        </a:xfrm>
-      </p:grpSpPr>
-      <p:sp>
-        <p:nvSpPr>
-          <p:cNvPr id="2" name="Title 1"/>
-          <p:cNvSpPr>
-            <a:spLocks noGrp="1"/>
-          </p:cNvSpPr>
-          <p:nvPr>
-            <p:ph type="title"/>
-          </p:nvPr>
-        </p:nvSpPr>
-        <p:spPr>
-          <a:xfrm>
-            <a:off x="533400" y="533400"/>
-            <a:ext cx="8229600" cy="990600"/>
-          </a:xfrm>
-        </p:spPr>
-        <p:txBody>
-          <a:bodyPr/>
-          <a:lstStyle/>
-          <a:p>
-            <a:pPr algn="ctr"/>
-            <a:r>
-              <a:rPr lang="en-US" dirty="0" smtClean="0"/>
-              <a:t>Findings</a:t>
-            </a:r>
-            <a:endParaRPr lang="en-US" dirty="0"/>
-          </a:p>
-        </p:txBody>
-      </p:sp>
-      <p:sp>
-        <p:nvSpPr>
-          <p:cNvPr id="3" name="Content Placeholder 2"/>
-          <p:cNvSpPr>
-            <a:spLocks noGrp="1"/>
-          </p:cNvSpPr>
-          <p:nvPr>
-            <p:ph idx="1"/>
-          </p:nvPr>
-        </p:nvSpPr>
-        <p:spPr>
-          <a:xfrm>
-            <a:off x="6324600" y="1524000"/>
-            <a:ext cx="2667000" cy="4876800"/>
-          </a:xfrm>
-        </p:spPr>
-        <p:txBody>
-          <a:bodyPr>
-            <a:normAutofit/>
-          </a:bodyPr>
-          <a:lstStyle/>
-          <a:p>
-            <a:pPr marL="0" indent="0">
-              <a:buNone/>
-            </a:pPr>
-            <a:r>
-              <a:rPr lang="en-US" dirty="0"/>
-              <a:t>H</a:t>
-            </a:r>
-            <a:r>
-              <a:rPr lang="en-US" dirty="0" smtClean="0"/>
-              <a:t>ighest mean in</a:t>
-            </a:r>
-          </a:p>
-          <a:p>
-            <a:pPr marL="457200" indent="-457200">
-              <a:buFont typeface="+mj-lt"/>
-              <a:buAutoNum type="arabicPeriod"/>
-            </a:pPr>
-            <a:r>
-              <a:rPr lang="en-US" sz="2200" dirty="0" smtClean="0"/>
-              <a:t>Connecticut </a:t>
-            </a:r>
-            <a:r>
-              <a:rPr lang="en-US" sz="2200" dirty="0"/>
-              <a:t>($</a:t>
-            </a:r>
-            <a:r>
-              <a:rPr lang="en-US" sz="2200" dirty="0" smtClean="0"/>
-              <a:t>50,264)</a:t>
-            </a:r>
-          </a:p>
-          <a:p>
-            <a:pPr marL="457200" indent="-457200">
-              <a:buFont typeface="+mj-lt"/>
-              <a:buAutoNum type="arabicPeriod"/>
-            </a:pPr>
-            <a:r>
-              <a:rPr lang="en-US" sz="2200" dirty="0" smtClean="0"/>
-              <a:t>D.C</a:t>
-            </a:r>
-            <a:r>
-              <a:rPr lang="en-US" sz="2200" dirty="0"/>
-              <a:t>. </a:t>
-            </a:r>
-            <a:endParaRPr lang="en-US" sz="2200" dirty="0" smtClean="0"/>
-          </a:p>
-          <a:p>
-            <a:pPr marL="0" indent="0">
-              <a:buNone/>
-            </a:pPr>
-            <a:r>
-              <a:rPr lang="en-US" sz="2200" dirty="0"/>
-              <a:t> </a:t>
-            </a:r>
-            <a:r>
-              <a:rPr lang="en-US" sz="2200" dirty="0" smtClean="0"/>
-              <a:t>    </a:t>
-            </a:r>
-            <a:r>
-              <a:rPr lang="en-US" sz="2200" dirty="0" smtClean="0"/>
-              <a:t>($</a:t>
-            </a:r>
-            <a:r>
-              <a:rPr lang="en-US" sz="2200" dirty="0" smtClean="0"/>
-              <a:t>49,266)</a:t>
+              <a:t>    ($49,266)</a:t>
             </a:r>
           </a:p>
           <a:p>
@@ -7023,7 +5495,224 @@
 </p:sld>
 </file>
 
-<file path=ppt/slides/slide8.xml><?xml version="1.0" encoding="utf-8"?>
+<file path=ppt/slides/slide11.xml><?xml version="1.0" encoding="utf-8"?>
+<p:sld xmlns:a="http://schemas.openxmlformats.org/drawingml/2006/main" xmlns:r="http://schemas.openxmlformats.org/officeDocument/2006/relationships" xmlns:p="http://schemas.openxmlformats.org/presentationml/2006/main">
+  <p:cSld>
+    <p:spTree>
+      <p:nvGrpSpPr>
+        <p:cNvPr id="1" name=""/>
+        <p:cNvGrpSpPr/>
+        <p:nvPr/>
+      </p:nvGrpSpPr>
+      <p:grpSpPr>
+        <a:xfrm>
+          <a:off x="0" y="0"/>
+          <a:ext cx="0" cy="0"/>
+          <a:chOff x="0" y="0"/>
+          <a:chExt cx="0" cy="0"/>
+        </a:xfrm>
+      </p:grpSpPr>
+      <p:sp>
+        <p:nvSpPr>
+          <p:cNvPr id="2" name="Title 1"/>
+          <p:cNvSpPr>
+            <a:spLocks noGrp="1"/>
+          </p:cNvSpPr>
+          <p:nvPr>
+            <p:ph type="title"/>
+          </p:nvPr>
+        </p:nvSpPr>
+        <p:spPr>
+          <a:xfrm>
+            <a:off x="533400" y="533400"/>
+            <a:ext cx="8229600" cy="990600"/>
+          </a:xfrm>
+        </p:spPr>
+        <p:txBody>
+          <a:bodyPr/>
+          <a:lstStyle/>
+          <a:p>
+            <a:pPr algn="ctr"/>
+            <a:r>
+              <a:rPr lang="en-US" dirty="0" smtClean="0"/>
+              <a:t>Findings</a:t>
+            </a:r>
+            <a:endParaRPr lang="en-US" dirty="0"/>
+          </a:p>
+        </p:txBody>
+      </p:sp>
+      <p:sp>
+        <p:nvSpPr>
+          <p:cNvPr id="3" name="Content Placeholder 2"/>
+          <p:cNvSpPr>
+            <a:spLocks noGrp="1"/>
+          </p:cNvSpPr>
+          <p:nvPr>
+            <p:ph idx="1"/>
+          </p:nvPr>
+        </p:nvSpPr>
+        <p:spPr>
+          <a:xfrm>
+            <a:off x="6324600" y="1524000"/>
+            <a:ext cx="2667000" cy="4876800"/>
+          </a:xfrm>
+        </p:spPr>
+        <p:txBody>
+          <a:bodyPr>
+            <a:normAutofit/>
+          </a:bodyPr>
+          <a:lstStyle/>
+          <a:p>
+            <a:pPr marL="0" indent="0">
+              <a:buNone/>
+            </a:pPr>
+            <a:r>
+              <a:rPr lang="en-US" dirty="0"/>
+              <a:t>H</a:t>
+            </a:r>
+            <a:r>
+              <a:rPr lang="en-US" dirty="0" smtClean="0"/>
+              <a:t>ighest mean in</a:t>
+            </a:r>
+          </a:p>
+          <a:p>
+            <a:pPr marL="457200" indent="-457200">
+              <a:buFont typeface="+mj-lt"/>
+              <a:buAutoNum type="arabicPeriod"/>
+            </a:pPr>
+            <a:r>
+              <a:rPr lang="en-US" sz="2200" dirty="0" smtClean="0"/>
+              <a:t>Connecticut </a:t>
+            </a:r>
+            <a:r>
+              <a:rPr lang="en-US" sz="2200" dirty="0"/>
+              <a:t>($</a:t>
+            </a:r>
+            <a:r>
+              <a:rPr lang="en-US" sz="2200" dirty="0" smtClean="0"/>
+              <a:t>50,264)</a:t>
+            </a:r>
+          </a:p>
+          <a:p>
+            <a:pPr marL="457200" indent="-457200">
+              <a:buFont typeface="+mj-lt"/>
+              <a:buAutoNum type="arabicPeriod"/>
+            </a:pPr>
+            <a:r>
+              <a:rPr lang="en-US" sz="2200" dirty="0" smtClean="0"/>
+              <a:t>D.C</a:t>
+            </a:r>
+            <a:r>
+              <a:rPr lang="en-US" sz="2200" dirty="0"/>
+              <a:t>. </a:t>
+            </a:r>
+            <a:endParaRPr lang="en-US" sz="2200" dirty="0" smtClean="0"/>
+          </a:p>
+          <a:p>
+            <a:pPr marL="0" indent="0">
+              <a:buNone/>
+            </a:pPr>
+            <a:r>
+              <a:rPr lang="en-US" sz="2200" dirty="0"/>
+              <a:t> </a:t>
+            </a:r>
+            <a:r>
+              <a:rPr lang="en-US" sz="2200" dirty="0" smtClean="0"/>
+              <a:t>    ($49,266)</a:t>
+            </a:r>
+          </a:p>
+          <a:p>
+            <a:pPr marL="457200" indent="-457200">
+              <a:buFont typeface="+mj-lt"/>
+              <a:buAutoNum type="arabicPeriod"/>
+            </a:pPr>
+            <a:r>
+              <a:rPr lang="en-US" sz="2200" dirty="0" smtClean="0"/>
+              <a:t>Hawaii </a:t>
+            </a:r>
+            <a:r>
+              <a:rPr lang="en-US" sz="2200" dirty="0"/>
+              <a:t>($</a:t>
+            </a:r>
+            <a:r>
+              <a:rPr lang="en-US" sz="2200" dirty="0" smtClean="0"/>
+              <a:t>47,860)</a:t>
+            </a:r>
+          </a:p>
+          <a:p>
+            <a:pPr marL="457200" indent="-457200">
+              <a:buFont typeface="+mj-lt"/>
+              <a:buAutoNum type="arabicPeriod"/>
+            </a:pPr>
+            <a:r>
+              <a:rPr lang="en-US" sz="2200" dirty="0" smtClean="0"/>
+              <a:t>Massachusetts </a:t>
+            </a:r>
+            <a:r>
+              <a:rPr lang="en-US" sz="2200" dirty="0"/>
+              <a:t>($47,224) </a:t>
+            </a:r>
+          </a:p>
+          <a:p>
+            <a:pPr marL="457200" indent="-457200">
+              <a:buFont typeface="+mj-lt"/>
+              <a:buAutoNum type="arabicPeriod"/>
+            </a:pPr>
+            <a:r>
+              <a:rPr lang="en-US" sz="2200" dirty="0" smtClean="0"/>
+              <a:t>New </a:t>
+            </a:r>
+            <a:r>
+              <a:rPr lang="en-US" sz="2200" dirty="0"/>
+              <a:t>Jersey ($47,081</a:t>
+            </a:r>
+            <a:r>
+              <a:rPr lang="en-US" sz="2200" dirty="0" smtClean="0"/>
+              <a:t>)</a:t>
+            </a:r>
+            <a:endParaRPr lang="en-US" sz="2200" dirty="0"/>
+          </a:p>
+          <a:p>
+            <a:endParaRPr lang="en-US" dirty="0"/>
+          </a:p>
+        </p:txBody>
+      </p:sp>
+      <p:pic>
+        <p:nvPicPr>
+          <p:cNvPr id="5" name="Picture 4"/>
+          <p:cNvPicPr/>
+          <p:nvPr/>
+        </p:nvPicPr>
+        <p:blipFill>
+          <a:blip r:embed="rId2"/>
+          <a:stretch>
+            <a:fillRect/>
+          </a:stretch>
+        </p:blipFill>
+        <p:spPr>
+          <a:xfrm>
+            <a:off x="381000" y="1676400"/>
+            <a:ext cx="5943600" cy="4279265"/>
+          </a:xfrm>
+          <a:prstGeom prst="rect">
+            <a:avLst/>
+          </a:prstGeom>
+        </p:spPr>
+      </p:pic>
+    </p:spTree>
+    <p:extLst>
+      <p:ext uri="{BB962C8B-B14F-4D97-AF65-F5344CB8AC3E}">
+        <p14:creationId xmlns:p14="http://schemas.microsoft.com/office/powerpoint/2010/main" val="3208742267"/>
+      </p:ext>
+    </p:extLst>
+  </p:cSld>
+  <p:clrMapOvr>
+    <a:masterClrMapping/>
+  </p:clrMapOvr>
+</p:sld>
+</file>
+
+<file path=ppt/slides/slide12.xml><?xml version="1.0" encoding="utf-8"?>
 <p:sld xmlns:a="http://schemas.openxmlformats.org/drawingml/2006/main" xmlns:r="http://schemas.openxmlformats.org/officeDocument/2006/relationships" xmlns:p="http://schemas.openxmlformats.org/presentationml/2006/main">
   <p:cSld>
     <p:spTree>
@@ -7131,7 +5820,7 @@
 </p:sld>
 </file>
 
-<file path=ppt/slides/slide9.xml><?xml version="1.0" encoding="utf-8"?>
+<file path=ppt/slides/slide13.xml><?xml version="1.0" encoding="utf-8"?>
 <p:sld xmlns:a="http://schemas.openxmlformats.org/drawingml/2006/main" xmlns:r="http://schemas.openxmlformats.org/officeDocument/2006/relationships" xmlns:p="http://schemas.openxmlformats.org/presentationml/2006/main">
   <p:cSld>
     <p:spTree>
@@ -7213,6 +5902,2282 @@
       </p:par>
     </p:tnLst>
   </p:timing>
+</p:sld>
+</file>
+
+<file path=ppt/slides/slide14.xml><?xml version="1.0" encoding="utf-8"?>
+<p:sld xmlns:a="http://schemas.openxmlformats.org/drawingml/2006/main" xmlns:r="http://schemas.openxmlformats.org/officeDocument/2006/relationships" xmlns:p="http://schemas.openxmlformats.org/presentationml/2006/main">
+  <p:cSld>
+    <p:spTree>
+      <p:nvGrpSpPr>
+        <p:cNvPr id="1" name=""/>
+        <p:cNvGrpSpPr/>
+        <p:nvPr/>
+      </p:nvGrpSpPr>
+      <p:grpSpPr>
+        <a:xfrm>
+          <a:off x="0" y="0"/>
+          <a:ext cx="0" cy="0"/>
+          <a:chOff x="0" y="0"/>
+          <a:chExt cx="0" cy="0"/>
+        </a:xfrm>
+      </p:grpSpPr>
+      <p:sp>
+        <p:nvSpPr>
+          <p:cNvPr id="2" name="Title 1"/>
+          <p:cNvSpPr>
+            <a:spLocks noGrp="1"/>
+          </p:cNvSpPr>
+          <p:nvPr>
+            <p:ph type="title"/>
+          </p:nvPr>
+        </p:nvSpPr>
+        <p:spPr/>
+        <p:txBody>
+          <a:bodyPr/>
+          <a:lstStyle/>
+          <a:p>
+            <a:pPr algn="ctr"/>
+            <a:r>
+              <a:rPr lang="en-US" u="sng" dirty="0" smtClean="0"/>
+              <a:t>Findings</a:t>
+            </a:r>
+            <a:endParaRPr lang="en-US" u="sng" dirty="0"/>
+          </a:p>
+        </p:txBody>
+      </p:sp>
+      <p:sp>
+        <p:nvSpPr>
+          <p:cNvPr id="3" name="Content Placeholder 2"/>
+          <p:cNvSpPr>
+            <a:spLocks noGrp="1"/>
+          </p:cNvSpPr>
+          <p:nvPr>
+            <p:ph idx="1"/>
+          </p:nvPr>
+        </p:nvSpPr>
+        <p:spPr/>
+        <p:txBody>
+          <a:bodyPr>
+            <a:normAutofit/>
+          </a:bodyPr>
+          <a:lstStyle/>
+          <a:p>
+            <a:pPr marL="0" indent="0">
+              <a:buNone/>
+            </a:pPr>
+            <a:r>
+              <a:rPr lang="en-US" dirty="0"/>
+              <a:t>It was interesting to </a:t>
+            </a:r>
+            <a:r>
+              <a:rPr lang="en-US" dirty="0" smtClean="0"/>
+              <a:t>see: </a:t>
+            </a:r>
+          </a:p>
+          <a:p>
+            <a:endParaRPr lang="en-US" dirty="0"/>
+          </a:p>
+          <a:p>
+            <a:pPr marL="731520" lvl="1" indent="-457200">
+              <a:buFont typeface="+mj-lt"/>
+              <a:buAutoNum type="arabicPeriod"/>
+            </a:pPr>
+            <a:r>
+              <a:rPr lang="en-US" sz="2400" dirty="0" smtClean="0"/>
+              <a:t>Mississippi</a:t>
+            </a:r>
+            <a:r>
+              <a:rPr lang="en-US" sz="2400" dirty="0"/>
+              <a:t>, Alabama and Arkansas were near the lowest mean household incomes across all ownership </a:t>
+            </a:r>
+            <a:r>
+              <a:rPr lang="en-US" sz="2400" dirty="0" smtClean="0"/>
+              <a:t>types.</a:t>
+            </a:r>
+          </a:p>
+          <a:p>
+            <a:pPr marL="731520" lvl="1" indent="-457200">
+              <a:buFont typeface="+mj-lt"/>
+              <a:buAutoNum type="arabicPeriod"/>
+            </a:pPr>
+            <a:endParaRPr lang="en-US" sz="2400" dirty="0" smtClean="0"/>
+          </a:p>
+          <a:p>
+            <a:pPr marL="731520" lvl="1" indent="-457200">
+              <a:buFont typeface="+mj-lt"/>
+              <a:buAutoNum type="arabicPeriod"/>
+            </a:pPr>
+            <a:r>
+              <a:rPr lang="en-US" sz="2400" dirty="0" smtClean="0"/>
+              <a:t>Midwest </a:t>
+            </a:r>
+            <a:r>
+              <a:rPr lang="en-US" sz="2400" dirty="0"/>
+              <a:t>has high income/occupy with no rent </a:t>
+            </a:r>
+            <a:endParaRPr lang="en-US" sz="2400" dirty="0" smtClean="0"/>
+          </a:p>
+          <a:p>
+            <a:pPr marL="731520" lvl="1" indent="-457200">
+              <a:buFont typeface="+mj-lt"/>
+              <a:buAutoNum type="arabicPeriod"/>
+            </a:pPr>
+            <a:endParaRPr lang="en-US" sz="2400" dirty="0"/>
+          </a:p>
+          <a:p>
+            <a:pPr marL="731520" lvl="1" indent="-457200">
+              <a:buFont typeface="+mj-lt"/>
+              <a:buAutoNum type="arabicPeriod"/>
+            </a:pPr>
+            <a:r>
+              <a:rPr lang="en-US" sz="2400" dirty="0" smtClean="0"/>
+              <a:t>Florida </a:t>
+            </a:r>
+            <a:r>
+              <a:rPr lang="en-US" sz="2400" dirty="0"/>
+              <a:t>has higher income for owned free and clear than surrounding region.</a:t>
+            </a:r>
+          </a:p>
+        </p:txBody>
+      </p:sp>
+    </p:spTree>
+    <p:extLst>
+      <p:ext uri="{BB962C8B-B14F-4D97-AF65-F5344CB8AC3E}">
+        <p14:creationId xmlns:p14="http://schemas.microsoft.com/office/powerpoint/2010/main" val="4040071344"/>
+      </p:ext>
+    </p:extLst>
+  </p:cSld>
+  <p:clrMapOvr>
+    <a:masterClrMapping/>
+  </p:clrMapOvr>
+  <p:timing>
+    <p:tnLst>
+      <p:par>
+        <p:cTn id="1" dur="indefinite" restart="never" nodeType="tmRoot"/>
+      </p:par>
+    </p:tnLst>
+  </p:timing>
+</p:sld>
+</file>
+
+<file path=ppt/slides/slide15.xml><?xml version="1.0" encoding="utf-8"?>
+<p:sld xmlns:a="http://schemas.openxmlformats.org/drawingml/2006/main" xmlns:r="http://schemas.openxmlformats.org/officeDocument/2006/relationships" xmlns:p="http://schemas.openxmlformats.org/presentationml/2006/main">
+  <p:cSld>
+    <p:spTree>
+      <p:nvGrpSpPr>
+        <p:cNvPr id="1" name=""/>
+        <p:cNvGrpSpPr/>
+        <p:nvPr/>
+      </p:nvGrpSpPr>
+      <p:grpSpPr>
+        <a:xfrm>
+          <a:off x="0" y="0"/>
+          <a:ext cx="0" cy="0"/>
+          <a:chOff x="0" y="0"/>
+          <a:chExt cx="0" cy="0"/>
+        </a:xfrm>
+      </p:grpSpPr>
+      <p:sp>
+        <p:nvSpPr>
+          <p:cNvPr id="2" name="Title 1"/>
+          <p:cNvSpPr>
+            <a:spLocks noGrp="1"/>
+          </p:cNvSpPr>
+          <p:nvPr>
+            <p:ph type="title"/>
+          </p:nvPr>
+        </p:nvSpPr>
+        <p:spPr/>
+        <p:txBody>
+          <a:bodyPr/>
+          <a:lstStyle/>
+          <a:p>
+            <a:pPr algn="ctr"/>
+            <a:r>
+              <a:rPr lang="en-US" u="sng" dirty="0" smtClean="0"/>
+              <a:t>Obstacles and Solutions</a:t>
+            </a:r>
+            <a:endParaRPr lang="en-US" u="sng" dirty="0"/>
+          </a:p>
+        </p:txBody>
+      </p:sp>
+      <p:sp>
+        <p:nvSpPr>
+          <p:cNvPr id="3" name="Content Placeholder 2"/>
+          <p:cNvSpPr>
+            <a:spLocks noGrp="1"/>
+          </p:cNvSpPr>
+          <p:nvPr>
+            <p:ph idx="1"/>
+          </p:nvPr>
+        </p:nvSpPr>
+        <p:spPr/>
+        <p:txBody>
+          <a:bodyPr>
+            <a:normAutofit/>
+          </a:bodyPr>
+          <a:lstStyle/>
+          <a:p>
+            <a:pPr lvl="0"/>
+            <a:r>
+              <a:rPr lang="en-US" dirty="0" err="1"/>
+              <a:t>Git</a:t>
+            </a:r>
+            <a:r>
+              <a:rPr lang="en-US" dirty="0"/>
+              <a:t> setup:</a:t>
+            </a:r>
+            <a:endParaRPr lang="en-US" sz="2800" dirty="0"/>
+          </a:p>
+          <a:p>
+            <a:pPr lvl="1"/>
+            <a:r>
+              <a:rPr lang="en-US" dirty="0"/>
+              <a:t>Problem: getting </a:t>
+            </a:r>
+            <a:r>
+              <a:rPr lang="en-US" dirty="0" err="1"/>
+              <a:t>git</a:t>
+            </a:r>
+            <a:r>
+              <a:rPr lang="en-US" dirty="0"/>
+              <a:t> to work and sync. </a:t>
+            </a:r>
+            <a:endParaRPr lang="en-US" sz="2400" dirty="0"/>
+          </a:p>
+          <a:p>
+            <a:pPr lvl="1"/>
+            <a:r>
+              <a:rPr lang="en-US" dirty="0"/>
+              <a:t>Solutions:</a:t>
+            </a:r>
+            <a:endParaRPr lang="en-US" sz="2400" dirty="0"/>
+          </a:p>
+          <a:p>
+            <a:pPr lvl="2"/>
+            <a:r>
+              <a:rPr lang="en-US" dirty="0"/>
+              <a:t>Delete local connection, create new version control project in </a:t>
+            </a:r>
+            <a:r>
+              <a:rPr lang="en-US" dirty="0" err="1"/>
+              <a:t>Rstudio</a:t>
+            </a:r>
+            <a:r>
+              <a:rPr lang="en-US" dirty="0"/>
+              <a:t>, paste changes to new file</a:t>
+            </a:r>
+            <a:endParaRPr lang="en-US" sz="2000" dirty="0"/>
+          </a:p>
+          <a:p>
+            <a:pPr lvl="2"/>
+            <a:r>
+              <a:rPr lang="en-US" dirty="0"/>
+              <a:t>Use </a:t>
+            </a:r>
+            <a:r>
+              <a:rPr lang="en-US" dirty="0" err="1"/>
+              <a:t>github</a:t>
+            </a:r>
+            <a:r>
+              <a:rPr lang="en-US" dirty="0"/>
+              <a:t> for Mac/Windows</a:t>
+            </a:r>
+            <a:endParaRPr lang="en-US" sz="2000" dirty="0"/>
+          </a:p>
+          <a:p>
+            <a:pPr lvl="0"/>
+            <a:r>
+              <a:rPr lang="en-US" dirty="0"/>
+              <a:t>File downloads:</a:t>
+            </a:r>
+            <a:endParaRPr lang="en-US" sz="2800" dirty="0"/>
+          </a:p>
+          <a:p>
+            <a:pPr lvl="1"/>
+            <a:r>
+              <a:rPr lang="en-US" dirty="0"/>
+              <a:t>Problem: Automating the downloading process of each state from the web.</a:t>
+            </a:r>
+            <a:endParaRPr lang="en-US" sz="2400" dirty="0"/>
+          </a:p>
+          <a:p>
+            <a:pPr lvl="1"/>
+            <a:r>
+              <a:rPr lang="en-US" dirty="0"/>
+              <a:t>Solution: Download combined US household data. </a:t>
+            </a:r>
+            <a:endParaRPr lang="en-US" sz="2400" dirty="0"/>
+          </a:p>
+          <a:p>
+            <a:pPr lvl="1"/>
+            <a:r>
+              <a:rPr lang="en-US" dirty="0"/>
+              <a:t>Problem: Combined US household data comes in 4 files</a:t>
+            </a:r>
+            <a:endParaRPr lang="en-US" sz="2400" dirty="0"/>
+          </a:p>
+          <a:p>
+            <a:pPr lvl="1"/>
+            <a:r>
+              <a:rPr lang="en-US" dirty="0"/>
+              <a:t>Solution: Download all 4, use system() to merge in command line using cat.</a:t>
+            </a:r>
+            <a:endParaRPr lang="en-US" sz="4400" dirty="0"/>
+          </a:p>
+        </p:txBody>
+      </p:sp>
+    </p:spTree>
+    <p:extLst>
+      <p:ext uri="{BB962C8B-B14F-4D97-AF65-F5344CB8AC3E}">
+        <p14:creationId xmlns:p14="http://schemas.microsoft.com/office/powerpoint/2010/main" val="3030518069"/>
+      </p:ext>
+    </p:extLst>
+  </p:cSld>
+  <p:clrMapOvr>
+    <a:masterClrMapping/>
+  </p:clrMapOvr>
+  <p:timing>
+    <p:tnLst>
+      <p:par>
+        <p:cTn id="1" dur="indefinite" restart="never" nodeType="tmRoot"/>
+      </p:par>
+    </p:tnLst>
+  </p:timing>
+</p:sld>
+</file>
+
+<file path=ppt/slides/slide16.xml><?xml version="1.0" encoding="utf-8"?>
+<p:sld xmlns:a="http://schemas.openxmlformats.org/drawingml/2006/main" xmlns:r="http://schemas.openxmlformats.org/officeDocument/2006/relationships" xmlns:p="http://schemas.openxmlformats.org/presentationml/2006/main">
+  <p:cSld>
+    <p:spTree>
+      <p:nvGrpSpPr>
+        <p:cNvPr id="1" name=""/>
+        <p:cNvGrpSpPr/>
+        <p:nvPr/>
+      </p:nvGrpSpPr>
+      <p:grpSpPr>
+        <a:xfrm>
+          <a:off x="0" y="0"/>
+          <a:ext cx="0" cy="0"/>
+          <a:chOff x="0" y="0"/>
+          <a:chExt cx="0" cy="0"/>
+        </a:xfrm>
+      </p:grpSpPr>
+      <p:sp>
+        <p:nvSpPr>
+          <p:cNvPr id="2" name="Title 1"/>
+          <p:cNvSpPr>
+            <a:spLocks noGrp="1"/>
+          </p:cNvSpPr>
+          <p:nvPr>
+            <p:ph type="title"/>
+          </p:nvPr>
+        </p:nvSpPr>
+        <p:spPr/>
+        <p:txBody>
+          <a:bodyPr/>
+          <a:lstStyle/>
+          <a:p>
+            <a:pPr algn="ctr"/>
+            <a:r>
+              <a:rPr lang="en-US" u="sng" dirty="0" smtClean="0"/>
+              <a:t>Obstacles and Solutions</a:t>
+            </a:r>
+            <a:endParaRPr lang="en-US" u="sng" dirty="0"/>
+          </a:p>
+        </p:txBody>
+      </p:sp>
+      <p:sp>
+        <p:nvSpPr>
+          <p:cNvPr id="3" name="Content Placeholder 2"/>
+          <p:cNvSpPr>
+            <a:spLocks noGrp="1"/>
+          </p:cNvSpPr>
+          <p:nvPr>
+            <p:ph idx="1"/>
+          </p:nvPr>
+        </p:nvSpPr>
+        <p:spPr/>
+        <p:txBody>
+          <a:bodyPr>
+            <a:normAutofit/>
+          </a:bodyPr>
+          <a:lstStyle/>
+          <a:p>
+            <a:pPr lvl="0"/>
+            <a:r>
+              <a:rPr lang="en-US" dirty="0"/>
+              <a:t>Data import:</a:t>
+            </a:r>
+            <a:endParaRPr lang="en-US" sz="2800" dirty="0"/>
+          </a:p>
+          <a:p>
+            <a:pPr lvl="1"/>
+            <a:r>
+              <a:rPr lang="en-US" dirty="0"/>
+              <a:t>Problem: ~200 x 4 million dataset breaks R </a:t>
+            </a:r>
+            <a:endParaRPr lang="en-US" dirty="0" smtClean="0"/>
+          </a:p>
+          <a:p>
+            <a:pPr lvl="1"/>
+            <a:r>
+              <a:rPr lang="en-US" dirty="0" smtClean="0"/>
+              <a:t>Solution</a:t>
+            </a:r>
+            <a:r>
+              <a:rPr lang="en-US" dirty="0"/>
+              <a:t>: </a:t>
+            </a:r>
+            <a:r>
+              <a:rPr lang="en-US" dirty="0" smtClean="0"/>
+              <a:t>Use </a:t>
+            </a:r>
+            <a:r>
+              <a:rPr lang="en-US" i="1" dirty="0" smtClean="0"/>
+              <a:t>cut</a:t>
+            </a:r>
+            <a:r>
+              <a:rPr lang="en-US" dirty="0" smtClean="0"/>
+              <a:t> to find columns of interest</a:t>
+            </a:r>
+            <a:endParaRPr lang="en-US" dirty="0"/>
+          </a:p>
+          <a:p>
+            <a:pPr lvl="0"/>
+            <a:r>
+              <a:rPr lang="en-US" dirty="0"/>
+              <a:t>Code compatibility:</a:t>
+            </a:r>
+            <a:endParaRPr lang="en-US" sz="2800" dirty="0"/>
+          </a:p>
+          <a:p>
+            <a:pPr lvl="1"/>
+            <a:r>
+              <a:rPr lang="en-US" dirty="0"/>
+              <a:t>Problem: 1 mac, 3 </a:t>
+            </a:r>
+            <a:r>
+              <a:rPr lang="en-US" dirty="0" smtClean="0"/>
+              <a:t>windows </a:t>
+            </a:r>
+          </a:p>
+          <a:p>
+            <a:pPr lvl="1"/>
+            <a:r>
+              <a:rPr lang="en-US" dirty="0" smtClean="0"/>
+              <a:t>Solution</a:t>
+            </a:r>
+            <a:r>
+              <a:rPr lang="en-US" dirty="0"/>
+              <a:t>: upload modified data file to </a:t>
+            </a:r>
+            <a:r>
+              <a:rPr lang="en-US" dirty="0" err="1"/>
+              <a:t>g</a:t>
+            </a:r>
+            <a:r>
+              <a:rPr lang="en-US" dirty="0" err="1" smtClean="0"/>
+              <a:t>it</a:t>
+            </a:r>
+            <a:r>
+              <a:rPr lang="en-US" dirty="0" smtClean="0"/>
+              <a:t> repo</a:t>
+            </a:r>
+            <a:endParaRPr lang="en-US" sz="2400" dirty="0" smtClean="0"/>
+          </a:p>
+          <a:p>
+            <a:pPr lvl="0"/>
+            <a:r>
+              <a:rPr lang="en-US" dirty="0" smtClean="0"/>
+              <a:t>Accidental branch diversion:</a:t>
+            </a:r>
+            <a:endParaRPr lang="en-US" sz="2800" dirty="0" smtClean="0"/>
+          </a:p>
+          <a:p>
+            <a:pPr lvl="1"/>
+            <a:r>
+              <a:rPr lang="en-US" dirty="0" smtClean="0"/>
+              <a:t>Problem</a:t>
+            </a:r>
+            <a:r>
+              <a:rPr lang="en-US" dirty="0"/>
+              <a:t>: </a:t>
+            </a:r>
+            <a:r>
+              <a:rPr lang="en-US" dirty="0" smtClean="0"/>
+              <a:t>Accidental split/merge</a:t>
+            </a:r>
+            <a:endParaRPr lang="en-US" sz="2400" dirty="0"/>
+          </a:p>
+          <a:p>
+            <a:pPr lvl="1"/>
+            <a:r>
+              <a:rPr lang="en-US" dirty="0"/>
+              <a:t>Solution: Version control </a:t>
+            </a:r>
+            <a:r>
+              <a:rPr lang="en-US" dirty="0" smtClean="0"/>
+              <a:t>allows manual </a:t>
+            </a:r>
+            <a:r>
+              <a:rPr lang="en-US" dirty="0"/>
+              <a:t>reversion to previous versions</a:t>
+            </a:r>
+            <a:endParaRPr lang="en-US" sz="2400" dirty="0"/>
+          </a:p>
+          <a:p>
+            <a:pPr lvl="0"/>
+            <a:endParaRPr lang="en-US" sz="4400" dirty="0"/>
+          </a:p>
+        </p:txBody>
+      </p:sp>
+    </p:spTree>
+    <p:extLst>
+      <p:ext uri="{BB962C8B-B14F-4D97-AF65-F5344CB8AC3E}">
+        <p14:creationId xmlns:p14="http://schemas.microsoft.com/office/powerpoint/2010/main" val="994255640"/>
+      </p:ext>
+    </p:extLst>
+  </p:cSld>
+  <p:clrMapOvr>
+    <a:masterClrMapping/>
+  </p:clrMapOvr>
+  <p:timing>
+    <p:tnLst>
+      <p:par>
+        <p:cTn id="1" dur="indefinite" restart="never" nodeType="tmRoot"/>
+      </p:par>
+    </p:tnLst>
+  </p:timing>
+</p:sld>
+</file>
+
+<file path=ppt/slides/slide17.xml><?xml version="1.0" encoding="utf-8"?>
+<p:sld xmlns:a="http://schemas.openxmlformats.org/drawingml/2006/main" xmlns:r="http://schemas.openxmlformats.org/officeDocument/2006/relationships" xmlns:p="http://schemas.openxmlformats.org/presentationml/2006/main">
+  <p:cSld>
+    <p:spTree>
+      <p:nvGrpSpPr>
+        <p:cNvPr id="1" name=""/>
+        <p:cNvGrpSpPr/>
+        <p:nvPr/>
+      </p:nvGrpSpPr>
+      <p:grpSpPr>
+        <a:xfrm>
+          <a:off x="0" y="0"/>
+          <a:ext cx="0" cy="0"/>
+          <a:chOff x="0" y="0"/>
+          <a:chExt cx="0" cy="0"/>
+        </a:xfrm>
+      </p:grpSpPr>
+      <p:sp>
+        <p:nvSpPr>
+          <p:cNvPr id="2" name="Title 1"/>
+          <p:cNvSpPr>
+            <a:spLocks noGrp="1"/>
+          </p:cNvSpPr>
+          <p:nvPr>
+            <p:ph type="title"/>
+          </p:nvPr>
+        </p:nvSpPr>
+        <p:spPr/>
+        <p:txBody>
+          <a:bodyPr/>
+          <a:lstStyle/>
+          <a:p>
+            <a:pPr algn="ctr"/>
+            <a:r>
+              <a:rPr lang="en-US" u="sng" dirty="0" smtClean="0"/>
+              <a:t>Future Work</a:t>
+            </a:r>
+            <a:endParaRPr lang="en-US" u="sng" dirty="0"/>
+          </a:p>
+        </p:txBody>
+      </p:sp>
+      <p:sp>
+        <p:nvSpPr>
+          <p:cNvPr id="3" name="Content Placeholder 2"/>
+          <p:cNvSpPr>
+            <a:spLocks noGrp="1"/>
+          </p:cNvSpPr>
+          <p:nvPr>
+            <p:ph idx="1"/>
+          </p:nvPr>
+        </p:nvSpPr>
+        <p:spPr/>
+        <p:txBody>
+          <a:bodyPr>
+            <a:normAutofit/>
+          </a:bodyPr>
+          <a:lstStyle/>
+          <a:p>
+            <a:pPr lvl="0"/>
+            <a:r>
+              <a:rPr lang="en-US" dirty="0" smtClean="0"/>
+              <a:t>Different groups</a:t>
+            </a:r>
+          </a:p>
+          <a:p>
+            <a:pPr lvl="1"/>
+            <a:r>
+              <a:rPr lang="en-US" sz="1900" dirty="0" smtClean="0"/>
+              <a:t>per </a:t>
+            </a:r>
+            <a:r>
+              <a:rPr lang="en-US" sz="1900" dirty="0"/>
+              <a:t>state based on </a:t>
+            </a:r>
+            <a:r>
+              <a:rPr lang="en-US" sz="1900" dirty="0" smtClean="0"/>
+              <a:t>year</a:t>
+            </a:r>
+          </a:p>
+          <a:p>
+            <a:pPr lvl="1"/>
+            <a:r>
+              <a:rPr lang="en-US" sz="1900" dirty="0" smtClean="0"/>
+              <a:t>by </a:t>
+            </a:r>
+            <a:r>
+              <a:rPr lang="en-US" sz="1900" dirty="0"/>
+              <a:t>region (East, South, West, Midwest</a:t>
+            </a:r>
+            <a:r>
+              <a:rPr lang="en-US" sz="1900" dirty="0" smtClean="0"/>
+              <a:t>)</a:t>
+            </a:r>
+          </a:p>
+          <a:p>
+            <a:pPr lvl="1"/>
+            <a:r>
+              <a:rPr lang="en-US" sz="1900" dirty="0"/>
+              <a:t>Examine counts – what proportion of </a:t>
+            </a:r>
+            <a:r>
+              <a:rPr lang="en-US" sz="1900" dirty="0" smtClean="0"/>
+              <a:t>households </a:t>
+            </a:r>
+            <a:r>
+              <a:rPr lang="en-US" sz="1900" dirty="0"/>
+              <a:t>fall into what category in each state? </a:t>
+            </a:r>
+            <a:r>
+              <a:rPr lang="en-US" sz="1900" dirty="0" smtClean="0"/>
+              <a:t>Is it similar across states.</a:t>
+            </a:r>
+            <a:endParaRPr lang="en-US" dirty="0"/>
+          </a:p>
+          <a:p>
+            <a:pPr lvl="0"/>
+            <a:r>
+              <a:rPr lang="en-US" dirty="0"/>
+              <a:t>Examine differences between each of the 4 household ownership types</a:t>
+            </a:r>
+            <a:endParaRPr lang="en-US" sz="2800" dirty="0"/>
+          </a:p>
+          <a:p>
+            <a:pPr lvl="1"/>
+            <a:r>
+              <a:rPr lang="en-US" sz="1900" dirty="0"/>
+              <a:t>Hypothesize that free &amp; clear owners are retired, mortgage payers are still </a:t>
+            </a:r>
+            <a:r>
+              <a:rPr lang="en-US" sz="1900" dirty="0" smtClean="0"/>
+              <a:t>working</a:t>
+            </a:r>
+            <a:endParaRPr lang="en-US" sz="1900" dirty="0"/>
+          </a:p>
+          <a:p>
+            <a:pPr lvl="0"/>
+            <a:r>
+              <a:rPr lang="en-US" dirty="0" smtClean="0"/>
+              <a:t>Take </a:t>
+            </a:r>
+            <a:r>
+              <a:rPr lang="en-US" dirty="0"/>
+              <a:t>into consideration negative and null </a:t>
+            </a:r>
+            <a:r>
+              <a:rPr lang="en-US" dirty="0" smtClean="0"/>
+              <a:t>income</a:t>
+            </a:r>
+          </a:p>
+          <a:p>
+            <a:r>
+              <a:rPr lang="en-US" dirty="0"/>
+              <a:t>Include </a:t>
+            </a:r>
+            <a:r>
+              <a:rPr lang="en-US" dirty="0" smtClean="0"/>
+              <a:t>weighting, inflation.</a:t>
+            </a:r>
+            <a:endParaRPr lang="en-US" sz="2800" dirty="0"/>
+          </a:p>
+          <a:p>
+            <a:pPr lvl="0"/>
+            <a:endParaRPr lang="en-US" dirty="0" smtClean="0"/>
+          </a:p>
+        </p:txBody>
+      </p:sp>
+    </p:spTree>
+    <p:extLst>
+      <p:ext uri="{BB962C8B-B14F-4D97-AF65-F5344CB8AC3E}">
+        <p14:creationId xmlns:p14="http://schemas.microsoft.com/office/powerpoint/2010/main" val="562526258"/>
+      </p:ext>
+    </p:extLst>
+  </p:cSld>
+  <p:clrMapOvr>
+    <a:masterClrMapping/>
+  </p:clrMapOvr>
+  <p:timing>
+    <p:tnLst>
+      <p:par>
+        <p:cTn id="1" dur="indefinite" restart="never" nodeType="tmRoot"/>
+      </p:par>
+    </p:tnLst>
+  </p:timing>
+</p:sld>
+</file>
+
+<file path=ppt/slides/slide2.xml><?xml version="1.0" encoding="utf-8"?>
+<p:sld xmlns:a="http://schemas.openxmlformats.org/drawingml/2006/main" xmlns:r="http://schemas.openxmlformats.org/officeDocument/2006/relationships" xmlns:p="http://schemas.openxmlformats.org/presentationml/2006/main">
+  <p:cSld>
+    <p:spTree>
+      <p:nvGrpSpPr>
+        <p:cNvPr id="1" name=""/>
+        <p:cNvGrpSpPr/>
+        <p:nvPr/>
+      </p:nvGrpSpPr>
+      <p:grpSpPr>
+        <a:xfrm>
+          <a:off x="0" y="0"/>
+          <a:ext cx="0" cy="0"/>
+          <a:chOff x="0" y="0"/>
+          <a:chExt cx="0" cy="0"/>
+        </a:xfrm>
+      </p:grpSpPr>
+      <p:sp>
+        <p:nvSpPr>
+          <p:cNvPr id="2" name="Title 1"/>
+          <p:cNvSpPr>
+            <a:spLocks noGrp="1"/>
+          </p:cNvSpPr>
+          <p:nvPr>
+            <p:ph type="title"/>
+          </p:nvPr>
+        </p:nvSpPr>
+        <p:spPr/>
+        <p:txBody>
+          <a:bodyPr/>
+          <a:lstStyle/>
+          <a:p>
+            <a:pPr algn="ctr"/>
+            <a:r>
+              <a:rPr lang="en-US" u="sng" dirty="0" smtClean="0"/>
+              <a:t>Overview</a:t>
+            </a:r>
+            <a:endParaRPr lang="en-US" u="sng" dirty="0"/>
+          </a:p>
+        </p:txBody>
+      </p:sp>
+      <p:sp>
+        <p:nvSpPr>
+          <p:cNvPr id="3" name="Content Placeholder 2"/>
+          <p:cNvSpPr>
+            <a:spLocks noGrp="1"/>
+          </p:cNvSpPr>
+          <p:nvPr>
+            <p:ph idx="1"/>
+          </p:nvPr>
+        </p:nvSpPr>
+        <p:spPr/>
+        <p:txBody>
+          <a:bodyPr/>
+          <a:lstStyle/>
+          <a:p>
+            <a:r>
+              <a:rPr lang="en-US" dirty="0" smtClean="0"/>
+              <a:t>Data: American </a:t>
+            </a:r>
+            <a:r>
+              <a:rPr lang="en-US" dirty="0"/>
+              <a:t>Community Survey (ACS) </a:t>
+            </a:r>
+            <a:endParaRPr lang="en-US" dirty="0" smtClean="0"/>
+          </a:p>
+          <a:p>
+            <a:endParaRPr lang="en-US" dirty="0" smtClean="0"/>
+          </a:p>
+          <a:p>
+            <a:r>
+              <a:rPr lang="en-US" dirty="0" smtClean="0"/>
+              <a:t>Distributed each yearly </a:t>
+            </a:r>
+          </a:p>
+          <a:p>
+            <a:endParaRPr lang="en-US" dirty="0" smtClean="0"/>
+          </a:p>
+          <a:p>
+            <a:r>
+              <a:rPr lang="en-US" dirty="0" smtClean="0"/>
+              <a:t>The </a:t>
+            </a:r>
+            <a:r>
+              <a:rPr lang="en-US" dirty="0"/>
+              <a:t>ACS collects social, </a:t>
+            </a:r>
+            <a:r>
+              <a:rPr lang="en-US" dirty="0">
+                <a:solidFill>
+                  <a:srgbClr val="FF0000"/>
+                </a:solidFill>
+              </a:rPr>
+              <a:t>economic, housing </a:t>
+            </a:r>
+            <a:r>
+              <a:rPr lang="en-US" dirty="0"/>
+              <a:t>and demographic data. </a:t>
+            </a:r>
+            <a:endParaRPr lang="en-US" dirty="0" smtClean="0"/>
+          </a:p>
+          <a:p>
+            <a:endParaRPr lang="en-US" dirty="0"/>
+          </a:p>
+          <a:p>
+            <a:r>
+              <a:rPr lang="en-US" dirty="0" smtClean="0"/>
+              <a:t>3 year ACS (2010-2012)</a:t>
+            </a:r>
+            <a:endParaRPr lang="en-US" dirty="0"/>
+          </a:p>
+        </p:txBody>
+      </p:sp>
+    </p:spTree>
+    <p:extLst>
+      <p:ext uri="{BB962C8B-B14F-4D97-AF65-F5344CB8AC3E}">
+        <p14:creationId xmlns:p14="http://schemas.microsoft.com/office/powerpoint/2010/main" val="4158567981"/>
+      </p:ext>
+    </p:extLst>
+  </p:cSld>
+  <p:clrMapOvr>
+    <a:masterClrMapping/>
+  </p:clrMapOvr>
+  <p:timing>
+    <p:tnLst>
+      <p:par>
+        <p:cTn id="1" dur="indefinite" restart="never" nodeType="tmRoot"/>
+      </p:par>
+    </p:tnLst>
+  </p:timing>
+</p:sld>
+</file>
+
+<file path=ppt/slides/slide3.xml><?xml version="1.0" encoding="utf-8"?>
+<p:sld xmlns:a="http://schemas.openxmlformats.org/drawingml/2006/main" xmlns:r="http://schemas.openxmlformats.org/officeDocument/2006/relationships" xmlns:p="http://schemas.openxmlformats.org/presentationml/2006/main">
+  <p:cSld>
+    <p:spTree>
+      <p:nvGrpSpPr>
+        <p:cNvPr id="1" name=""/>
+        <p:cNvGrpSpPr/>
+        <p:nvPr/>
+      </p:nvGrpSpPr>
+      <p:grpSpPr>
+        <a:xfrm>
+          <a:off x="0" y="0"/>
+          <a:ext cx="0" cy="0"/>
+          <a:chOff x="0" y="0"/>
+          <a:chExt cx="0" cy="0"/>
+        </a:xfrm>
+      </p:grpSpPr>
+      <p:sp>
+        <p:nvSpPr>
+          <p:cNvPr id="2" name="Title 1"/>
+          <p:cNvSpPr>
+            <a:spLocks noGrp="1"/>
+          </p:cNvSpPr>
+          <p:nvPr>
+            <p:ph type="title"/>
+          </p:nvPr>
+        </p:nvSpPr>
+        <p:spPr/>
+        <p:txBody>
+          <a:bodyPr/>
+          <a:lstStyle/>
+          <a:p>
+            <a:pPr algn="ctr"/>
+            <a:r>
+              <a:rPr lang="en-US" u="sng" dirty="0" smtClean="0"/>
+              <a:t>Question of Interest</a:t>
+            </a:r>
+            <a:endParaRPr lang="en-US" u="sng" dirty="0"/>
+          </a:p>
+        </p:txBody>
+      </p:sp>
+      <p:sp>
+        <p:nvSpPr>
+          <p:cNvPr id="3" name="Content Placeholder 2"/>
+          <p:cNvSpPr>
+            <a:spLocks noGrp="1"/>
+          </p:cNvSpPr>
+          <p:nvPr>
+            <p:ph idx="1"/>
+          </p:nvPr>
+        </p:nvSpPr>
+        <p:spPr/>
+        <p:txBody>
+          <a:bodyPr/>
+          <a:lstStyle/>
+          <a:p>
+            <a:r>
+              <a:rPr lang="en-US" i="1" dirty="0"/>
+              <a:t>How different are the mean household incomes for different household ownership </a:t>
+            </a:r>
+            <a:r>
+              <a:rPr lang="en-US" i="1" dirty="0" smtClean="0"/>
+              <a:t>in </a:t>
+            </a:r>
+            <a:r>
+              <a:rPr lang="en-US" i="1" dirty="0"/>
+              <a:t>the </a:t>
+            </a:r>
+            <a:r>
+              <a:rPr lang="en-US" i="1" dirty="0" smtClean="0"/>
+              <a:t>US?</a:t>
+            </a:r>
+          </a:p>
+          <a:p>
+            <a:endParaRPr lang="en-US" i="1" dirty="0"/>
+          </a:p>
+          <a:p>
+            <a:r>
+              <a:rPr lang="en-US" i="1" dirty="0" smtClean="0"/>
+              <a:t>Household ownership types:</a:t>
+            </a:r>
+          </a:p>
+          <a:p>
+            <a:pPr marL="731520" lvl="1" indent="-457200">
+              <a:buFont typeface="+mj-lt"/>
+              <a:buAutoNum type="arabicPeriod"/>
+            </a:pPr>
+            <a:r>
+              <a:rPr lang="en-US" i="1" dirty="0"/>
+              <a:t>O</a:t>
+            </a:r>
+            <a:r>
+              <a:rPr lang="en-US" i="1" dirty="0" smtClean="0"/>
+              <a:t>wn </a:t>
+            </a:r>
+            <a:r>
+              <a:rPr lang="en-US" i="1" dirty="0"/>
+              <a:t>with a mortgage or </a:t>
+            </a:r>
+            <a:r>
+              <a:rPr lang="en-US" i="1" dirty="0" smtClean="0"/>
+              <a:t>loan </a:t>
+            </a:r>
+          </a:p>
+          <a:p>
+            <a:pPr marL="731520" lvl="1" indent="-457200">
+              <a:buFont typeface="+mj-lt"/>
+              <a:buAutoNum type="arabicPeriod"/>
+            </a:pPr>
+            <a:r>
+              <a:rPr lang="en-US" i="1" dirty="0"/>
+              <a:t>O</a:t>
+            </a:r>
+            <a:r>
+              <a:rPr lang="en-US" i="1" dirty="0" smtClean="0"/>
+              <a:t>wn </a:t>
+            </a:r>
+            <a:r>
+              <a:rPr lang="en-US" i="1" dirty="0"/>
+              <a:t>free and </a:t>
+            </a:r>
+            <a:r>
+              <a:rPr lang="en-US" i="1" dirty="0" smtClean="0"/>
+              <a:t>clear</a:t>
+            </a:r>
+          </a:p>
+          <a:p>
+            <a:pPr marL="731520" lvl="1" indent="-457200">
+              <a:buFont typeface="+mj-lt"/>
+              <a:buAutoNum type="arabicPeriod"/>
+            </a:pPr>
+            <a:r>
+              <a:rPr lang="en-US" i="1" dirty="0" smtClean="0"/>
+              <a:t>Rented</a:t>
+            </a:r>
+          </a:p>
+          <a:p>
+            <a:pPr marL="731520" lvl="1" indent="-457200">
+              <a:buFont typeface="+mj-lt"/>
+              <a:buAutoNum type="arabicPeriod"/>
+            </a:pPr>
+            <a:r>
+              <a:rPr lang="en-US" i="1" dirty="0"/>
+              <a:t>O</a:t>
+            </a:r>
+            <a:r>
+              <a:rPr lang="en-US" i="1" dirty="0" smtClean="0"/>
+              <a:t>ccupied </a:t>
+            </a:r>
+            <a:r>
+              <a:rPr lang="en-US" i="1" dirty="0"/>
+              <a:t>without payment of rent</a:t>
+            </a:r>
+            <a:endParaRPr lang="en-US" dirty="0"/>
+          </a:p>
+          <a:p>
+            <a:endParaRPr lang="en-US" dirty="0" smtClean="0"/>
+          </a:p>
+          <a:p>
+            <a:pPr marL="0" indent="0">
+              <a:buNone/>
+            </a:pPr>
+            <a:endParaRPr lang="en-US" sz="2000" dirty="0"/>
+          </a:p>
+        </p:txBody>
+      </p:sp>
+    </p:spTree>
+    <p:extLst>
+      <p:ext uri="{BB962C8B-B14F-4D97-AF65-F5344CB8AC3E}">
+        <p14:creationId xmlns:p14="http://schemas.microsoft.com/office/powerpoint/2010/main" val="76887766"/>
+      </p:ext>
+    </p:extLst>
+  </p:cSld>
+  <p:clrMapOvr>
+    <a:masterClrMapping/>
+  </p:clrMapOvr>
+  <p:timing>
+    <p:tnLst>
+      <p:par>
+        <p:cTn id="1" dur="indefinite" restart="never" nodeType="tmRoot"/>
+      </p:par>
+    </p:tnLst>
+  </p:timing>
+</p:sld>
+</file>
+
+<file path=ppt/slides/slide4.xml><?xml version="1.0" encoding="utf-8"?>
+<p:sld xmlns:a="http://schemas.openxmlformats.org/drawingml/2006/main" xmlns:r="http://schemas.openxmlformats.org/officeDocument/2006/relationships" xmlns:p="http://schemas.openxmlformats.org/presentationml/2006/main">
+  <p:cSld>
+    <p:spTree>
+      <p:nvGrpSpPr>
+        <p:cNvPr id="1" name=""/>
+        <p:cNvGrpSpPr/>
+        <p:nvPr/>
+      </p:nvGrpSpPr>
+      <p:grpSpPr>
+        <a:xfrm>
+          <a:off x="0" y="0"/>
+          <a:ext cx="0" cy="0"/>
+          <a:chOff x="0" y="0"/>
+          <a:chExt cx="0" cy="0"/>
+        </a:xfrm>
+      </p:grpSpPr>
+      <p:pic>
+        <p:nvPicPr>
+          <p:cNvPr id="4" name="Content Placeholder 3" descr="Panel map.png"/>
+          <p:cNvPicPr>
+            <a:picLocks noGrp="1"/>
+          </p:cNvPicPr>
+          <p:nvPr>
+            <p:ph idx="1"/>
+          </p:nvPr>
+        </p:nvPicPr>
+        <p:blipFill>
+          <a:blip r:embed="rId3" cstate="print"/>
+          <a:stretch>
+            <a:fillRect/>
+          </a:stretch>
+        </p:blipFill>
+        <p:spPr>
+          <a:xfrm>
+            <a:off x="609600" y="990600"/>
+            <a:ext cx="8027984" cy="5334000"/>
+          </a:xfrm>
+          <a:prstGeom prst="rect">
+            <a:avLst/>
+          </a:prstGeom>
+        </p:spPr>
+      </p:pic>
+      <p:sp>
+        <p:nvSpPr>
+          <p:cNvPr id="3" name="Title 1"/>
+          <p:cNvSpPr>
+            <a:spLocks noGrp="1"/>
+          </p:cNvSpPr>
+          <p:nvPr>
+            <p:ph type="title"/>
+          </p:nvPr>
+        </p:nvSpPr>
+        <p:spPr>
+          <a:xfrm>
+            <a:off x="457200" y="381000"/>
+            <a:ext cx="8229600" cy="685800"/>
+          </a:xfrm>
+        </p:spPr>
+        <p:txBody>
+          <a:bodyPr>
+            <a:normAutofit fontScale="90000"/>
+          </a:bodyPr>
+          <a:lstStyle/>
+          <a:p>
+            <a:pPr algn="ctr"/>
+            <a:r>
+              <a:rPr lang="en-US" u="sng" dirty="0" smtClean="0"/>
+              <a:t>Findings</a:t>
+            </a:r>
+            <a:endParaRPr lang="en-US" u="sng" dirty="0"/>
+          </a:p>
+        </p:txBody>
+      </p:sp>
+    </p:spTree>
+    <p:extLst>
+      <p:ext uri="{BB962C8B-B14F-4D97-AF65-F5344CB8AC3E}">
+        <p14:creationId xmlns:p14="http://schemas.microsoft.com/office/powerpoint/2010/main" val="1996770165"/>
+      </p:ext>
+    </p:extLst>
+  </p:cSld>
+  <p:clrMapOvr>
+    <a:masterClrMapping/>
+  </p:clrMapOvr>
+  <p:timing>
+    <p:tnLst>
+      <p:par>
+        <p:cTn id="1" dur="indefinite" restart="never" nodeType="tmRoot"/>
+      </p:par>
+    </p:tnLst>
+  </p:timing>
+</p:sld>
+</file>
+
+<file path=ppt/slides/slide5.xml><?xml version="1.0" encoding="utf-8"?>
+<p:sld xmlns:a="http://schemas.openxmlformats.org/drawingml/2006/main" xmlns:r="http://schemas.openxmlformats.org/officeDocument/2006/relationships" xmlns:p="http://schemas.openxmlformats.org/presentationml/2006/main">
+  <p:cSld>
+    <p:spTree>
+      <p:nvGrpSpPr>
+        <p:cNvPr id="1" name=""/>
+        <p:cNvGrpSpPr/>
+        <p:nvPr/>
+      </p:nvGrpSpPr>
+      <p:grpSpPr>
+        <a:xfrm>
+          <a:off x="0" y="0"/>
+          <a:ext cx="0" cy="0"/>
+          <a:chOff x="0" y="0"/>
+          <a:chExt cx="0" cy="0"/>
+        </a:xfrm>
+      </p:grpSpPr>
+      <p:sp>
+        <p:nvSpPr>
+          <p:cNvPr id="3" name="Title 1"/>
+          <p:cNvSpPr>
+            <a:spLocks noGrp="1"/>
+          </p:cNvSpPr>
+          <p:nvPr>
+            <p:ph type="title"/>
+          </p:nvPr>
+        </p:nvSpPr>
+        <p:spPr>
+          <a:xfrm>
+            <a:off x="457200" y="381000"/>
+            <a:ext cx="8229600" cy="685800"/>
+          </a:xfrm>
+        </p:spPr>
+        <p:txBody>
+          <a:bodyPr>
+            <a:normAutofit fontScale="90000"/>
+          </a:bodyPr>
+          <a:lstStyle/>
+          <a:p>
+            <a:pPr algn="ctr"/>
+            <a:r>
+              <a:rPr lang="en-US" u="sng" dirty="0" smtClean="0"/>
+              <a:t>Findings</a:t>
+            </a:r>
+            <a:endParaRPr lang="en-US" u="sng" dirty="0"/>
+          </a:p>
+        </p:txBody>
+      </p:sp>
+      <p:pic>
+        <p:nvPicPr>
+          <p:cNvPr id="5" name="Picture 4"/>
+          <p:cNvPicPr/>
+          <p:nvPr/>
+        </p:nvPicPr>
+        <p:blipFill>
+          <a:blip r:embed="rId3"/>
+          <a:stretch>
+            <a:fillRect/>
+          </a:stretch>
+        </p:blipFill>
+        <p:spPr>
+          <a:xfrm>
+            <a:off x="38100" y="1066800"/>
+            <a:ext cx="9067800" cy="5876925"/>
+          </a:xfrm>
+          <a:prstGeom prst="rect">
+            <a:avLst/>
+          </a:prstGeom>
+        </p:spPr>
+      </p:pic>
+    </p:spTree>
+    <p:extLst>
+      <p:ext uri="{BB962C8B-B14F-4D97-AF65-F5344CB8AC3E}">
+        <p14:creationId xmlns:p14="http://schemas.microsoft.com/office/powerpoint/2010/main" val="965784278"/>
+      </p:ext>
+    </p:extLst>
+  </p:cSld>
+  <p:clrMapOvr>
+    <a:masterClrMapping/>
+  </p:clrMapOvr>
+  <p:timing>
+    <p:tnLst>
+      <p:par>
+        <p:cTn id="1" dur="indefinite" restart="never" nodeType="tmRoot"/>
+      </p:par>
+    </p:tnLst>
+  </p:timing>
+</p:sld>
+</file>
+
+<file path=ppt/slides/slide6.xml><?xml version="1.0" encoding="utf-8"?>
+<p:sld xmlns:a="http://schemas.openxmlformats.org/drawingml/2006/main" xmlns:r="http://schemas.openxmlformats.org/officeDocument/2006/relationships" xmlns:p="http://schemas.openxmlformats.org/presentationml/2006/main">
+  <p:cSld>
+    <p:spTree>
+      <p:nvGrpSpPr>
+        <p:cNvPr id="1" name=""/>
+        <p:cNvGrpSpPr/>
+        <p:nvPr/>
+      </p:nvGrpSpPr>
+      <p:grpSpPr>
+        <a:xfrm>
+          <a:off x="0" y="0"/>
+          <a:ext cx="0" cy="0"/>
+          <a:chOff x="0" y="0"/>
+          <a:chExt cx="0" cy="0"/>
+        </a:xfrm>
+      </p:grpSpPr>
+      <p:sp>
+        <p:nvSpPr>
+          <p:cNvPr id="2" name="Title 1"/>
+          <p:cNvSpPr>
+            <a:spLocks noGrp="1"/>
+          </p:cNvSpPr>
+          <p:nvPr>
+            <p:ph type="title"/>
+          </p:nvPr>
+        </p:nvSpPr>
+        <p:spPr>
+          <a:xfrm>
+            <a:off x="533400" y="533400"/>
+            <a:ext cx="8229600" cy="990600"/>
+          </a:xfrm>
+        </p:spPr>
+        <p:txBody>
+          <a:bodyPr/>
+          <a:lstStyle/>
+          <a:p>
+            <a:pPr algn="ctr"/>
+            <a:r>
+              <a:rPr lang="en-US" dirty="0" smtClean="0"/>
+              <a:t>Findings</a:t>
+            </a:r>
+            <a:endParaRPr lang="en-US" dirty="0"/>
+          </a:p>
+        </p:txBody>
+      </p:sp>
+      <p:sp>
+        <p:nvSpPr>
+          <p:cNvPr id="3" name="Content Placeholder 2"/>
+          <p:cNvSpPr>
+            <a:spLocks noGrp="1"/>
+          </p:cNvSpPr>
+          <p:nvPr>
+            <p:ph idx="1"/>
+          </p:nvPr>
+        </p:nvSpPr>
+        <p:spPr>
+          <a:xfrm>
+            <a:off x="6314440" y="1636931"/>
+            <a:ext cx="2667000" cy="4876800"/>
+          </a:xfrm>
+        </p:spPr>
+        <p:txBody>
+          <a:bodyPr>
+            <a:normAutofit/>
+          </a:bodyPr>
+          <a:lstStyle/>
+          <a:p>
+            <a:pPr marL="0" indent="0">
+              <a:buNone/>
+            </a:pPr>
+            <a:r>
+              <a:rPr lang="en-US" dirty="0"/>
+              <a:t>H</a:t>
+            </a:r>
+            <a:r>
+              <a:rPr lang="en-US" dirty="0" smtClean="0"/>
+              <a:t>ighest mean in</a:t>
+            </a:r>
+          </a:p>
+          <a:p>
+            <a:pPr marL="457200" indent="-457200">
+              <a:buFont typeface="+mj-lt"/>
+              <a:buAutoNum type="arabicPeriod"/>
+            </a:pPr>
+            <a:r>
+              <a:rPr lang="en-US" sz="2200" dirty="0" smtClean="0"/>
+              <a:t>D.C</a:t>
+            </a:r>
+            <a:r>
+              <a:rPr lang="en-US" sz="2200" dirty="0"/>
+              <a:t>. </a:t>
+            </a:r>
+            <a:endParaRPr lang="en-US" sz="2200" dirty="0" smtClean="0"/>
+          </a:p>
+          <a:p>
+            <a:pPr marL="0" indent="0">
+              <a:buNone/>
+            </a:pPr>
+            <a:r>
+              <a:rPr lang="en-US" sz="2200" dirty="0" smtClean="0"/>
+              <a:t>      ($</a:t>
+            </a:r>
+            <a:r>
+              <a:rPr lang="en-US" sz="2200" dirty="0"/>
+              <a:t>154,465</a:t>
+            </a:r>
+            <a:r>
+              <a:rPr lang="en-US" sz="2200" dirty="0" smtClean="0"/>
+              <a:t>)</a:t>
+            </a:r>
+          </a:p>
+          <a:p>
+            <a:pPr marL="457200" indent="-457200">
+              <a:buFont typeface="+mj-lt"/>
+              <a:buAutoNum type="arabicPeriod"/>
+            </a:pPr>
+            <a:r>
+              <a:rPr lang="en-US" sz="2200" dirty="0" smtClean="0"/>
+              <a:t>Connecticut </a:t>
+            </a:r>
+            <a:r>
+              <a:rPr lang="en-US" sz="2200" dirty="0"/>
+              <a:t>($126,760</a:t>
+            </a:r>
+            <a:r>
+              <a:rPr lang="en-US" sz="2200" dirty="0" smtClean="0"/>
+              <a:t>) </a:t>
+            </a:r>
+          </a:p>
+          <a:p>
+            <a:pPr marL="457200" indent="-457200">
+              <a:buFont typeface="+mj-lt"/>
+              <a:buAutoNum type="arabicPeriod"/>
+            </a:pPr>
+            <a:r>
+              <a:rPr lang="en-US" sz="2200" dirty="0" smtClean="0"/>
+              <a:t>New </a:t>
+            </a:r>
+            <a:r>
+              <a:rPr lang="en-US" sz="2200" dirty="0"/>
+              <a:t>Jersey ($</a:t>
+            </a:r>
+            <a:r>
+              <a:rPr lang="en-US" sz="2200" dirty="0" smtClean="0"/>
+              <a:t>124,364)</a:t>
+            </a:r>
+          </a:p>
+          <a:p>
+            <a:pPr marL="457200" indent="-457200">
+              <a:buFont typeface="+mj-lt"/>
+              <a:buAutoNum type="arabicPeriod"/>
+            </a:pPr>
+            <a:r>
+              <a:rPr lang="en-US" sz="2200" dirty="0" smtClean="0"/>
+              <a:t>Maryland </a:t>
+            </a:r>
+            <a:r>
+              <a:rPr lang="en-US" sz="2200" dirty="0"/>
+              <a:t>($</a:t>
+            </a:r>
+            <a:r>
+              <a:rPr lang="en-US" sz="2200" dirty="0" smtClean="0"/>
+              <a:t>119,358)</a:t>
+            </a:r>
+          </a:p>
+          <a:p>
+            <a:pPr marL="457200" indent="-457200">
+              <a:buFont typeface="+mj-lt"/>
+              <a:buAutoNum type="arabicPeriod"/>
+            </a:pPr>
+            <a:r>
+              <a:rPr lang="en-US" sz="2200" dirty="0" smtClean="0"/>
+              <a:t>Massachusetts </a:t>
+            </a:r>
+            <a:r>
+              <a:rPr lang="en-US" sz="2200" dirty="0"/>
+              <a:t>($118,119</a:t>
+            </a:r>
+            <a:r>
+              <a:rPr lang="en-US" sz="2200" dirty="0" smtClean="0"/>
+              <a:t>)</a:t>
+            </a:r>
+            <a:endParaRPr lang="en-US" sz="2200" dirty="0"/>
+          </a:p>
+          <a:p>
+            <a:endParaRPr lang="en-US" dirty="0"/>
+          </a:p>
+        </p:txBody>
+      </p:sp>
+      <p:pic>
+        <p:nvPicPr>
+          <p:cNvPr id="1026" name="Picture 2"/>
+          <p:cNvPicPr>
+            <a:picLocks noChangeAspect="1" noChangeArrowheads="1"/>
+          </p:cNvPicPr>
+          <p:nvPr/>
+        </p:nvPicPr>
+        <p:blipFill rotWithShape="1">
+          <a:blip r:embed="rId2">
+            <a:extLst>
+              <a:ext uri="{28A0092B-C50C-407E-A947-70E740481C1C}">
+                <a14:useLocalDpi xmlns:a14="http://schemas.microsoft.com/office/drawing/2010/main" val="0"/>
+              </a:ext>
+            </a:extLst>
+          </a:blip>
+          <a:srcRect r="2186"/>
+          <a:stretch/>
+        </p:blipFill>
+        <p:spPr bwMode="auto">
+          <a:xfrm>
+            <a:off x="-15240" y="1752600"/>
+            <a:ext cx="6329680" cy="3657600"/>
+          </a:xfrm>
+          <a:prstGeom prst="rect">
+            <a:avLst/>
+          </a:prstGeom>
+          <a:noFill/>
+          <a:ln>
+            <a:noFill/>
+          </a:ln>
+          <a:extLst>
+            <a:ext uri="{909E8E84-426E-40DD-AFC4-6F175D3DCCD1}">
+              <a14:hiddenFill xmlns:a14="http://schemas.microsoft.com/office/drawing/2010/main">
+                <a:solidFill>
+                  <a:schemeClr val="accent1"/>
+                </a:solidFill>
+              </a14:hiddenFill>
+            </a:ext>
+            <a:ext uri="{91240B29-F687-4F45-9708-019B960494DF}">
+              <a14:hiddenLine xmlns:a14="http://schemas.microsoft.com/office/drawing/2010/main" w="9525">
+                <a:solidFill>
+                  <a:schemeClr val="tx1"/>
+                </a:solidFill>
+                <a:miter lim="800000"/>
+                <a:headEnd/>
+                <a:tailEnd/>
+              </a14:hiddenLine>
+            </a:ext>
+          </a:extLst>
+        </p:spPr>
+      </p:pic>
+      <p:sp>
+        <p:nvSpPr>
+          <p:cNvPr id="4" name="TextBox 3"/>
+          <p:cNvSpPr txBox="1"/>
+          <p:nvPr/>
+        </p:nvSpPr>
+        <p:spPr>
+          <a:xfrm>
+            <a:off x="749300" y="5867400"/>
+            <a:ext cx="4800600" cy="646331"/>
+          </a:xfrm>
+          <a:prstGeom prst="rect">
+            <a:avLst/>
+          </a:prstGeom>
+          <a:noFill/>
+        </p:spPr>
+        <p:txBody>
+          <a:bodyPr wrap="square" rtlCol="0">
+            <a:spAutoFit/>
+          </a:bodyPr>
+          <a:lstStyle/>
+          <a:p>
+            <a:pPr marL="285750" indent="-285750">
+              <a:buFont typeface="Arial" panose="020B0604020202020204" pitchFamily="34" charset="0"/>
+              <a:buChar char="•"/>
+            </a:pPr>
+            <a:r>
+              <a:rPr lang="en-US" dirty="0" smtClean="0"/>
+              <a:t>Similar results for </a:t>
+            </a:r>
+            <a:r>
+              <a:rPr lang="en-US" dirty="0"/>
+              <a:t>those owning free and </a:t>
+            </a:r>
+            <a:r>
+              <a:rPr lang="en-US" dirty="0" smtClean="0"/>
+              <a:t>clear.</a:t>
+            </a:r>
+            <a:endParaRPr lang="en-US" dirty="0"/>
+          </a:p>
+        </p:txBody>
+      </p:sp>
+    </p:spTree>
+    <p:extLst>
+      <p:ext uri="{BB962C8B-B14F-4D97-AF65-F5344CB8AC3E}">
+        <p14:creationId xmlns:p14="http://schemas.microsoft.com/office/powerpoint/2010/main" val="177926487"/>
+      </p:ext>
+    </p:extLst>
+  </p:cSld>
+  <p:clrMapOvr>
+    <a:masterClrMapping/>
+  </p:clrMapOvr>
+</p:sld>
+</file>
+
+<file path=ppt/slides/slide7.xml><?xml version="1.0" encoding="utf-8"?>
+<p:sld xmlns:a="http://schemas.openxmlformats.org/drawingml/2006/main" xmlns:r="http://schemas.openxmlformats.org/officeDocument/2006/relationships" xmlns:p="http://schemas.openxmlformats.org/presentationml/2006/main">
+  <p:cSld>
+    <p:spTree>
+      <p:nvGrpSpPr>
+        <p:cNvPr id="1" name=""/>
+        <p:cNvGrpSpPr/>
+        <p:nvPr/>
+      </p:nvGrpSpPr>
+      <p:grpSpPr>
+        <a:xfrm>
+          <a:off x="0" y="0"/>
+          <a:ext cx="0" cy="0"/>
+          <a:chOff x="0" y="0"/>
+          <a:chExt cx="0" cy="0"/>
+        </a:xfrm>
+      </p:grpSpPr>
+      <p:pic>
+        <p:nvPicPr>
+          <p:cNvPr id="5" name="Picture 4"/>
+          <p:cNvPicPr>
+            <a:picLocks noChangeAspect="1"/>
+          </p:cNvPicPr>
+          <p:nvPr/>
+        </p:nvPicPr>
+        <p:blipFill>
+          <a:blip r:embed="rId2"/>
+          <a:stretch>
+            <a:fillRect/>
+          </a:stretch>
+        </p:blipFill>
+        <p:spPr>
+          <a:xfrm>
+            <a:off x="-4011" y="1178970"/>
+            <a:ext cx="6721028" cy="5081587"/>
+          </a:xfrm>
+          <a:prstGeom prst="rect">
+            <a:avLst/>
+          </a:prstGeom>
+        </p:spPr>
+      </p:pic>
+      <p:sp>
+        <p:nvSpPr>
+          <p:cNvPr id="2" name="Title 1"/>
+          <p:cNvSpPr>
+            <a:spLocks noGrp="1"/>
+          </p:cNvSpPr>
+          <p:nvPr>
+            <p:ph type="title"/>
+          </p:nvPr>
+        </p:nvSpPr>
+        <p:spPr>
+          <a:xfrm>
+            <a:off x="533400" y="533400"/>
+            <a:ext cx="8229600" cy="990600"/>
+          </a:xfrm>
+        </p:spPr>
+        <p:txBody>
+          <a:bodyPr/>
+          <a:lstStyle/>
+          <a:p>
+            <a:pPr algn="ctr"/>
+            <a:r>
+              <a:rPr lang="en-US" dirty="0" smtClean="0"/>
+              <a:t>Findings</a:t>
+            </a:r>
+            <a:endParaRPr lang="en-US" dirty="0"/>
+          </a:p>
+        </p:txBody>
+      </p:sp>
+      <p:sp>
+        <p:nvSpPr>
+          <p:cNvPr id="3" name="Content Placeholder 2"/>
+          <p:cNvSpPr>
+            <a:spLocks noGrp="1"/>
+          </p:cNvSpPr>
+          <p:nvPr>
+            <p:ph idx="1"/>
+          </p:nvPr>
+        </p:nvSpPr>
+        <p:spPr>
+          <a:xfrm>
+            <a:off x="6314440" y="1636931"/>
+            <a:ext cx="2667000" cy="4876800"/>
+          </a:xfrm>
+        </p:spPr>
+        <p:txBody>
+          <a:bodyPr>
+            <a:normAutofit/>
+          </a:bodyPr>
+          <a:lstStyle/>
+          <a:p>
+            <a:pPr marL="0" indent="0">
+              <a:buNone/>
+            </a:pPr>
+            <a:r>
+              <a:rPr lang="en-US" dirty="0"/>
+              <a:t>H</a:t>
+            </a:r>
+            <a:r>
+              <a:rPr lang="en-US" dirty="0" smtClean="0"/>
+              <a:t>ighest mean in</a:t>
+            </a:r>
+          </a:p>
+          <a:p>
+            <a:pPr marL="457200" indent="-457200">
+              <a:buFont typeface="+mj-lt"/>
+              <a:buAutoNum type="arabicPeriod"/>
+            </a:pPr>
+            <a:r>
+              <a:rPr lang="en-US" sz="2200" dirty="0" smtClean="0"/>
+              <a:t>D.C</a:t>
+            </a:r>
+            <a:r>
+              <a:rPr lang="en-US" sz="2200" dirty="0"/>
+              <a:t>. </a:t>
+            </a:r>
+            <a:endParaRPr lang="en-US" sz="2200" dirty="0" smtClean="0"/>
+          </a:p>
+          <a:p>
+            <a:pPr marL="0" indent="0">
+              <a:buNone/>
+            </a:pPr>
+            <a:r>
+              <a:rPr lang="en-US" sz="2200" dirty="0" smtClean="0"/>
+              <a:t>      ($</a:t>
+            </a:r>
+            <a:r>
+              <a:rPr lang="en-US" sz="2200" dirty="0"/>
+              <a:t>154,465</a:t>
+            </a:r>
+            <a:r>
+              <a:rPr lang="en-US" sz="2200" dirty="0" smtClean="0"/>
+              <a:t>)</a:t>
+            </a:r>
+          </a:p>
+          <a:p>
+            <a:pPr marL="457200" indent="-457200">
+              <a:buFont typeface="+mj-lt"/>
+              <a:buAutoNum type="arabicPeriod"/>
+            </a:pPr>
+            <a:r>
+              <a:rPr lang="en-US" sz="2200" dirty="0" smtClean="0"/>
+              <a:t>Connecticut </a:t>
+            </a:r>
+            <a:r>
+              <a:rPr lang="en-US" sz="2200" dirty="0"/>
+              <a:t>($126,760</a:t>
+            </a:r>
+            <a:r>
+              <a:rPr lang="en-US" sz="2200" dirty="0" smtClean="0"/>
+              <a:t>) </a:t>
+            </a:r>
+          </a:p>
+          <a:p>
+            <a:pPr marL="457200" indent="-457200">
+              <a:buFont typeface="+mj-lt"/>
+              <a:buAutoNum type="arabicPeriod"/>
+            </a:pPr>
+            <a:r>
+              <a:rPr lang="en-US" sz="2200" dirty="0" smtClean="0"/>
+              <a:t>New </a:t>
+            </a:r>
+            <a:r>
+              <a:rPr lang="en-US" sz="2200" dirty="0"/>
+              <a:t>Jersey ($</a:t>
+            </a:r>
+            <a:r>
+              <a:rPr lang="en-US" sz="2200" dirty="0" smtClean="0"/>
+              <a:t>124,364)</a:t>
+            </a:r>
+          </a:p>
+          <a:p>
+            <a:pPr marL="457200" indent="-457200">
+              <a:buFont typeface="+mj-lt"/>
+              <a:buAutoNum type="arabicPeriod"/>
+            </a:pPr>
+            <a:r>
+              <a:rPr lang="en-US" sz="2200" dirty="0" smtClean="0"/>
+              <a:t>Maryland </a:t>
+            </a:r>
+            <a:r>
+              <a:rPr lang="en-US" sz="2200" dirty="0"/>
+              <a:t>($</a:t>
+            </a:r>
+            <a:r>
+              <a:rPr lang="en-US" sz="2200" dirty="0" smtClean="0"/>
+              <a:t>119,358)</a:t>
+            </a:r>
+          </a:p>
+          <a:p>
+            <a:pPr marL="457200" indent="-457200">
+              <a:buFont typeface="+mj-lt"/>
+              <a:buAutoNum type="arabicPeriod"/>
+            </a:pPr>
+            <a:r>
+              <a:rPr lang="en-US" sz="2200" dirty="0" smtClean="0"/>
+              <a:t>Massachusetts </a:t>
+            </a:r>
+            <a:r>
+              <a:rPr lang="en-US" sz="2200" dirty="0"/>
+              <a:t>($118,119</a:t>
+            </a:r>
+            <a:r>
+              <a:rPr lang="en-US" sz="2200" dirty="0" smtClean="0"/>
+              <a:t>)</a:t>
+            </a:r>
+            <a:endParaRPr lang="en-US" sz="2200" dirty="0"/>
+          </a:p>
+          <a:p>
+            <a:endParaRPr lang="en-US" dirty="0"/>
+          </a:p>
+        </p:txBody>
+      </p:sp>
+      <p:sp>
+        <p:nvSpPr>
+          <p:cNvPr id="4" name="TextBox 3"/>
+          <p:cNvSpPr txBox="1"/>
+          <p:nvPr/>
+        </p:nvSpPr>
+        <p:spPr>
+          <a:xfrm>
+            <a:off x="749300" y="5867400"/>
+            <a:ext cx="4800600" cy="646331"/>
+          </a:xfrm>
+          <a:prstGeom prst="rect">
+            <a:avLst/>
+          </a:prstGeom>
+          <a:noFill/>
+        </p:spPr>
+        <p:txBody>
+          <a:bodyPr wrap="square" rtlCol="0">
+            <a:spAutoFit/>
+          </a:bodyPr>
+          <a:lstStyle/>
+          <a:p>
+            <a:pPr marL="285750" indent="-285750">
+              <a:buFont typeface="Arial" panose="020B0604020202020204" pitchFamily="34" charset="0"/>
+              <a:buChar char="•"/>
+            </a:pPr>
+            <a:r>
+              <a:rPr lang="en-US" dirty="0" smtClean="0"/>
+              <a:t>Similar results for </a:t>
+            </a:r>
+            <a:r>
+              <a:rPr lang="en-US" dirty="0"/>
+              <a:t>those owning free and </a:t>
+            </a:r>
+            <a:r>
+              <a:rPr lang="en-US" dirty="0" smtClean="0"/>
+              <a:t>clear.</a:t>
+            </a:r>
+            <a:endParaRPr lang="en-US" dirty="0"/>
+          </a:p>
+        </p:txBody>
+      </p:sp>
+    </p:spTree>
+    <p:extLst>
+      <p:ext uri="{BB962C8B-B14F-4D97-AF65-F5344CB8AC3E}">
+        <p14:creationId xmlns:p14="http://schemas.microsoft.com/office/powerpoint/2010/main" val="441010549"/>
+      </p:ext>
+    </p:extLst>
+  </p:cSld>
+  <p:clrMapOvr>
+    <a:masterClrMapping/>
+  </p:clrMapOvr>
+</p:sld>
+</file>
+
+<file path=ppt/slides/slide8.xml><?xml version="1.0" encoding="utf-8"?>
+<p:sld xmlns:a="http://schemas.openxmlformats.org/drawingml/2006/main" xmlns:r="http://schemas.openxmlformats.org/officeDocument/2006/relationships" xmlns:p="http://schemas.openxmlformats.org/presentationml/2006/main">
+  <p:cSld>
+    <p:spTree>
+      <p:nvGrpSpPr>
+        <p:cNvPr id="1" name=""/>
+        <p:cNvGrpSpPr/>
+        <p:nvPr/>
+      </p:nvGrpSpPr>
+      <p:grpSpPr>
+        <a:xfrm>
+          <a:off x="0" y="0"/>
+          <a:ext cx="0" cy="0"/>
+          <a:chOff x="0" y="0"/>
+          <a:chExt cx="0" cy="0"/>
+        </a:xfrm>
+      </p:grpSpPr>
+      <p:sp>
+        <p:nvSpPr>
+          <p:cNvPr id="2" name="Title 1"/>
+          <p:cNvSpPr>
+            <a:spLocks noGrp="1"/>
+          </p:cNvSpPr>
+          <p:nvPr>
+            <p:ph type="title"/>
+          </p:nvPr>
+        </p:nvSpPr>
+        <p:spPr>
+          <a:xfrm>
+            <a:off x="533400" y="533400"/>
+            <a:ext cx="8229600" cy="990600"/>
+          </a:xfrm>
+        </p:spPr>
+        <p:txBody>
+          <a:bodyPr/>
+          <a:lstStyle/>
+          <a:p>
+            <a:pPr algn="ctr"/>
+            <a:r>
+              <a:rPr lang="en-US" dirty="0" smtClean="0"/>
+              <a:t>Findings</a:t>
+            </a:r>
+            <a:endParaRPr lang="en-US" dirty="0"/>
+          </a:p>
+        </p:txBody>
+      </p:sp>
+      <p:sp>
+        <p:nvSpPr>
+          <p:cNvPr id="3" name="Content Placeholder 2"/>
+          <p:cNvSpPr>
+            <a:spLocks noGrp="1"/>
+          </p:cNvSpPr>
+          <p:nvPr>
+            <p:ph idx="1"/>
+          </p:nvPr>
+        </p:nvSpPr>
+        <p:spPr>
+          <a:xfrm>
+            <a:off x="6324600" y="1524000"/>
+            <a:ext cx="2667000" cy="4876800"/>
+          </a:xfrm>
+        </p:spPr>
+        <p:txBody>
+          <a:bodyPr>
+            <a:normAutofit/>
+          </a:bodyPr>
+          <a:lstStyle/>
+          <a:p>
+            <a:pPr marL="0" indent="0">
+              <a:buNone/>
+            </a:pPr>
+            <a:r>
+              <a:rPr lang="en-US" dirty="0"/>
+              <a:t>H</a:t>
+            </a:r>
+            <a:r>
+              <a:rPr lang="en-US" dirty="0" smtClean="0"/>
+              <a:t>ighest mean in</a:t>
+            </a:r>
+          </a:p>
+          <a:p>
+            <a:pPr marL="457200" indent="-457200">
+              <a:buFont typeface="+mj-lt"/>
+              <a:buAutoNum type="arabicPeriod"/>
+            </a:pPr>
+            <a:r>
+              <a:rPr lang="en-US" sz="2200" dirty="0" smtClean="0"/>
+              <a:t>D.C</a:t>
+            </a:r>
+            <a:r>
+              <a:rPr lang="en-US" sz="2200" dirty="0"/>
+              <a:t>. </a:t>
+            </a:r>
+            <a:endParaRPr lang="en-US" sz="2200" dirty="0" smtClean="0"/>
+          </a:p>
+          <a:p>
+            <a:pPr marL="0" indent="0">
+              <a:buNone/>
+            </a:pPr>
+            <a:r>
+              <a:rPr lang="en-US" sz="2200" dirty="0"/>
+              <a:t> </a:t>
+            </a:r>
+            <a:r>
+              <a:rPr lang="en-US" sz="2200" dirty="0" smtClean="0"/>
+              <a:t>    ($62,337)</a:t>
+            </a:r>
+          </a:p>
+          <a:p>
+            <a:pPr marL="457200" indent="-457200">
+              <a:buFont typeface="+mj-lt"/>
+              <a:buAutoNum type="arabicPeriod"/>
+            </a:pPr>
+            <a:r>
+              <a:rPr lang="en-US" sz="2200" dirty="0" smtClean="0"/>
+              <a:t>Hawaii </a:t>
+            </a:r>
+            <a:r>
+              <a:rPr lang="en-US" sz="2200" dirty="0"/>
+              <a:t>($</a:t>
+            </a:r>
+            <a:r>
+              <a:rPr lang="en-US" sz="2200" dirty="0" smtClean="0"/>
+              <a:t>58,077)</a:t>
+            </a:r>
+          </a:p>
+          <a:p>
+            <a:pPr marL="457200" indent="-457200">
+              <a:buFont typeface="+mj-lt"/>
+              <a:buAutoNum type="arabicPeriod"/>
+            </a:pPr>
+            <a:r>
+              <a:rPr lang="en-US" sz="2200" dirty="0" smtClean="0"/>
+              <a:t>Alaska </a:t>
+            </a:r>
+            <a:r>
+              <a:rPr lang="en-US" sz="2200" dirty="0"/>
+              <a:t>($</a:t>
+            </a:r>
+            <a:r>
+              <a:rPr lang="en-US" sz="2200" dirty="0" smtClean="0"/>
+              <a:t>54,918)</a:t>
+            </a:r>
+          </a:p>
+          <a:p>
+            <a:pPr marL="457200" indent="-457200">
+              <a:buFont typeface="+mj-lt"/>
+              <a:buAutoNum type="arabicPeriod"/>
+            </a:pPr>
+            <a:r>
+              <a:rPr lang="en-US" sz="2200" dirty="0" smtClean="0"/>
+              <a:t>California </a:t>
+            </a:r>
+            <a:r>
+              <a:rPr lang="en-US" sz="2200" dirty="0"/>
+              <a:t>($</a:t>
+            </a:r>
+            <a:r>
+              <a:rPr lang="en-US" sz="2200" dirty="0" smtClean="0"/>
+              <a:t>52,423)</a:t>
+            </a:r>
+          </a:p>
+          <a:p>
+            <a:pPr marL="457200" indent="-457200">
+              <a:buFont typeface="+mj-lt"/>
+              <a:buAutoNum type="arabicPeriod"/>
+            </a:pPr>
+            <a:r>
+              <a:rPr lang="en-US" sz="2200" dirty="0" smtClean="0"/>
+              <a:t>Maryland </a:t>
+            </a:r>
+            <a:r>
+              <a:rPr lang="en-US" sz="2200" dirty="0"/>
+              <a:t>($52,404</a:t>
+            </a:r>
+            <a:r>
+              <a:rPr lang="en-US" sz="2200" dirty="0" smtClean="0"/>
+              <a:t>)</a:t>
+            </a:r>
+            <a:endParaRPr lang="en-US" sz="2200" dirty="0"/>
+          </a:p>
+          <a:p>
+            <a:endParaRPr lang="en-US" dirty="0"/>
+          </a:p>
+        </p:txBody>
+      </p:sp>
+      <p:pic>
+        <p:nvPicPr>
+          <p:cNvPr id="2050" name="Picture 2"/>
+          <p:cNvPicPr>
+            <a:picLocks noChangeAspect="1" noChangeArrowheads="1"/>
+          </p:cNvPicPr>
+          <p:nvPr/>
+        </p:nvPicPr>
+        <p:blipFill rotWithShape="1">
+          <a:blip r:embed="rId3">
+            <a:extLst>
+              <a:ext uri="{28A0092B-C50C-407E-A947-70E740481C1C}">
+                <a14:useLocalDpi xmlns:a14="http://schemas.microsoft.com/office/drawing/2010/main" val="0"/>
+              </a:ext>
+            </a:extLst>
+          </a:blip>
+          <a:srcRect r="3099"/>
+          <a:stretch/>
+        </p:blipFill>
+        <p:spPr bwMode="auto">
+          <a:xfrm>
+            <a:off x="0" y="1676400"/>
+            <a:ext cx="6319520" cy="4038600"/>
+          </a:xfrm>
+          <a:prstGeom prst="rect">
+            <a:avLst/>
+          </a:prstGeom>
+          <a:noFill/>
+          <a:ln>
+            <a:noFill/>
+          </a:ln>
+          <a:extLst>
+            <a:ext uri="{909E8E84-426E-40DD-AFC4-6F175D3DCCD1}">
+              <a14:hiddenFill xmlns:a14="http://schemas.microsoft.com/office/drawing/2010/main">
+                <a:solidFill>
+                  <a:schemeClr val="accent1"/>
+                </a:solidFill>
+              </a14:hiddenFill>
+            </a:ext>
+            <a:ext uri="{91240B29-F687-4F45-9708-019B960494DF}">
+              <a14:hiddenLine xmlns:a14="http://schemas.microsoft.com/office/drawing/2010/main" w="9525">
+                <a:solidFill>
+                  <a:schemeClr val="tx1"/>
+                </a:solidFill>
+                <a:miter lim="800000"/>
+                <a:headEnd/>
+                <a:tailEnd/>
+              </a14:hiddenLine>
+            </a:ext>
+          </a:extLst>
+        </p:spPr>
+      </p:pic>
+    </p:spTree>
+    <p:extLst>
+      <p:ext uri="{BB962C8B-B14F-4D97-AF65-F5344CB8AC3E}">
+        <p14:creationId xmlns:p14="http://schemas.microsoft.com/office/powerpoint/2010/main" val="3745031302"/>
+      </p:ext>
+    </p:extLst>
+  </p:cSld>
+  <p:clrMapOvr>
+    <a:masterClrMapping/>
+  </p:clrMapOvr>
+</p:sld>
+</file>
+
+<file path=ppt/slides/slide9.xml><?xml version="1.0" encoding="utf-8"?>
+<p:sld xmlns:a="http://schemas.openxmlformats.org/drawingml/2006/main" xmlns:r="http://schemas.openxmlformats.org/officeDocument/2006/relationships" xmlns:p="http://schemas.openxmlformats.org/presentationml/2006/main">
+  <p:cSld>
+    <p:spTree>
+      <p:nvGrpSpPr>
+        <p:cNvPr id="1" name=""/>
+        <p:cNvGrpSpPr/>
+        <p:nvPr/>
+      </p:nvGrpSpPr>
+      <p:grpSpPr>
+        <a:xfrm>
+          <a:off x="0" y="0"/>
+          <a:ext cx="0" cy="0"/>
+          <a:chOff x="0" y="0"/>
+          <a:chExt cx="0" cy="0"/>
+        </a:xfrm>
+      </p:grpSpPr>
+      <p:sp>
+        <p:nvSpPr>
+          <p:cNvPr id="2" name="Title 1"/>
+          <p:cNvSpPr>
+            <a:spLocks noGrp="1"/>
+          </p:cNvSpPr>
+          <p:nvPr>
+            <p:ph type="title"/>
+          </p:nvPr>
+        </p:nvSpPr>
+        <p:spPr>
+          <a:xfrm>
+            <a:off x="533400" y="533400"/>
+            <a:ext cx="8229600" cy="990600"/>
+          </a:xfrm>
+        </p:spPr>
+        <p:txBody>
+          <a:bodyPr/>
+          <a:lstStyle/>
+          <a:p>
+            <a:pPr algn="ctr"/>
+            <a:r>
+              <a:rPr lang="en-US" dirty="0" smtClean="0"/>
+              <a:t>Findings</a:t>
+            </a:r>
+            <a:endParaRPr lang="en-US" dirty="0"/>
+          </a:p>
+        </p:txBody>
+      </p:sp>
+      <p:sp>
+        <p:nvSpPr>
+          <p:cNvPr id="3" name="Content Placeholder 2"/>
+          <p:cNvSpPr>
+            <a:spLocks noGrp="1"/>
+          </p:cNvSpPr>
+          <p:nvPr>
+            <p:ph idx="1"/>
+          </p:nvPr>
+        </p:nvSpPr>
+        <p:spPr>
+          <a:xfrm>
+            <a:off x="6324600" y="1524000"/>
+            <a:ext cx="2667000" cy="4876800"/>
+          </a:xfrm>
+        </p:spPr>
+        <p:txBody>
+          <a:bodyPr>
+            <a:normAutofit/>
+          </a:bodyPr>
+          <a:lstStyle/>
+          <a:p>
+            <a:pPr marL="0" indent="0">
+              <a:buNone/>
+            </a:pPr>
+            <a:r>
+              <a:rPr lang="en-US" dirty="0"/>
+              <a:t>H</a:t>
+            </a:r>
+            <a:r>
+              <a:rPr lang="en-US" dirty="0" smtClean="0"/>
+              <a:t>ighest mean in</a:t>
+            </a:r>
+          </a:p>
+          <a:p>
+            <a:pPr marL="457200" indent="-457200">
+              <a:buFont typeface="+mj-lt"/>
+              <a:buAutoNum type="arabicPeriod"/>
+            </a:pPr>
+            <a:r>
+              <a:rPr lang="en-US" sz="2200" dirty="0" smtClean="0"/>
+              <a:t>D.C</a:t>
+            </a:r>
+            <a:r>
+              <a:rPr lang="en-US" sz="2200" dirty="0"/>
+              <a:t>. </a:t>
+            </a:r>
+            <a:endParaRPr lang="en-US" sz="2200" dirty="0" smtClean="0"/>
+          </a:p>
+          <a:p>
+            <a:pPr marL="0" indent="0">
+              <a:buNone/>
+            </a:pPr>
+            <a:r>
+              <a:rPr lang="en-US" sz="2200" dirty="0"/>
+              <a:t> </a:t>
+            </a:r>
+            <a:r>
+              <a:rPr lang="en-US" sz="2200" dirty="0" smtClean="0"/>
+              <a:t>    ($62,337)</a:t>
+            </a:r>
+          </a:p>
+          <a:p>
+            <a:pPr marL="457200" indent="-457200">
+              <a:buFont typeface="+mj-lt"/>
+              <a:buAutoNum type="arabicPeriod"/>
+            </a:pPr>
+            <a:r>
+              <a:rPr lang="en-US" sz="2200" dirty="0" smtClean="0"/>
+              <a:t>Hawaii </a:t>
+            </a:r>
+            <a:r>
+              <a:rPr lang="en-US" sz="2200" dirty="0"/>
+              <a:t>($</a:t>
+            </a:r>
+            <a:r>
+              <a:rPr lang="en-US" sz="2200" dirty="0" smtClean="0"/>
+              <a:t>58,077)</a:t>
+            </a:r>
+          </a:p>
+          <a:p>
+            <a:pPr marL="457200" indent="-457200">
+              <a:buFont typeface="+mj-lt"/>
+              <a:buAutoNum type="arabicPeriod"/>
+            </a:pPr>
+            <a:r>
+              <a:rPr lang="en-US" sz="2200" dirty="0" smtClean="0"/>
+              <a:t>Alaska </a:t>
+            </a:r>
+            <a:r>
+              <a:rPr lang="en-US" sz="2200" dirty="0"/>
+              <a:t>($</a:t>
+            </a:r>
+            <a:r>
+              <a:rPr lang="en-US" sz="2200" dirty="0" smtClean="0"/>
+              <a:t>54,918)</a:t>
+            </a:r>
+          </a:p>
+          <a:p>
+            <a:pPr marL="457200" indent="-457200">
+              <a:buFont typeface="+mj-lt"/>
+              <a:buAutoNum type="arabicPeriod"/>
+            </a:pPr>
+            <a:r>
+              <a:rPr lang="en-US" sz="2200" dirty="0" smtClean="0"/>
+              <a:t>California </a:t>
+            </a:r>
+            <a:r>
+              <a:rPr lang="en-US" sz="2200" dirty="0"/>
+              <a:t>($</a:t>
+            </a:r>
+            <a:r>
+              <a:rPr lang="en-US" sz="2200" dirty="0" smtClean="0"/>
+              <a:t>52,423)</a:t>
+            </a:r>
+          </a:p>
+          <a:p>
+            <a:pPr marL="457200" indent="-457200">
+              <a:buFont typeface="+mj-lt"/>
+              <a:buAutoNum type="arabicPeriod"/>
+            </a:pPr>
+            <a:r>
+              <a:rPr lang="en-US" sz="2200" dirty="0" smtClean="0"/>
+              <a:t>Maryland </a:t>
+            </a:r>
+            <a:r>
+              <a:rPr lang="en-US" sz="2200" dirty="0"/>
+              <a:t>($52,404</a:t>
+            </a:r>
+            <a:r>
+              <a:rPr lang="en-US" sz="2200" dirty="0" smtClean="0"/>
+              <a:t>)</a:t>
+            </a:r>
+            <a:endParaRPr lang="en-US" sz="2200" dirty="0"/>
+          </a:p>
+          <a:p>
+            <a:endParaRPr lang="en-US" dirty="0"/>
+          </a:p>
+        </p:txBody>
+      </p:sp>
+      <p:pic>
+        <p:nvPicPr>
+          <p:cNvPr id="5" name="Picture 4"/>
+          <p:cNvPicPr/>
+          <p:nvPr/>
+        </p:nvPicPr>
+        <p:blipFill>
+          <a:blip r:embed="rId3"/>
+          <a:stretch>
+            <a:fillRect/>
+          </a:stretch>
+        </p:blipFill>
+        <p:spPr>
+          <a:xfrm>
+            <a:off x="132347" y="1507958"/>
+            <a:ext cx="5943600" cy="4279265"/>
+          </a:xfrm>
+          <a:prstGeom prst="rect">
+            <a:avLst/>
+          </a:prstGeom>
+        </p:spPr>
+      </p:pic>
+    </p:spTree>
+    <p:extLst>
+      <p:ext uri="{BB962C8B-B14F-4D97-AF65-F5344CB8AC3E}">
+        <p14:creationId xmlns:p14="http://schemas.microsoft.com/office/powerpoint/2010/main" val="2609325822"/>
+      </p:ext>
+    </p:extLst>
+  </p:cSld>
+  <p:clrMapOvr>
+    <a:masterClrMapping/>
+  </p:clrMapOvr>
 </p:sld>
 </file>
 

</xml_diff>